<commit_message>
chg: Added picture to IADS intrep
</commit_message>
<xml_diff>
--- a/OPAR/INTREP VIS OPAR-002 - Syrian IADS.pptx
+++ b/OPAR/INTREP VIS OPAR-002 - Syrian IADS.pptx
@@ -209,7 +209,7 @@
             <a:fld id="{40637A30-8EE1-4060-9976-8832FC89EE34}" type="datetimeFigureOut">
               <a:rPr lang="nb-NO" smtClean="0"/>
               <a:pPr/>
-              <a:t>17.07.2020</a:t>
+              <a:t>26.07.2020</a:t>
             </a:fld>
             <a:endParaRPr lang="nb-NO"/>
           </a:p>
@@ -3939,42 +3939,24 @@
                 <a:latin typeface="Arial Black" pitchFamily="34" charset="0"/>
                 <a:ea typeface="MS Mincho" pitchFamily="49" charset="-128"/>
               </a:rPr>
-              <a:t>SYRIAN </a:t>
-            </a:r>
+              <a:t>SYRIAN INTEGRATED AIR DEFENSE SYSTEM </a:t>
+            </a:r>
+          </a:p>
+          <a:p>
+            <a:pPr algn="ctr"/>
+            <a:endParaRPr lang="nb-NO" sz="1400" b="1" dirty="0" smtClean="0">
+              <a:latin typeface="Arial Black" pitchFamily="34" charset="0"/>
+              <a:ea typeface="MS Mincho" pitchFamily="49" charset="-128"/>
+            </a:endParaRPr>
+          </a:p>
+          <a:p>
+            <a:pPr algn="ctr"/>
             <a:r>
               <a:rPr lang="nb-NO" sz="2800" b="1" dirty="0" smtClean="0">
                 <a:latin typeface="Arial Black" pitchFamily="34" charset="0"/>
                 <a:ea typeface="MS Mincho" pitchFamily="49" charset="-128"/>
               </a:rPr>
-              <a:t>INTEGRATED AIR DEFENSE SYSTEM </a:t>
-            </a:r>
-            <a:endParaRPr lang="nb-NO" sz="2800" b="1" dirty="0" smtClean="0">
-              <a:latin typeface="Arial Black" pitchFamily="34" charset="0"/>
-              <a:ea typeface="MS Mincho" pitchFamily="49" charset="-128"/>
-            </a:endParaRPr>
-          </a:p>
-          <a:p>
-            <a:pPr algn="ctr"/>
-            <a:endParaRPr lang="nb-NO" sz="1400" b="1" dirty="0" smtClean="0">
-              <a:latin typeface="Arial Black" pitchFamily="34" charset="0"/>
-              <a:ea typeface="MS Mincho" pitchFamily="49" charset="-128"/>
-            </a:endParaRPr>
-          </a:p>
-          <a:p>
-            <a:pPr algn="ctr"/>
-            <a:r>
-              <a:rPr lang="nb-NO" sz="2800" b="1" dirty="0" smtClean="0">
-                <a:latin typeface="Arial Black" pitchFamily="34" charset="0"/>
-                <a:ea typeface="MS Mincho" pitchFamily="49" charset="-128"/>
-              </a:rPr>
-              <a:t>INTREP </a:t>
-            </a:r>
-            <a:r>
-              <a:rPr lang="nb-NO" sz="2800" b="1" dirty="0" smtClean="0">
-                <a:latin typeface="Arial Black" pitchFamily="34" charset="0"/>
-                <a:ea typeface="MS Mincho" pitchFamily="49" charset="-128"/>
-              </a:rPr>
-              <a:t>VIS-OPAR-002</a:t>
+              <a:t>INTREP VIS-OPAR-002</a:t>
             </a:r>
             <a:endParaRPr lang="nb-NO" sz="2800" b="1" dirty="0">
               <a:latin typeface="MS Mincho" pitchFamily="49" charset="-128"/>
@@ -7359,7 +7341,6 @@
               <a:rPr lang="en-US" sz="1200" dirty="0" smtClean="0"/>
               <a:t>The Syrian IADS consist of a combination of Early Warning radars, SAMs and air defense fighters on ground alert (or airborne in CAPs).</a:t>
             </a:r>
-            <a:endParaRPr lang="en-US" sz="1200" dirty="0" smtClean="0"/>
           </a:p>
           <a:p>
             <a:endParaRPr lang="en-US" sz="1200" dirty="0" smtClean="0"/>
@@ -7420,7 +7401,7 @@
           <p:nvPr/>
         </p:nvPicPr>
         <p:blipFill>
-          <a:blip r:embed="rId3"/>
+          <a:blip r:embed="rId3" cstate="print"/>
           <a:srcRect/>
           <a:stretch>
             <a:fillRect/>
@@ -8152,7 +8133,6 @@
               <a:rPr lang="en-US" sz="1200" dirty="0" smtClean="0"/>
               <a:t>The Syrian IADS is organized in the following way:</a:t>
             </a:r>
-            <a:endParaRPr lang="en-US" sz="1200" dirty="0" smtClean="0"/>
           </a:p>
           <a:p>
             <a:endParaRPr lang="en-US" sz="1200" dirty="0" smtClean="0"/>
@@ -8213,7 +8193,7 @@
           <p:nvPr/>
         </p:nvPicPr>
         <p:blipFill>
-          <a:blip r:embed="rId3"/>
+          <a:blip r:embed="rId3" cstate="print"/>
           <a:srcRect/>
           <a:stretch>
             <a:fillRect/>
@@ -8945,7 +8925,6 @@
               <a:rPr lang="en-US" sz="1200" dirty="0" smtClean="0"/>
               <a:t>The Syrian IADS is organized in the following way:</a:t>
             </a:r>
-            <a:endParaRPr lang="en-US" sz="1200" dirty="0" smtClean="0"/>
           </a:p>
           <a:p>
             <a:endParaRPr lang="en-US" sz="1200" dirty="0" smtClean="0"/>
@@ -9006,7 +8985,7 @@
           <p:nvPr/>
         </p:nvPicPr>
         <p:blipFill>
-          <a:blip r:embed="rId3"/>
+          <a:blip r:embed="rId3" cstate="print"/>
           <a:srcRect/>
           <a:stretch>
             <a:fillRect/>
@@ -9738,7 +9717,6 @@
               <a:rPr lang="en-US" sz="1200" dirty="0" smtClean="0"/>
               <a:t>The Syrian IADS is organized in the following way:</a:t>
             </a:r>
-            <a:endParaRPr lang="en-US" sz="1200" dirty="0" smtClean="0"/>
           </a:p>
           <a:p>
             <a:endParaRPr lang="en-US" sz="1200" dirty="0" smtClean="0"/>
@@ -9799,7 +9777,7 @@
           <p:nvPr/>
         </p:nvPicPr>
         <p:blipFill>
-          <a:blip r:embed="rId3"/>
+          <a:blip r:embed="rId3" cstate="print"/>
           <a:srcRect/>
           <a:stretch>
             <a:fillRect/>
@@ -11561,10 +11539,6 @@
               </a:rPr>
               <a:t>.</a:t>
             </a:r>
-            <a:endParaRPr lang="nb-NO" sz="1400" dirty="0" smtClean="0">
-              <a:latin typeface="Arial" pitchFamily="34" charset="0"/>
-              <a:cs typeface="Arial" pitchFamily="34" charset="0"/>
-            </a:endParaRPr>
           </a:p>
           <a:p>
             <a:endParaRPr lang="nb-NO" sz="1400" dirty="0" smtClean="0">
@@ -11587,10 +11561,6 @@
               </a:rPr>
               <a:t>: </a:t>
             </a:r>
-            <a:endParaRPr lang="nb-NO" sz="1400" b="1" u="sng" dirty="0" smtClean="0">
-              <a:latin typeface="Arial" pitchFamily="34" charset="0"/>
-              <a:cs typeface="Arial" pitchFamily="34" charset="0"/>
-            </a:endParaRPr>
           </a:p>
           <a:p>
             <a:r>
@@ -11598,14 +11568,7 @@
                 <a:latin typeface="Arial" pitchFamily="34" charset="0"/>
                 <a:cs typeface="Arial" pitchFamily="34" charset="0"/>
               </a:rPr>
-              <a:t>INTREP </a:t>
-            </a:r>
-            <a:r>
-              <a:rPr lang="en-US" sz="1400" dirty="0" smtClean="0">
-                <a:latin typeface="Arial" pitchFamily="34" charset="0"/>
-                <a:cs typeface="Arial" pitchFamily="34" charset="0"/>
-              </a:rPr>
-              <a:t>VIS B-001 Generic Ground Force Structure v1.0</a:t>
+              <a:t>INTREP VIS B-001 Generic Ground Force Structure v1.0</a:t>
             </a:r>
             <a:endParaRPr lang="nb-NO" sz="1400" dirty="0">
               <a:latin typeface="Arial" pitchFamily="34" charset="0"/>
@@ -12628,7 +12591,6 @@
               <a:rPr lang="en-US" sz="1200" dirty="0" smtClean="0"/>
               <a:t>IADS</a:t>
             </a:r>
-            <a:endParaRPr lang="en-US" sz="1200" dirty="0" smtClean="0"/>
           </a:p>
           <a:p>
             <a:r>
@@ -12641,28 +12603,16 @@
             </a:r>
             <a:r>
               <a:rPr lang="en-US" sz="1200" dirty="0" smtClean="0"/>
-              <a:t> System is a wide network of surface-to-air forces that work together to defend the skies of a specific area</a:t>
-            </a:r>
+              <a:t> System is a wide network of surface-to-air forces that work together to defend the skies of a specific area. The system is also connected to the QRA fighters that can be scrambled toward incoming threats.  </a:t>
+            </a:r>
+          </a:p>
+          <a:p>
+            <a:endParaRPr lang="en-US" sz="1200" dirty="0" smtClean="0"/>
+          </a:p>
+          <a:p>
             <a:r>
               <a:rPr lang="en-US" sz="1200" dirty="0" smtClean="0"/>
-              <a:t>. The system is also connected to the QRA fighters that can be scrambled toward incoming threats.  </a:t>
-            </a:r>
-          </a:p>
-          <a:p>
-            <a:endParaRPr lang="en-US" sz="1200" dirty="0" smtClean="0"/>
-          </a:p>
-          <a:p>
-            <a:r>
-              <a:rPr lang="en-US" sz="1200" dirty="0" smtClean="0"/>
-              <a:t>There </a:t>
-            </a:r>
-            <a:r>
-              <a:rPr lang="en-US" sz="1200" dirty="0" smtClean="0"/>
-              <a:t>are several elements that are part of this network, and they are the </a:t>
-            </a:r>
-            <a:r>
-              <a:rPr lang="en-US" sz="1200" dirty="0" smtClean="0"/>
-              <a:t>following: See next slide</a:t>
+              <a:t>There are several elements that are part of this network, and they are the following: See next slide</a:t>
             </a:r>
           </a:p>
           <a:p>
@@ -13487,6 +13437,102 @@
           </a:p>
         </p:txBody>
       </p:sp>
+      <p:pic>
+        <p:nvPicPr>
+          <p:cNvPr id="1026" name="Picture 2"/>
+          <p:cNvPicPr>
+            <a:picLocks noChangeAspect="1" noChangeArrowheads="1"/>
+          </p:cNvPicPr>
+          <p:nvPr/>
+        </p:nvPicPr>
+        <p:blipFill>
+          <a:blip r:embed="rId3" cstate="print"/>
+          <a:srcRect/>
+          <a:stretch>
+            <a:fillRect/>
+          </a:stretch>
+        </p:blipFill>
+        <p:spPr bwMode="auto">
+          <a:xfrm>
+            <a:off x="5182106" y="771550"/>
+            <a:ext cx="1952305" cy="1656184"/>
+          </a:xfrm>
+          <a:prstGeom prst="rect">
+            <a:avLst/>
+          </a:prstGeom>
+          <a:noFill/>
+          <a:ln w="9525">
+            <a:noFill/>
+            <a:miter lim="800000"/>
+            <a:headEnd/>
+            <a:tailEnd/>
+          </a:ln>
+        </p:spPr>
+      </p:pic>
+      <p:pic>
+        <p:nvPicPr>
+          <p:cNvPr id="1027" name="Picture 3"/>
+          <p:cNvPicPr>
+            <a:picLocks noChangeAspect="1" noChangeArrowheads="1"/>
+          </p:cNvPicPr>
+          <p:nvPr/>
+        </p:nvPicPr>
+        <p:blipFill>
+          <a:blip r:embed="rId4" cstate="print"/>
+          <a:srcRect/>
+          <a:stretch>
+            <a:fillRect/>
+          </a:stretch>
+        </p:blipFill>
+        <p:spPr bwMode="auto">
+          <a:xfrm>
+            <a:off x="7092280" y="1995686"/>
+            <a:ext cx="1858193" cy="2387923"/>
+          </a:xfrm>
+          <a:prstGeom prst="rect">
+            <a:avLst/>
+          </a:prstGeom>
+          <a:noFill/>
+          <a:ln w="9525">
+            <a:noFill/>
+            <a:miter lim="800000"/>
+            <a:headEnd/>
+            <a:tailEnd/>
+          </a:ln>
+        </p:spPr>
+      </p:pic>
+      <p:pic>
+        <p:nvPicPr>
+          <p:cNvPr id="1028" name="Picture 4"/>
+          <p:cNvPicPr>
+            <a:picLocks noChangeAspect="1" noChangeArrowheads="1"/>
+          </p:cNvPicPr>
+          <p:nvPr/>
+        </p:nvPicPr>
+        <p:blipFill>
+          <a:blip r:embed="rId5" cstate="print"/>
+          <a:srcRect/>
+          <a:stretch>
+            <a:fillRect/>
+          </a:stretch>
+        </p:blipFill>
+        <p:spPr bwMode="auto">
+          <a:xfrm>
+            <a:off x="3563888" y="1923678"/>
+            <a:ext cx="1598231" cy="2156272"/>
+          </a:xfrm>
+          <a:prstGeom prst="rect">
+            <a:avLst/>
+          </a:prstGeom>
+          <a:noFill/>
+          <a:ln w="9525">
+            <a:noFill/>
+            <a:miter lim="800000"/>
+            <a:headEnd/>
+            <a:tailEnd/>
+          </a:ln>
+        </p:spPr>
+      </p:pic>
     </p:spTree>
   </p:cSld>
   <p:clrMapOvr>
@@ -14262,7 +14308,6 @@
               <a:rPr lang="en-US" sz="1200" dirty="0" smtClean="0"/>
               <a:t>.</a:t>
             </a:r>
-            <a:endParaRPr lang="en-US" sz="1200" dirty="0" smtClean="0"/>
           </a:p>
           <a:p>
             <a:endParaRPr lang="en-US" sz="1200" dirty="0" smtClean="0"/>
@@ -15083,7 +15128,6 @@
               <a:rPr lang="en-US" sz="1200" dirty="0" smtClean="0"/>
               <a:t>.</a:t>
             </a:r>
-            <a:endParaRPr lang="en-US" sz="1200" dirty="0" smtClean="0"/>
           </a:p>
           <a:p>
             <a:endParaRPr lang="en-US" sz="1200" dirty="0" smtClean="0"/>
@@ -15135,6 +15179,134 @@
           </a:p>
         </p:txBody>
       </p:sp>
+      <p:pic>
+        <p:nvPicPr>
+          <p:cNvPr id="4098" name="Picture 2"/>
+          <p:cNvPicPr>
+            <a:picLocks noChangeAspect="1" noChangeArrowheads="1"/>
+          </p:cNvPicPr>
+          <p:nvPr/>
+        </p:nvPicPr>
+        <p:blipFill>
+          <a:blip r:embed="rId3" cstate="print"/>
+          <a:srcRect/>
+          <a:stretch>
+            <a:fillRect/>
+          </a:stretch>
+        </p:blipFill>
+        <p:spPr bwMode="auto">
+          <a:xfrm>
+            <a:off x="3563888" y="1131590"/>
+            <a:ext cx="1880667" cy="1429519"/>
+          </a:xfrm>
+          <a:prstGeom prst="rect">
+            <a:avLst/>
+          </a:prstGeom>
+          <a:noFill/>
+          <a:ln w="9525">
+            <a:noFill/>
+            <a:miter lim="800000"/>
+            <a:headEnd/>
+            <a:tailEnd/>
+          </a:ln>
+        </p:spPr>
+      </p:pic>
+      <p:pic>
+        <p:nvPicPr>
+          <p:cNvPr id="4099" name="Picture 3"/>
+          <p:cNvPicPr>
+            <a:picLocks noChangeAspect="1" noChangeArrowheads="1"/>
+          </p:cNvPicPr>
+          <p:nvPr/>
+        </p:nvPicPr>
+        <p:blipFill>
+          <a:blip r:embed="rId4" cstate="print"/>
+          <a:srcRect/>
+          <a:stretch>
+            <a:fillRect/>
+          </a:stretch>
+        </p:blipFill>
+        <p:spPr bwMode="auto">
+          <a:xfrm>
+            <a:off x="3779912" y="3219822"/>
+            <a:ext cx="2011909" cy="1291496"/>
+          </a:xfrm>
+          <a:prstGeom prst="rect">
+            <a:avLst/>
+          </a:prstGeom>
+          <a:noFill/>
+          <a:ln w="9525">
+            <a:noFill/>
+            <a:miter lim="800000"/>
+            <a:headEnd/>
+            <a:tailEnd/>
+          </a:ln>
+        </p:spPr>
+      </p:pic>
+      <p:pic>
+        <p:nvPicPr>
+          <p:cNvPr id="4100" name="Picture 4"/>
+          <p:cNvPicPr>
+            <a:picLocks noChangeAspect="1" noChangeArrowheads="1"/>
+          </p:cNvPicPr>
+          <p:nvPr/>
+        </p:nvPicPr>
+        <p:blipFill>
+          <a:blip r:embed="rId5" cstate="print"/>
+          <a:srcRect/>
+          <a:stretch>
+            <a:fillRect/>
+          </a:stretch>
+        </p:blipFill>
+        <p:spPr bwMode="auto">
+          <a:xfrm>
+            <a:off x="6588224" y="1131590"/>
+            <a:ext cx="2038946" cy="1541453"/>
+          </a:xfrm>
+          <a:prstGeom prst="rect">
+            <a:avLst/>
+          </a:prstGeom>
+          <a:noFill/>
+          <a:ln w="9525">
+            <a:noFill/>
+            <a:miter lim="800000"/>
+            <a:headEnd/>
+            <a:tailEnd/>
+          </a:ln>
+        </p:spPr>
+      </p:pic>
+      <p:pic>
+        <p:nvPicPr>
+          <p:cNvPr id="4101" name="Picture 5"/>
+          <p:cNvPicPr>
+            <a:picLocks noChangeAspect="1" noChangeArrowheads="1"/>
+          </p:cNvPicPr>
+          <p:nvPr/>
+        </p:nvPicPr>
+        <p:blipFill>
+          <a:blip r:embed="rId6" cstate="print"/>
+          <a:srcRect/>
+          <a:stretch>
+            <a:fillRect/>
+          </a:stretch>
+        </p:blipFill>
+        <p:spPr bwMode="auto">
+          <a:xfrm>
+            <a:off x="6516216" y="3075806"/>
+            <a:ext cx="1870369" cy="1331421"/>
+          </a:xfrm>
+          <a:prstGeom prst="rect">
+            <a:avLst/>
+          </a:prstGeom>
+          <a:noFill/>
+          <a:ln w="9525">
+            <a:noFill/>
+            <a:miter lim="800000"/>
+            <a:headEnd/>
+            <a:tailEnd/>
+          </a:ln>
+        </p:spPr>
+      </p:pic>
     </p:spTree>
   </p:cSld>
   <p:clrMapOvr>
@@ -15929,6 +16101,70 @@
           </a:p>
         </p:txBody>
       </p:sp>
+      <p:pic>
+        <p:nvPicPr>
+          <p:cNvPr id="3074" name="Picture 2"/>
+          <p:cNvPicPr>
+            <a:picLocks noChangeAspect="1" noChangeArrowheads="1"/>
+          </p:cNvPicPr>
+          <p:nvPr/>
+        </p:nvPicPr>
+        <p:blipFill>
+          <a:blip r:embed="rId3" cstate="print"/>
+          <a:srcRect/>
+          <a:stretch>
+            <a:fillRect/>
+          </a:stretch>
+        </p:blipFill>
+        <p:spPr bwMode="auto">
+          <a:xfrm>
+            <a:off x="6228184" y="843558"/>
+            <a:ext cx="2262632" cy="2376314"/>
+          </a:xfrm>
+          <a:prstGeom prst="rect">
+            <a:avLst/>
+          </a:prstGeom>
+          <a:noFill/>
+          <a:ln w="9525">
+            <a:noFill/>
+            <a:miter lim="800000"/>
+            <a:headEnd/>
+            <a:tailEnd/>
+          </a:ln>
+        </p:spPr>
+      </p:pic>
+      <p:pic>
+        <p:nvPicPr>
+          <p:cNvPr id="3075" name="Picture 3"/>
+          <p:cNvPicPr>
+            <a:picLocks noChangeAspect="1" noChangeArrowheads="1"/>
+          </p:cNvPicPr>
+          <p:nvPr/>
+        </p:nvPicPr>
+        <p:blipFill>
+          <a:blip r:embed="rId4" cstate="print"/>
+          <a:srcRect/>
+          <a:stretch>
+            <a:fillRect/>
+          </a:stretch>
+        </p:blipFill>
+        <p:spPr bwMode="auto">
+          <a:xfrm>
+            <a:off x="3707904" y="915566"/>
+            <a:ext cx="2232671" cy="2402780"/>
+          </a:xfrm>
+          <a:prstGeom prst="rect">
+            <a:avLst/>
+          </a:prstGeom>
+          <a:noFill/>
+          <a:ln w="9525">
+            <a:noFill/>
+            <a:miter lim="800000"/>
+            <a:headEnd/>
+            <a:tailEnd/>
+          </a:ln>
+        </p:spPr>
+      </p:pic>
     </p:spTree>
   </p:cSld>
   <p:clrMapOvr>
@@ -16707,6 +16943,102 @@
           </a:p>
         </p:txBody>
       </p:sp>
+      <p:pic>
+        <p:nvPicPr>
+          <p:cNvPr id="2050" name="Picture 2"/>
+          <p:cNvPicPr>
+            <a:picLocks noChangeAspect="1" noChangeArrowheads="1"/>
+          </p:cNvPicPr>
+          <p:nvPr/>
+        </p:nvPicPr>
+        <p:blipFill>
+          <a:blip r:embed="rId3" cstate="print"/>
+          <a:srcRect/>
+          <a:stretch>
+            <a:fillRect/>
+          </a:stretch>
+        </p:blipFill>
+        <p:spPr bwMode="auto">
+          <a:xfrm>
+            <a:off x="6372200" y="699543"/>
+            <a:ext cx="2413273" cy="1854026"/>
+          </a:xfrm>
+          <a:prstGeom prst="rect">
+            <a:avLst/>
+          </a:prstGeom>
+          <a:noFill/>
+          <a:ln w="9525">
+            <a:noFill/>
+            <a:miter lim="800000"/>
+            <a:headEnd/>
+            <a:tailEnd/>
+          </a:ln>
+        </p:spPr>
+      </p:pic>
+      <p:pic>
+        <p:nvPicPr>
+          <p:cNvPr id="2051" name="Picture 3"/>
+          <p:cNvPicPr>
+            <a:picLocks noChangeAspect="1" noChangeArrowheads="1"/>
+          </p:cNvPicPr>
+          <p:nvPr/>
+        </p:nvPicPr>
+        <p:blipFill>
+          <a:blip r:embed="rId4" cstate="print"/>
+          <a:srcRect/>
+          <a:stretch>
+            <a:fillRect/>
+          </a:stretch>
+        </p:blipFill>
+        <p:spPr bwMode="auto">
+          <a:xfrm>
+            <a:off x="6372200" y="2931790"/>
+            <a:ext cx="1956424" cy="1484958"/>
+          </a:xfrm>
+          <a:prstGeom prst="rect">
+            <a:avLst/>
+          </a:prstGeom>
+          <a:noFill/>
+          <a:ln w="9525">
+            <a:noFill/>
+            <a:miter lim="800000"/>
+            <a:headEnd/>
+            <a:tailEnd/>
+          </a:ln>
+        </p:spPr>
+      </p:pic>
+      <p:pic>
+        <p:nvPicPr>
+          <p:cNvPr id="2052" name="Picture 4"/>
+          <p:cNvPicPr>
+            <a:picLocks noChangeAspect="1" noChangeArrowheads="1"/>
+          </p:cNvPicPr>
+          <p:nvPr/>
+        </p:nvPicPr>
+        <p:blipFill>
+          <a:blip r:embed="rId5" cstate="print"/>
+          <a:srcRect/>
+          <a:stretch>
+            <a:fillRect/>
+          </a:stretch>
+        </p:blipFill>
+        <p:spPr bwMode="auto">
+          <a:xfrm>
+            <a:off x="3779912" y="1131590"/>
+            <a:ext cx="1960437" cy="2024633"/>
+          </a:xfrm>
+          <a:prstGeom prst="rect">
+            <a:avLst/>
+          </a:prstGeom>
+          <a:noFill/>
+          <a:ln w="9525">
+            <a:noFill/>
+            <a:miter lim="800000"/>
+            <a:headEnd/>
+            <a:tailEnd/>
+          </a:ln>
+        </p:spPr>
+      </p:pic>
     </p:spTree>
   </p:cSld>
   <p:clrMapOvr>

</xml_diff>

<commit_message>
chg: Updated OPAR INTREP 002 - Syrian IADS
</commit_message>
<xml_diff>
--- a/OPAR/INTREP VIS OPAR-002 - Syrian IADS.pptx
+++ b/OPAR/INTREP VIS OPAR-002 - Syrian IADS.pptx
@@ -5,7 +5,7 @@
     <p:sldMasterId id="2147483648" r:id="rId1"/>
   </p:sldMasterIdLst>
   <p:notesMasterIdLst>
-    <p:notesMasterId r:id="rId19"/>
+    <p:notesMasterId r:id="rId20"/>
   </p:notesMasterIdLst>
   <p:sldIdLst>
     <p:sldId id="257" r:id="rId2"/>
@@ -13,18 +13,19 @@
     <p:sldId id="362" r:id="rId4"/>
     <p:sldId id="366" r:id="rId5"/>
     <p:sldId id="367" r:id="rId6"/>
-    <p:sldId id="368" r:id="rId7"/>
-    <p:sldId id="369" r:id="rId8"/>
-    <p:sldId id="370" r:id="rId9"/>
-    <p:sldId id="371" r:id="rId10"/>
-    <p:sldId id="374" r:id="rId11"/>
-    <p:sldId id="373" r:id="rId12"/>
-    <p:sldId id="372" r:id="rId13"/>
-    <p:sldId id="375" r:id="rId14"/>
-    <p:sldId id="376" r:id="rId15"/>
-    <p:sldId id="377" r:id="rId16"/>
-    <p:sldId id="378" r:id="rId17"/>
-    <p:sldId id="365" r:id="rId18"/>
+    <p:sldId id="379" r:id="rId7"/>
+    <p:sldId id="368" r:id="rId8"/>
+    <p:sldId id="369" r:id="rId9"/>
+    <p:sldId id="370" r:id="rId10"/>
+    <p:sldId id="371" r:id="rId11"/>
+    <p:sldId id="374" r:id="rId12"/>
+    <p:sldId id="373" r:id="rId13"/>
+    <p:sldId id="372" r:id="rId14"/>
+    <p:sldId id="375" r:id="rId15"/>
+    <p:sldId id="376" r:id="rId16"/>
+    <p:sldId id="377" r:id="rId17"/>
+    <p:sldId id="378" r:id="rId18"/>
+    <p:sldId id="365" r:id="rId19"/>
   </p:sldIdLst>
   <p:sldSz cx="9144000" cy="5143500" type="screen16x9"/>
   <p:notesSz cx="6858000" cy="9144000"/>
@@ -209,7 +210,7 @@
             <a:fld id="{40637A30-8EE1-4060-9976-8832FC89EE34}" type="datetimeFigureOut">
               <a:rPr lang="nb-NO" smtClean="0"/>
               <a:pPr/>
-              <a:t>26.07.2020</a:t>
+              <a:t>31.07.2020</a:t>
             </a:fld>
             <a:endParaRPr lang="nb-NO"/>
           </a:p>
@@ -4250,7 +4251,7 @@
           <a:p>
             <a:r>
               <a:rPr lang="en-US" dirty="0" smtClean="0"/>
-              <a:t>AIR DEFENSE FIGHTERS</a:t>
+              <a:t>AWACS</a:t>
             </a:r>
             <a:endParaRPr lang="en-US" dirty="0"/>
           </a:p>
@@ -5032,7 +5033,7 @@
           <a:p>
             <a:r>
               <a:rPr lang="en-US" dirty="0" smtClean="0"/>
-              <a:t>IADS TACTICS</a:t>
+              <a:t>AIR DEFENSE FIGHTERS</a:t>
             </a:r>
             <a:endParaRPr lang="en-US" dirty="0"/>
           </a:p>
@@ -5695,56 +5696,24 @@
           <a:lstStyle/>
           <a:p>
             <a:r>
-              <a:rPr lang="en-US" sz="1050" dirty="0" smtClean="0"/>
-              <a:t>IADS Tactics</a:t>
-            </a:r>
-          </a:p>
-          <a:p>
-            <a:r>
-              <a:rPr lang="en-US" sz="1050" dirty="0" smtClean="0"/>
-              <a:t>###HARM </a:t>
-            </a:r>
-            <a:r>
-              <a:rPr lang="en-US" sz="1050" dirty="0" err="1" smtClean="0"/>
-              <a:t>defence</a:t>
-            </a:r>
-            <a:r>
-              <a:rPr lang="en-US" sz="1050" dirty="0" smtClean="0"/>
-              <a:t> SAM sites and EW radars will shut down their radars if they believe a HARM (High speed anti radiation missile) is heading for them. For this to happen, the SAM site has to detect the HARM missile with its radar.</a:t>
-            </a:r>
-          </a:p>
-          <a:p>
-            <a:r>
-              <a:rPr lang="en-US" sz="1050" dirty="0" smtClean="0"/>
-              <a:t>They will not shut down for each HARM launched in the air, but they will calculate if a missile is going to land close enough to their position, and if so, they will turn silent and stop feeding information to the HARM missile.</a:t>
-            </a:r>
-          </a:p>
-          <a:p>
-            <a:r>
-              <a:rPr lang="en-US" sz="1050" dirty="0" smtClean="0"/>
-              <a:t>###Point </a:t>
-            </a:r>
-            <a:r>
-              <a:rPr lang="en-US" sz="1050" dirty="0" err="1" smtClean="0"/>
-              <a:t>defence</a:t>
-            </a:r>
-            <a:r>
-              <a:rPr lang="en-US" sz="1050" dirty="0" smtClean="0"/>
-              <a:t> If an HARM was launched on an emitter, other friendly radars that are close enough can detect the missile incoming and intercept it with their own weapons. For this are required more modern radars, that can pick up the RCS of an HARM missiles. SA10 and SA15 are powerful enough to employ this tactic</a:t>
-            </a:r>
-          </a:p>
-          <a:p>
-            <a:r>
-              <a:rPr lang="en-US" sz="1050" dirty="0" smtClean="0"/>
-              <a:t>###Jamming IADS network can produce jamming to fight enemy sensors. But more </a:t>
-            </a:r>
-            <a:r>
-              <a:rPr lang="en-US" sz="1050" dirty="0" err="1" smtClean="0"/>
-              <a:t>intel</a:t>
-            </a:r>
-            <a:r>
-              <a:rPr lang="en-US" sz="1050" dirty="0" smtClean="0"/>
-              <a:t> is needed on this topic</a:t>
+              <a:rPr lang="en-US" sz="1200" dirty="0" smtClean="0"/>
+              <a:t>AWACS and Ships If they are integrated in the command structure and\or </a:t>
+            </a:r>
+            <a:r>
+              <a:rPr lang="en-US" sz="1200" dirty="0" err="1" smtClean="0"/>
+              <a:t>organisation</a:t>
+            </a:r>
+            <a:r>
+              <a:rPr lang="en-US" sz="1200" dirty="0" smtClean="0"/>
+              <a:t>, these entities can feed </a:t>
+            </a:r>
+            <a:r>
+              <a:rPr lang="en-US" sz="1200" dirty="0" err="1" smtClean="0"/>
+              <a:t>informations</a:t>
+            </a:r>
+            <a:r>
+              <a:rPr lang="en-US" sz="1200" dirty="0" smtClean="0"/>
+              <a:t> to the IADS through connection nodes..</a:t>
             </a:r>
           </a:p>
           <a:p>
@@ -5846,7 +5815,7 @@
           <a:p>
             <a:r>
               <a:rPr lang="en-US" dirty="0" smtClean="0"/>
-              <a:t>HOW TO NEUTRALIZE IADS</a:t>
+              <a:t>IADS TACTICS</a:t>
             </a:r>
             <a:endParaRPr lang="en-US" dirty="0"/>
           </a:p>
@@ -6504,67 +6473,61 @@
         </p:spPr>
         <p:txBody>
           <a:bodyPr wrap="square" rtlCol="0">
-            <a:normAutofit fontScale="77500" lnSpcReduction="20000"/>
+            <a:normAutofit/>
           </a:bodyPr>
           <a:lstStyle/>
           <a:p>
             <a:r>
-              <a:rPr lang="en-US" sz="1200" dirty="0" smtClean="0"/>
-              <a:t>How to </a:t>
-            </a:r>
-            <a:r>
-              <a:rPr lang="en-US" sz="1200" dirty="0" err="1" smtClean="0"/>
-              <a:t>neutralise</a:t>
-            </a:r>
-            <a:r>
-              <a:rPr lang="en-US" sz="1200" dirty="0" smtClean="0"/>
-              <a:t> the IADS SEAD and DEAD missions are key to work against this systems, but this is how to direct them.</a:t>
-            </a:r>
-          </a:p>
-          <a:p>
-            <a:r>
-              <a:rPr lang="en-US" sz="1200" dirty="0" smtClean="0"/>
-              <a:t>##Power Sources destruction Depending on the campaign ROE, the destruction of power plants could be allowed. Cutting power to the IADS will force all the SAM site to work autonomously, and being unable to feed each other </a:t>
-            </a:r>
-            <a:r>
-              <a:rPr lang="en-US" sz="1200" dirty="0" err="1" smtClean="0"/>
-              <a:t>informations</a:t>
-            </a:r>
-            <a:r>
-              <a:rPr lang="en-US" sz="1200" dirty="0" smtClean="0"/>
-              <a:t>, listen to EW, and coordinate with their command unit. This would result in all the SAMs turning on their sensors, and revealing all the information through the emitters.</a:t>
-            </a:r>
-          </a:p>
-          <a:p>
-            <a:r>
-              <a:rPr lang="en-US" sz="1200" dirty="0" smtClean="0"/>
-              <a:t>##Command Centre destruction Beheading the network will result in general disarray and inability to cooperate, and forcing local commanders to take decisions on their own. Most likely SAMs will operate autonomously, or do nothing during the wait for new orders</a:t>
-            </a:r>
-          </a:p>
-          <a:p>
-            <a:r>
-              <a:rPr lang="en-US" sz="1200" dirty="0" smtClean="0"/>
-              <a:t>##</a:t>
-            </a:r>
-            <a:r>
-              <a:rPr lang="en-US" sz="1200" dirty="0" err="1" smtClean="0"/>
-              <a:t>Comuncation</a:t>
-            </a:r>
-            <a:r>
-              <a:rPr lang="en-US" sz="1200" dirty="0" smtClean="0"/>
-              <a:t> Node Destruction If those are discovered and identified, the destruction of this nodes will degrade the ability of the IADS. Could force SAMs some connected via that node to function autonomously and not inside the network.</a:t>
-            </a:r>
-          </a:p>
-          <a:p>
-            <a:r>
-              <a:rPr lang="en-US" sz="1200" dirty="0" smtClean="0"/>
-              <a:t>##EW Radar destruction Blinding the IADS means that they will be forced to rely on other radars with less power, or worse positioning, creating blind spots where to operate freely. SAMs sites could be forced to turn their radar on to try to locate possible threats, giving away their position.</a:t>
-            </a:r>
-          </a:p>
-          <a:p>
-            <a:r>
-              <a:rPr lang="en-US" sz="1200" dirty="0" smtClean="0"/>
-              <a:t>##SAM destruction or suppression SAMs can be engaged with several HARMs or Standoff weapons. If a precise location is discovered, a precise standoff attack can be launched. With less information at hand, HARMs can be used to be launched on enemy radars, forcing them to turn off their emitters and go blind.</a:t>
+              <a:rPr lang="en-US" sz="1050" dirty="0" smtClean="0"/>
+              <a:t>IADS Tactics</a:t>
+            </a:r>
+          </a:p>
+          <a:p>
+            <a:r>
+              <a:rPr lang="en-US" sz="1050" dirty="0" smtClean="0"/>
+              <a:t>###HARM </a:t>
+            </a:r>
+            <a:r>
+              <a:rPr lang="en-US" sz="1050" dirty="0" err="1" smtClean="0"/>
+              <a:t>defence</a:t>
+            </a:r>
+            <a:r>
+              <a:rPr lang="en-US" sz="1050" dirty="0" smtClean="0"/>
+              <a:t> SAM sites and EW radars will shut down their radars if they believe a HARM (High speed anti radiation missile) is heading for them. For this to happen, the SAM site has to detect the HARM missile with its radar.</a:t>
+            </a:r>
+          </a:p>
+          <a:p>
+            <a:r>
+              <a:rPr lang="en-US" sz="1050" dirty="0" smtClean="0"/>
+              <a:t>They will not shut down for each HARM launched in the air, but they will calculate if a missile is going to land close enough to their position, and if so, they will turn silent and stop feeding information to the HARM missile.</a:t>
+            </a:r>
+          </a:p>
+          <a:p>
+            <a:r>
+              <a:rPr lang="en-US" sz="1050" dirty="0" smtClean="0"/>
+              <a:t>###Point </a:t>
+            </a:r>
+            <a:r>
+              <a:rPr lang="en-US" sz="1050" dirty="0" err="1" smtClean="0"/>
+              <a:t>defence</a:t>
+            </a:r>
+            <a:r>
+              <a:rPr lang="en-US" sz="1050" dirty="0" smtClean="0"/>
+              <a:t> If an HARM was launched on an emitter, other friendly radars that are close enough can detect the missile incoming and intercept it with their own weapons. For this are required more modern radars, that can pick up the RCS of an HARM missiles. SA10 and SA15 are powerful enough to employ this tactic</a:t>
+            </a:r>
+          </a:p>
+          <a:p>
+            <a:r>
+              <a:rPr lang="en-US" sz="1050" dirty="0" smtClean="0"/>
+              <a:t>###Jamming IADS network can produce jamming to fight enemy sensors. But more </a:t>
+            </a:r>
+            <a:r>
+              <a:rPr lang="en-US" sz="1050" dirty="0" err="1" smtClean="0"/>
+              <a:t>intel</a:t>
+            </a:r>
+            <a:r>
+              <a:rPr lang="en-US" sz="1050" dirty="0" smtClean="0"/>
+              <a:t> is needed on this topic</a:t>
             </a:r>
           </a:p>
           <a:p>
@@ -6666,7 +6629,7 @@
           <a:p>
             <a:r>
               <a:rPr lang="en-US" dirty="0" smtClean="0"/>
-              <a:t>SYRIAN IADS ORGANIZATION</a:t>
+              <a:t>HOW TO NEUTRALIZE IADS</a:t>
             </a:r>
             <a:endParaRPr lang="en-US" dirty="0"/>
           </a:p>
@@ -7324,22 +7287,67 @@
         </p:spPr>
         <p:txBody>
           <a:bodyPr wrap="square" rtlCol="0">
-            <a:normAutofit/>
+            <a:normAutofit fontScale="77500" lnSpcReduction="20000"/>
           </a:bodyPr>
           <a:lstStyle/>
           <a:p>
             <a:r>
               <a:rPr lang="en-US" sz="1200" dirty="0" smtClean="0"/>
-              <a:t>The Syrian IADS is organized in 3 separate regions: Syrian Air Defense Force Region North West (SYR ADFR NW), Syrian Air Defense Force Region North East (SYR ADFR NE) and Syrian Air Defense Region South (SYR ADFR S).</a:t>
-            </a:r>
-          </a:p>
-          <a:p>
-            <a:endParaRPr lang="en-US" sz="1200" dirty="0" smtClean="0"/>
-          </a:p>
-          <a:p>
+              <a:t>How to </a:t>
+            </a:r>
+            <a:r>
+              <a:rPr lang="en-US" sz="1200" dirty="0" err="1" smtClean="0"/>
+              <a:t>neutralise</a:t>
+            </a:r>
             <a:r>
               <a:rPr lang="en-US" sz="1200" dirty="0" smtClean="0"/>
-              <a:t>The Syrian IADS consist of a combination of Early Warning radars, SAMs and air defense fighters on ground alert (or airborne in CAPs).</a:t>
+              <a:t> the IADS SEAD and DEAD missions are key to work against this systems, but this is how to direct them.</a:t>
+            </a:r>
+          </a:p>
+          <a:p>
+            <a:r>
+              <a:rPr lang="en-US" sz="1200" dirty="0" smtClean="0"/>
+              <a:t>##Power Sources destruction Depending on the campaign ROE, the destruction of power plants could be allowed. Cutting power to the IADS will force all the SAM site to work autonomously, and being unable to feed each other </a:t>
+            </a:r>
+            <a:r>
+              <a:rPr lang="en-US" sz="1200" dirty="0" err="1" smtClean="0"/>
+              <a:t>informations</a:t>
+            </a:r>
+            <a:r>
+              <a:rPr lang="en-US" sz="1200" dirty="0" smtClean="0"/>
+              <a:t>, listen to EW, and coordinate with their command unit. This would result in all the SAMs turning on their sensors, and revealing all the information through the emitters.</a:t>
+            </a:r>
+          </a:p>
+          <a:p>
+            <a:r>
+              <a:rPr lang="en-US" sz="1200" dirty="0" smtClean="0"/>
+              <a:t>##Command Centre destruction Beheading the network will result in general disarray and inability to cooperate, and forcing local commanders to take decisions on their own. Most likely SAMs will operate autonomously, or do nothing during the wait for new orders</a:t>
+            </a:r>
+          </a:p>
+          <a:p>
+            <a:r>
+              <a:rPr lang="en-US" sz="1200" dirty="0" smtClean="0"/>
+              <a:t>##</a:t>
+            </a:r>
+            <a:r>
+              <a:rPr lang="en-US" sz="1200" dirty="0" err="1" smtClean="0"/>
+              <a:t>Comuncation</a:t>
+            </a:r>
+            <a:r>
+              <a:rPr lang="en-US" sz="1200" dirty="0" smtClean="0"/>
+              <a:t> Node Destruction If those are discovered and identified, the destruction of this nodes will degrade the ability of the IADS. Could force SAMs some connected via that node to function autonomously and not inside the network.</a:t>
+            </a:r>
+          </a:p>
+          <a:p>
+            <a:r>
+              <a:rPr lang="en-US" sz="1200" dirty="0" smtClean="0"/>
+              <a:t>##EW Radar destruction Blinding the IADS means that they will be forced to rely on other radars with less power, or worse positioning, creating blind spots where to operate freely. SAMs sites could be forced to turn their radar on to try to locate possible threats, giving away their position.</a:t>
+            </a:r>
+          </a:p>
+          <a:p>
+            <a:r>
+              <a:rPr lang="en-US" sz="1200" dirty="0" smtClean="0"/>
+              <a:t>##SAM destruction or suppression SAMs can be engaged with several HARMs or Standoff weapons. If a precise location is discovered, a precise standoff attack can be launched. With less information at hand, HARMs can be used to be launched on enemy radars, forcing them to turn off their emitters and go blind.</a:t>
             </a:r>
           </a:p>
           <a:p>
@@ -7392,32 +7400,6 @@
           </a:p>
         </p:txBody>
       </p:sp>
-      <p:pic>
-        <p:nvPicPr>
-          <p:cNvPr id="1026" name="Picture 2" descr="bilde"/>
-          <p:cNvPicPr>
-            <a:picLocks noChangeAspect="1" noChangeArrowheads="1"/>
-          </p:cNvPicPr>
-          <p:nvPr/>
-        </p:nvPicPr>
-        <p:blipFill>
-          <a:blip r:embed="rId3" cstate="print"/>
-          <a:srcRect/>
-          <a:stretch>
-            <a:fillRect/>
-          </a:stretch>
-        </p:blipFill>
-        <p:spPr bwMode="auto">
-          <a:xfrm>
-            <a:off x="3407580" y="1142990"/>
-            <a:ext cx="5258232" cy="2976513"/>
-          </a:xfrm>
-          <a:prstGeom prst="rect">
-            <a:avLst/>
-          </a:prstGeom>
-          <a:noFill/>
-        </p:spPr>
-      </p:pic>
     </p:spTree>
   </p:cSld>
   <p:clrMapOvr>
@@ -7467,7 +7449,7 @@
           <a:p>
             <a:r>
               <a:rPr lang="en-US" dirty="0" smtClean="0"/>
-              <a:t>SYR ADF REGION NORTH WEST</a:t>
+              <a:t>SYRIAN IADS ORGANIZATION</a:t>
             </a:r>
             <a:endParaRPr lang="en-US" dirty="0"/>
           </a:p>
@@ -8131,7 +8113,16 @@
           <a:p>
             <a:r>
               <a:rPr lang="en-US" sz="1200" dirty="0" smtClean="0"/>
-              <a:t>The Syrian IADS is organized in the following way:</a:t>
+              <a:t>The Syrian IADS is organized in 3 separate regions: Syrian Air Defense Force Region North West (SYR ADFR NW), Syrian Air Defense Force Region North East (SYR ADFR NE) and Syrian Air Defense Region South (SYR ADFR S).</a:t>
+            </a:r>
+          </a:p>
+          <a:p>
+            <a:endParaRPr lang="en-US" sz="1200" dirty="0" smtClean="0"/>
+          </a:p>
+          <a:p>
+            <a:r>
+              <a:rPr lang="en-US" sz="1200" dirty="0" smtClean="0"/>
+              <a:t>The Syrian IADS consist of a combination of Early Warning radars, SAMs and air defense fighters on ground alert (or airborne in CAPs).</a:t>
             </a:r>
           </a:p>
           <a:p>
@@ -8259,7 +8250,7 @@
           <a:p>
             <a:r>
               <a:rPr lang="en-US" dirty="0" smtClean="0"/>
-              <a:t>SYR ADF REGION NORTH EAST</a:t>
+              <a:t>SYR ADF REGION NORTH WEST</a:t>
             </a:r>
             <a:endParaRPr lang="en-US" dirty="0"/>
           </a:p>
@@ -9051,7 +9042,7 @@
           <a:p>
             <a:r>
               <a:rPr lang="en-US" dirty="0" smtClean="0"/>
-              <a:t>SYR ADF REGION SOUTH</a:t>
+              <a:t>SYR ADF REGION NORTH EAST</a:t>
             </a:r>
             <a:endParaRPr lang="en-US" dirty="0"/>
           </a:p>
@@ -9843,6 +9834,798 @@
           <a:p>
             <a:r>
               <a:rPr lang="en-US" dirty="0" smtClean="0"/>
+              <a:t>SYR ADF REGION SOUTH</a:t>
+            </a:r>
+            <a:endParaRPr lang="en-US" dirty="0"/>
+          </a:p>
+        </p:txBody>
+      </p:sp>
+      <p:sp>
+        <p:nvSpPr>
+          <p:cNvPr id="7" name="Ellipse 6"/>
+          <p:cNvSpPr/>
+          <p:nvPr/>
+        </p:nvSpPr>
+        <p:spPr>
+          <a:xfrm>
+            <a:off x="-928726" y="1000114"/>
+            <a:ext cx="214314" cy="214314"/>
+          </a:xfrm>
+          <a:prstGeom prst="ellipse">
+            <a:avLst/>
+          </a:prstGeom>
+          <a:solidFill>
+            <a:srgbClr val="C00000"/>
+          </a:solidFill>
+          <a:ln>
+            <a:solidFill>
+              <a:schemeClr val="tx1"/>
+            </a:solidFill>
+          </a:ln>
+        </p:spPr>
+        <p:style>
+          <a:lnRef idx="2">
+            <a:schemeClr val="accent1">
+              <a:shade val="50000"/>
+            </a:schemeClr>
+          </a:lnRef>
+          <a:fillRef idx="1">
+            <a:schemeClr val="accent1"/>
+          </a:fillRef>
+          <a:effectRef idx="0">
+            <a:schemeClr val="accent1"/>
+          </a:effectRef>
+          <a:fontRef idx="minor">
+            <a:schemeClr val="lt1"/>
+          </a:fontRef>
+        </p:style>
+        <p:txBody>
+          <a:bodyPr lIns="0" tIns="0" rIns="0" bIns="0" rtlCol="0" anchor="ctr"/>
+          <a:lstStyle/>
+          <a:p>
+            <a:pPr algn="ctr"/>
+            <a:r>
+              <a:rPr lang="nb-NO" sz="1200" dirty="0" smtClean="0"/>
+              <a:t>A</a:t>
+            </a:r>
+            <a:endParaRPr lang="nb-NO" sz="1200" dirty="0"/>
+          </a:p>
+        </p:txBody>
+      </p:sp>
+      <p:sp>
+        <p:nvSpPr>
+          <p:cNvPr id="8" name="Ellipse 7"/>
+          <p:cNvSpPr/>
+          <p:nvPr/>
+        </p:nvSpPr>
+        <p:spPr>
+          <a:xfrm>
+            <a:off x="-642974" y="1000114"/>
+            <a:ext cx="214314" cy="214314"/>
+          </a:xfrm>
+          <a:prstGeom prst="ellipse">
+            <a:avLst/>
+          </a:prstGeom>
+          <a:solidFill>
+            <a:srgbClr val="C00000"/>
+          </a:solidFill>
+          <a:ln>
+            <a:solidFill>
+              <a:schemeClr val="tx1"/>
+            </a:solidFill>
+          </a:ln>
+        </p:spPr>
+        <p:style>
+          <a:lnRef idx="2">
+            <a:schemeClr val="accent1">
+              <a:shade val="50000"/>
+            </a:schemeClr>
+          </a:lnRef>
+          <a:fillRef idx="1">
+            <a:schemeClr val="accent1"/>
+          </a:fillRef>
+          <a:effectRef idx="0">
+            <a:schemeClr val="accent1"/>
+          </a:effectRef>
+          <a:fontRef idx="minor">
+            <a:schemeClr val="lt1"/>
+          </a:fontRef>
+        </p:style>
+        <p:txBody>
+          <a:bodyPr lIns="0" tIns="0" rIns="0" bIns="0" rtlCol="0" anchor="ctr"/>
+          <a:lstStyle/>
+          <a:p>
+            <a:pPr algn="ctr"/>
+            <a:r>
+              <a:rPr lang="nb-NO" sz="1200" dirty="0" smtClean="0"/>
+              <a:t>A</a:t>
+            </a:r>
+            <a:endParaRPr lang="nb-NO" sz="1200" dirty="0"/>
+          </a:p>
+        </p:txBody>
+      </p:sp>
+      <p:sp>
+        <p:nvSpPr>
+          <p:cNvPr id="9" name="Ellipse 8"/>
+          <p:cNvSpPr/>
+          <p:nvPr/>
+        </p:nvSpPr>
+        <p:spPr>
+          <a:xfrm>
+            <a:off x="-928726" y="1285866"/>
+            <a:ext cx="214314" cy="214314"/>
+          </a:xfrm>
+          <a:prstGeom prst="ellipse">
+            <a:avLst/>
+          </a:prstGeom>
+          <a:solidFill>
+            <a:srgbClr val="C00000"/>
+          </a:solidFill>
+          <a:ln>
+            <a:solidFill>
+              <a:schemeClr val="tx1"/>
+            </a:solidFill>
+          </a:ln>
+        </p:spPr>
+        <p:style>
+          <a:lnRef idx="2">
+            <a:schemeClr val="accent1">
+              <a:shade val="50000"/>
+            </a:schemeClr>
+          </a:lnRef>
+          <a:fillRef idx="1">
+            <a:schemeClr val="accent1"/>
+          </a:fillRef>
+          <a:effectRef idx="0">
+            <a:schemeClr val="accent1"/>
+          </a:effectRef>
+          <a:fontRef idx="minor">
+            <a:schemeClr val="lt1"/>
+          </a:fontRef>
+        </p:style>
+        <p:txBody>
+          <a:bodyPr lIns="0" tIns="0" rIns="0" bIns="0" rtlCol="0" anchor="ctr"/>
+          <a:lstStyle/>
+          <a:p>
+            <a:pPr algn="ctr"/>
+            <a:r>
+              <a:rPr lang="nb-NO" sz="1200" dirty="0" smtClean="0"/>
+              <a:t>B</a:t>
+            </a:r>
+            <a:endParaRPr lang="nb-NO" sz="1200" dirty="0"/>
+          </a:p>
+        </p:txBody>
+      </p:sp>
+      <p:sp>
+        <p:nvSpPr>
+          <p:cNvPr id="10" name="Ellipse 9"/>
+          <p:cNvSpPr/>
+          <p:nvPr/>
+        </p:nvSpPr>
+        <p:spPr>
+          <a:xfrm>
+            <a:off x="-642974" y="1285866"/>
+            <a:ext cx="214314" cy="214314"/>
+          </a:xfrm>
+          <a:prstGeom prst="ellipse">
+            <a:avLst/>
+          </a:prstGeom>
+          <a:solidFill>
+            <a:srgbClr val="C00000"/>
+          </a:solidFill>
+          <a:ln>
+            <a:solidFill>
+              <a:schemeClr val="tx1"/>
+            </a:solidFill>
+          </a:ln>
+        </p:spPr>
+        <p:style>
+          <a:lnRef idx="2">
+            <a:schemeClr val="accent1">
+              <a:shade val="50000"/>
+            </a:schemeClr>
+          </a:lnRef>
+          <a:fillRef idx="1">
+            <a:schemeClr val="accent1"/>
+          </a:fillRef>
+          <a:effectRef idx="0">
+            <a:schemeClr val="accent1"/>
+          </a:effectRef>
+          <a:fontRef idx="minor">
+            <a:schemeClr val="lt1"/>
+          </a:fontRef>
+        </p:style>
+        <p:txBody>
+          <a:bodyPr lIns="0" tIns="0" rIns="0" bIns="0" rtlCol="0" anchor="ctr"/>
+          <a:lstStyle/>
+          <a:p>
+            <a:pPr algn="ctr"/>
+            <a:r>
+              <a:rPr lang="nb-NO" sz="1200" dirty="0" smtClean="0"/>
+              <a:t>B</a:t>
+            </a:r>
+            <a:endParaRPr lang="nb-NO" sz="1200" dirty="0"/>
+          </a:p>
+        </p:txBody>
+      </p:sp>
+      <p:sp>
+        <p:nvSpPr>
+          <p:cNvPr id="11" name="Ellipse 10"/>
+          <p:cNvSpPr/>
+          <p:nvPr/>
+        </p:nvSpPr>
+        <p:spPr>
+          <a:xfrm>
+            <a:off x="-928726" y="1571618"/>
+            <a:ext cx="214314" cy="214314"/>
+          </a:xfrm>
+          <a:prstGeom prst="ellipse">
+            <a:avLst/>
+          </a:prstGeom>
+          <a:solidFill>
+            <a:srgbClr val="C00000"/>
+          </a:solidFill>
+          <a:ln>
+            <a:solidFill>
+              <a:schemeClr val="tx1"/>
+            </a:solidFill>
+          </a:ln>
+        </p:spPr>
+        <p:style>
+          <a:lnRef idx="2">
+            <a:schemeClr val="accent1">
+              <a:shade val="50000"/>
+            </a:schemeClr>
+          </a:lnRef>
+          <a:fillRef idx="1">
+            <a:schemeClr val="accent1"/>
+          </a:fillRef>
+          <a:effectRef idx="0">
+            <a:schemeClr val="accent1"/>
+          </a:effectRef>
+          <a:fontRef idx="minor">
+            <a:schemeClr val="lt1"/>
+          </a:fontRef>
+        </p:style>
+        <p:txBody>
+          <a:bodyPr lIns="0" tIns="0" rIns="0" bIns="0" rtlCol="0" anchor="ctr"/>
+          <a:lstStyle/>
+          <a:p>
+            <a:pPr algn="ctr"/>
+            <a:r>
+              <a:rPr lang="nb-NO" sz="1200" dirty="0" smtClean="0"/>
+              <a:t>C</a:t>
+            </a:r>
+            <a:endParaRPr lang="nb-NO" sz="1200" dirty="0"/>
+          </a:p>
+        </p:txBody>
+      </p:sp>
+      <p:sp>
+        <p:nvSpPr>
+          <p:cNvPr id="12" name="Ellipse 11"/>
+          <p:cNvSpPr/>
+          <p:nvPr/>
+        </p:nvSpPr>
+        <p:spPr>
+          <a:xfrm>
+            <a:off x="-642974" y="1571618"/>
+            <a:ext cx="214314" cy="214314"/>
+          </a:xfrm>
+          <a:prstGeom prst="ellipse">
+            <a:avLst/>
+          </a:prstGeom>
+          <a:solidFill>
+            <a:srgbClr val="C00000"/>
+          </a:solidFill>
+          <a:ln>
+            <a:solidFill>
+              <a:schemeClr val="tx1"/>
+            </a:solidFill>
+          </a:ln>
+        </p:spPr>
+        <p:style>
+          <a:lnRef idx="2">
+            <a:schemeClr val="accent1">
+              <a:shade val="50000"/>
+            </a:schemeClr>
+          </a:lnRef>
+          <a:fillRef idx="1">
+            <a:schemeClr val="accent1"/>
+          </a:fillRef>
+          <a:effectRef idx="0">
+            <a:schemeClr val="accent1"/>
+          </a:effectRef>
+          <a:fontRef idx="minor">
+            <a:schemeClr val="lt1"/>
+          </a:fontRef>
+        </p:style>
+        <p:txBody>
+          <a:bodyPr lIns="0" tIns="0" rIns="0" bIns="0" rtlCol="0" anchor="ctr"/>
+          <a:lstStyle/>
+          <a:p>
+            <a:pPr algn="ctr"/>
+            <a:r>
+              <a:rPr lang="nb-NO" sz="1200" dirty="0" smtClean="0"/>
+              <a:t>C</a:t>
+            </a:r>
+            <a:endParaRPr lang="nb-NO" sz="1200" dirty="0"/>
+          </a:p>
+        </p:txBody>
+      </p:sp>
+      <p:sp>
+        <p:nvSpPr>
+          <p:cNvPr id="13" name="Ellipse 12"/>
+          <p:cNvSpPr/>
+          <p:nvPr/>
+        </p:nvSpPr>
+        <p:spPr>
+          <a:xfrm>
+            <a:off x="-928726" y="1857370"/>
+            <a:ext cx="214314" cy="214314"/>
+          </a:xfrm>
+          <a:prstGeom prst="ellipse">
+            <a:avLst/>
+          </a:prstGeom>
+          <a:solidFill>
+            <a:srgbClr val="C00000"/>
+          </a:solidFill>
+          <a:ln>
+            <a:solidFill>
+              <a:schemeClr val="tx1"/>
+            </a:solidFill>
+          </a:ln>
+        </p:spPr>
+        <p:style>
+          <a:lnRef idx="2">
+            <a:schemeClr val="accent1">
+              <a:shade val="50000"/>
+            </a:schemeClr>
+          </a:lnRef>
+          <a:fillRef idx="1">
+            <a:schemeClr val="accent1"/>
+          </a:fillRef>
+          <a:effectRef idx="0">
+            <a:schemeClr val="accent1"/>
+          </a:effectRef>
+          <a:fontRef idx="minor">
+            <a:schemeClr val="lt1"/>
+          </a:fontRef>
+        </p:style>
+        <p:txBody>
+          <a:bodyPr lIns="0" tIns="0" rIns="0" bIns="0" rtlCol="0" anchor="ctr"/>
+          <a:lstStyle/>
+          <a:p>
+            <a:pPr algn="ctr"/>
+            <a:r>
+              <a:rPr lang="nb-NO" sz="1200" dirty="0" smtClean="0"/>
+              <a:t>D</a:t>
+            </a:r>
+            <a:endParaRPr lang="nb-NO" sz="1200" dirty="0"/>
+          </a:p>
+        </p:txBody>
+      </p:sp>
+      <p:sp>
+        <p:nvSpPr>
+          <p:cNvPr id="14" name="Ellipse 13"/>
+          <p:cNvSpPr/>
+          <p:nvPr/>
+        </p:nvSpPr>
+        <p:spPr>
+          <a:xfrm>
+            <a:off x="-642974" y="1857370"/>
+            <a:ext cx="214314" cy="214314"/>
+          </a:xfrm>
+          <a:prstGeom prst="ellipse">
+            <a:avLst/>
+          </a:prstGeom>
+          <a:solidFill>
+            <a:srgbClr val="C00000"/>
+          </a:solidFill>
+          <a:ln>
+            <a:solidFill>
+              <a:schemeClr val="tx1"/>
+            </a:solidFill>
+          </a:ln>
+        </p:spPr>
+        <p:style>
+          <a:lnRef idx="2">
+            <a:schemeClr val="accent1">
+              <a:shade val="50000"/>
+            </a:schemeClr>
+          </a:lnRef>
+          <a:fillRef idx="1">
+            <a:schemeClr val="accent1"/>
+          </a:fillRef>
+          <a:effectRef idx="0">
+            <a:schemeClr val="accent1"/>
+          </a:effectRef>
+          <a:fontRef idx="minor">
+            <a:schemeClr val="lt1"/>
+          </a:fontRef>
+        </p:style>
+        <p:txBody>
+          <a:bodyPr lIns="0" tIns="0" rIns="0" bIns="0" rtlCol="0" anchor="ctr"/>
+          <a:lstStyle/>
+          <a:p>
+            <a:pPr algn="ctr"/>
+            <a:r>
+              <a:rPr lang="nb-NO" sz="1200" dirty="0" smtClean="0"/>
+              <a:t>D</a:t>
+            </a:r>
+            <a:endParaRPr lang="nb-NO" sz="1200" dirty="0"/>
+          </a:p>
+        </p:txBody>
+      </p:sp>
+      <p:sp>
+        <p:nvSpPr>
+          <p:cNvPr id="15" name="Ellipse 14"/>
+          <p:cNvSpPr/>
+          <p:nvPr/>
+        </p:nvSpPr>
+        <p:spPr>
+          <a:xfrm>
+            <a:off x="-928726" y="2143122"/>
+            <a:ext cx="214314" cy="214314"/>
+          </a:xfrm>
+          <a:prstGeom prst="ellipse">
+            <a:avLst/>
+          </a:prstGeom>
+          <a:solidFill>
+            <a:srgbClr val="C00000"/>
+          </a:solidFill>
+          <a:ln>
+            <a:solidFill>
+              <a:schemeClr val="tx1"/>
+            </a:solidFill>
+          </a:ln>
+        </p:spPr>
+        <p:style>
+          <a:lnRef idx="2">
+            <a:schemeClr val="accent1">
+              <a:shade val="50000"/>
+            </a:schemeClr>
+          </a:lnRef>
+          <a:fillRef idx="1">
+            <a:schemeClr val="accent1"/>
+          </a:fillRef>
+          <a:effectRef idx="0">
+            <a:schemeClr val="accent1"/>
+          </a:effectRef>
+          <a:fontRef idx="minor">
+            <a:schemeClr val="lt1"/>
+          </a:fontRef>
+        </p:style>
+        <p:txBody>
+          <a:bodyPr lIns="0" tIns="0" rIns="0" bIns="0" rtlCol="0" anchor="ctr"/>
+          <a:lstStyle/>
+          <a:p>
+            <a:pPr algn="ctr"/>
+            <a:r>
+              <a:rPr lang="nb-NO" sz="1200" dirty="0" smtClean="0"/>
+              <a:t>E</a:t>
+            </a:r>
+            <a:endParaRPr lang="nb-NO" sz="1200" dirty="0"/>
+          </a:p>
+        </p:txBody>
+      </p:sp>
+      <p:sp>
+        <p:nvSpPr>
+          <p:cNvPr id="16" name="Ellipse 15"/>
+          <p:cNvSpPr/>
+          <p:nvPr/>
+        </p:nvSpPr>
+        <p:spPr>
+          <a:xfrm>
+            <a:off x="-642974" y="2143122"/>
+            <a:ext cx="214314" cy="214314"/>
+          </a:xfrm>
+          <a:prstGeom prst="ellipse">
+            <a:avLst/>
+          </a:prstGeom>
+          <a:solidFill>
+            <a:srgbClr val="C00000"/>
+          </a:solidFill>
+          <a:ln>
+            <a:solidFill>
+              <a:schemeClr val="tx1"/>
+            </a:solidFill>
+          </a:ln>
+        </p:spPr>
+        <p:style>
+          <a:lnRef idx="2">
+            <a:schemeClr val="accent1">
+              <a:shade val="50000"/>
+            </a:schemeClr>
+          </a:lnRef>
+          <a:fillRef idx="1">
+            <a:schemeClr val="accent1"/>
+          </a:fillRef>
+          <a:effectRef idx="0">
+            <a:schemeClr val="accent1"/>
+          </a:effectRef>
+          <a:fontRef idx="minor">
+            <a:schemeClr val="lt1"/>
+          </a:fontRef>
+        </p:style>
+        <p:txBody>
+          <a:bodyPr lIns="0" tIns="0" rIns="0" bIns="0" rtlCol="0" anchor="ctr"/>
+          <a:lstStyle/>
+          <a:p>
+            <a:pPr algn="ctr"/>
+            <a:r>
+              <a:rPr lang="nb-NO" sz="1200" dirty="0" smtClean="0"/>
+              <a:t>E</a:t>
+            </a:r>
+            <a:endParaRPr lang="nb-NO" sz="1200" dirty="0"/>
+          </a:p>
+        </p:txBody>
+      </p:sp>
+      <p:sp>
+        <p:nvSpPr>
+          <p:cNvPr id="17" name="Ellipse 16"/>
+          <p:cNvSpPr/>
+          <p:nvPr/>
+        </p:nvSpPr>
+        <p:spPr>
+          <a:xfrm>
+            <a:off x="-928726" y="2428874"/>
+            <a:ext cx="214314" cy="214314"/>
+          </a:xfrm>
+          <a:prstGeom prst="ellipse">
+            <a:avLst/>
+          </a:prstGeom>
+          <a:solidFill>
+            <a:srgbClr val="C00000"/>
+          </a:solidFill>
+          <a:ln>
+            <a:solidFill>
+              <a:schemeClr val="tx1"/>
+            </a:solidFill>
+          </a:ln>
+        </p:spPr>
+        <p:style>
+          <a:lnRef idx="2">
+            <a:schemeClr val="accent1">
+              <a:shade val="50000"/>
+            </a:schemeClr>
+          </a:lnRef>
+          <a:fillRef idx="1">
+            <a:schemeClr val="accent1"/>
+          </a:fillRef>
+          <a:effectRef idx="0">
+            <a:schemeClr val="accent1"/>
+          </a:effectRef>
+          <a:fontRef idx="minor">
+            <a:schemeClr val="lt1"/>
+          </a:fontRef>
+        </p:style>
+        <p:txBody>
+          <a:bodyPr lIns="0" tIns="0" rIns="0" bIns="0" rtlCol="0" anchor="ctr"/>
+          <a:lstStyle/>
+          <a:p>
+            <a:pPr algn="ctr"/>
+            <a:r>
+              <a:rPr lang="nb-NO" sz="1200" dirty="0" smtClean="0"/>
+              <a:t>F</a:t>
+            </a:r>
+            <a:endParaRPr lang="nb-NO" sz="1200" dirty="0"/>
+          </a:p>
+        </p:txBody>
+      </p:sp>
+      <p:sp>
+        <p:nvSpPr>
+          <p:cNvPr id="18" name="Ellipse 17"/>
+          <p:cNvSpPr/>
+          <p:nvPr/>
+        </p:nvSpPr>
+        <p:spPr>
+          <a:xfrm>
+            <a:off x="-642974" y="2428874"/>
+            <a:ext cx="214314" cy="214314"/>
+          </a:xfrm>
+          <a:prstGeom prst="ellipse">
+            <a:avLst/>
+          </a:prstGeom>
+          <a:solidFill>
+            <a:srgbClr val="C00000"/>
+          </a:solidFill>
+          <a:ln>
+            <a:solidFill>
+              <a:schemeClr val="tx1"/>
+            </a:solidFill>
+          </a:ln>
+        </p:spPr>
+        <p:style>
+          <a:lnRef idx="2">
+            <a:schemeClr val="accent1">
+              <a:shade val="50000"/>
+            </a:schemeClr>
+          </a:lnRef>
+          <a:fillRef idx="1">
+            <a:schemeClr val="accent1"/>
+          </a:fillRef>
+          <a:effectRef idx="0">
+            <a:schemeClr val="accent1"/>
+          </a:effectRef>
+          <a:fontRef idx="minor">
+            <a:schemeClr val="lt1"/>
+          </a:fontRef>
+        </p:style>
+        <p:txBody>
+          <a:bodyPr lIns="0" tIns="0" rIns="0" bIns="0" rtlCol="0" anchor="ctr"/>
+          <a:lstStyle/>
+          <a:p>
+            <a:pPr algn="ctr"/>
+            <a:r>
+              <a:rPr lang="nb-NO" sz="1200" dirty="0" smtClean="0"/>
+              <a:t>F</a:t>
+            </a:r>
+            <a:endParaRPr lang="nb-NO" sz="1200" dirty="0"/>
+          </a:p>
+        </p:txBody>
+      </p:sp>
+      <p:sp>
+        <p:nvSpPr>
+          <p:cNvPr id="19" name="TekstSylinder 18"/>
+          <p:cNvSpPr txBox="1"/>
+          <p:nvPr/>
+        </p:nvSpPr>
+        <p:spPr>
+          <a:xfrm>
+            <a:off x="142844" y="785800"/>
+            <a:ext cx="3214678" cy="4071966"/>
+          </a:xfrm>
+          <a:prstGeom prst="rect">
+            <a:avLst/>
+          </a:prstGeom>
+          <a:solidFill>
+            <a:schemeClr val="accent1">
+              <a:lumMod val="20000"/>
+              <a:lumOff val="80000"/>
+            </a:schemeClr>
+          </a:solidFill>
+          <a:ln>
+            <a:solidFill>
+              <a:schemeClr val="tx1"/>
+            </a:solidFill>
+          </a:ln>
+        </p:spPr>
+        <p:txBody>
+          <a:bodyPr wrap="square" rtlCol="0">
+            <a:normAutofit/>
+          </a:bodyPr>
+          <a:lstStyle/>
+          <a:p>
+            <a:r>
+              <a:rPr lang="en-US" sz="1200" dirty="0" smtClean="0"/>
+              <a:t>The Syrian IADS is organized in the following way:</a:t>
+            </a:r>
+          </a:p>
+          <a:p>
+            <a:endParaRPr lang="en-US" sz="1200" dirty="0" smtClean="0"/>
+          </a:p>
+          <a:p>
+            <a:endParaRPr lang="en-US" sz="1200" dirty="0" smtClean="0"/>
+          </a:p>
+          <a:p>
+            <a:endParaRPr lang="nb-NO" sz="1200" dirty="0" smtClean="0">
+              <a:latin typeface="Arial" pitchFamily="34" charset="0"/>
+              <a:cs typeface="Arial" pitchFamily="34" charset="0"/>
+            </a:endParaRPr>
+          </a:p>
+        </p:txBody>
+      </p:sp>
+      <p:sp>
+        <p:nvSpPr>
+          <p:cNvPr id="20" name="Rektangel 19"/>
+          <p:cNvSpPr/>
+          <p:nvPr/>
+        </p:nvSpPr>
+        <p:spPr>
+          <a:xfrm>
+            <a:off x="8446373" y="4643452"/>
+            <a:ext cx="697627" cy="369332"/>
+          </a:xfrm>
+          <a:prstGeom prst="rect">
+            <a:avLst/>
+          </a:prstGeom>
+        </p:spPr>
+        <p:txBody>
+          <a:bodyPr wrap="none">
+            <a:spAutoFit/>
+          </a:bodyPr>
+          <a:lstStyle/>
+          <a:p>
+            <a:r>
+              <a:rPr lang="nb-NO" dirty="0" smtClean="0">
+                <a:latin typeface="Arial" pitchFamily="34" charset="0"/>
+                <a:cs typeface="Arial" pitchFamily="34" charset="0"/>
+                <a:hlinkClick r:id="rId2" action="ppaction://hlinksldjump"/>
+              </a:rPr>
+              <a:t>Back</a:t>
+            </a:r>
+            <a:endParaRPr lang="nb-NO" dirty="0" smtClean="0">
+              <a:latin typeface="Arial" pitchFamily="34" charset="0"/>
+              <a:cs typeface="Arial" pitchFamily="34" charset="0"/>
+            </a:endParaRPr>
+          </a:p>
+        </p:txBody>
+      </p:sp>
+      <p:pic>
+        <p:nvPicPr>
+          <p:cNvPr id="1026" name="Picture 2" descr="bilde"/>
+          <p:cNvPicPr>
+            <a:picLocks noChangeAspect="1" noChangeArrowheads="1"/>
+          </p:cNvPicPr>
+          <p:nvPr/>
+        </p:nvPicPr>
+        <p:blipFill>
+          <a:blip r:embed="rId3" cstate="print"/>
+          <a:srcRect/>
+          <a:stretch>
+            <a:fillRect/>
+          </a:stretch>
+        </p:blipFill>
+        <p:spPr bwMode="auto">
+          <a:xfrm>
+            <a:off x="3407580" y="1142990"/>
+            <a:ext cx="5258232" cy="2976513"/>
+          </a:xfrm>
+          <a:prstGeom prst="rect">
+            <a:avLst/>
+          </a:prstGeom>
+          <a:noFill/>
+        </p:spPr>
+      </p:pic>
+    </p:spTree>
+  </p:cSld>
+  <p:clrMapOvr>
+    <a:masterClrMapping/>
+  </p:clrMapOvr>
+  <p:timing>
+    <p:tnLst>
+      <p:par>
+        <p:cTn id="1" dur="indefinite" restart="never" nodeType="tmRoot"/>
+      </p:par>
+    </p:tnLst>
+  </p:timing>
+</p:sld>
+</file>
+
+<file path=ppt/slides/slide18.xml><?xml version="1.0" encoding="utf-8"?>
+<p:sld xmlns:a="http://schemas.openxmlformats.org/drawingml/2006/main" xmlns:r="http://schemas.openxmlformats.org/officeDocument/2006/relationships" xmlns:p="http://schemas.openxmlformats.org/presentationml/2006/main">
+  <p:cSld>
+    <p:spTree>
+      <p:nvGrpSpPr>
+        <p:cNvPr id="1" name=""/>
+        <p:cNvGrpSpPr/>
+        <p:nvPr/>
+      </p:nvGrpSpPr>
+      <p:grpSpPr>
+        <a:xfrm>
+          <a:off x="0" y="0"/>
+          <a:ext cx="0" cy="0"/>
+          <a:chOff x="0" y="0"/>
+          <a:chExt cx="0" cy="0"/>
+        </a:xfrm>
+      </p:grpSpPr>
+      <p:sp>
+        <p:nvSpPr>
+          <p:cNvPr id="2" name="Tittel 1"/>
+          <p:cNvSpPr>
+            <a:spLocks noGrp="1"/>
+          </p:cNvSpPr>
+          <p:nvPr>
+            <p:ph type="title"/>
+          </p:nvPr>
+        </p:nvSpPr>
+        <p:spPr/>
+        <p:txBody>
+          <a:bodyPr/>
+          <a:lstStyle/>
+          <a:p>
+            <a:r>
+              <a:rPr lang="en-US" dirty="0" smtClean="0"/>
               <a:t>INTELLIGENCE GAPS</a:t>
             </a:r>
             <a:endParaRPr lang="en-US" dirty="0"/>
@@ -12564,7 +13347,7 @@
         <p:spPr>
           <a:xfrm>
             <a:off x="142844" y="785800"/>
-            <a:ext cx="3214678" cy="4071966"/>
+            <a:ext cx="3421044" cy="4071966"/>
           </a:xfrm>
           <a:prstGeom prst="rect">
             <a:avLst/>
@@ -12583,37 +13366,148 @@
         </p:spPr>
         <p:txBody>
           <a:bodyPr wrap="square" rtlCol="0">
-            <a:normAutofit/>
+            <a:normAutofit lnSpcReduction="10000"/>
           </a:bodyPr>
           <a:lstStyle/>
           <a:p>
             <a:r>
-              <a:rPr lang="en-US" sz="1200" dirty="0" smtClean="0"/>
-              <a:t>IADS</a:t>
-            </a:r>
-          </a:p>
-          <a:p>
-            <a:r>
-              <a:rPr lang="en-US" sz="1200" dirty="0" smtClean="0"/>
-              <a:t>An Integrated Air </a:t>
-            </a:r>
-            <a:r>
-              <a:rPr lang="en-US" sz="1200" dirty="0" err="1" smtClean="0"/>
+              <a:rPr lang="en-US" sz="1000" dirty="0" smtClean="0"/>
+              <a:t>An </a:t>
+            </a:r>
+            <a:r>
+              <a:rPr lang="en-US" sz="1000" dirty="0" smtClean="0"/>
+              <a:t>Integrated Air </a:t>
+            </a:r>
+            <a:r>
+              <a:rPr lang="en-US" sz="1000" dirty="0" err="1" smtClean="0"/>
               <a:t>Defence</a:t>
             </a:r>
             <a:r>
-              <a:rPr lang="en-US" sz="1200" dirty="0" smtClean="0"/>
-              <a:t> System is a wide network of surface-to-air forces that work together to defend the skies of a specific area. The system is also connected to the QRA fighters that can be scrambled toward incoming threats.  </a:t>
-            </a:r>
+              <a:rPr lang="en-US" sz="1000" dirty="0" smtClean="0"/>
+              <a:t> System </a:t>
+            </a:r>
+            <a:r>
+              <a:rPr lang="en-US" sz="1000" dirty="0" smtClean="0"/>
+              <a:t> (IADS) is </a:t>
+            </a:r>
+            <a:r>
+              <a:rPr lang="en-US" sz="1000" dirty="0" smtClean="0"/>
+              <a:t>a wide network of surface-to-air forces that work together to defend the skies of a specific area. The system is also connected to the </a:t>
+            </a:r>
+            <a:r>
+              <a:rPr lang="en-US" sz="1000" dirty="0" smtClean="0"/>
+              <a:t>fighter aircraft in the A-A role either in a airborne CAP or intercept aircraft on ground alert </a:t>
+            </a:r>
+            <a:r>
+              <a:rPr lang="en-US" sz="1000" dirty="0" smtClean="0"/>
+              <a:t>that can be scrambled toward incoming threats.  </a:t>
+            </a:r>
+          </a:p>
+          <a:p>
+            <a:endParaRPr lang="en-US" sz="1000" dirty="0" smtClean="0"/>
+          </a:p>
+          <a:p>
+            <a:r>
+              <a:rPr lang="en-US" sz="1000" dirty="0" smtClean="0"/>
+              <a:t>There are several elements that are part of this network, </a:t>
+            </a:r>
+            <a:r>
+              <a:rPr lang="en-US" sz="1000" dirty="0" smtClean="0"/>
+              <a:t>which all will be explained more in detail in the next slides:</a:t>
+            </a:r>
+          </a:p>
+          <a:p>
+            <a:pPr>
+              <a:buFont typeface="Arial" pitchFamily="34" charset="0"/>
+              <a:buChar char="•"/>
+            </a:pPr>
+            <a:r>
+              <a:rPr lang="en-US" sz="1000" dirty="0" smtClean="0"/>
+              <a:t>Command Centre</a:t>
+            </a:r>
+          </a:p>
+          <a:p>
+            <a:pPr>
+              <a:buFont typeface="Arial" pitchFamily="34" charset="0"/>
+              <a:buChar char="•"/>
+            </a:pPr>
+            <a:r>
+              <a:rPr lang="en-US" sz="1000" dirty="0" smtClean="0"/>
+              <a:t>Early Warning Radar (EWR)</a:t>
+            </a:r>
+          </a:p>
+          <a:p>
+            <a:pPr>
+              <a:buFont typeface="Arial" pitchFamily="34" charset="0"/>
+              <a:buChar char="•"/>
+            </a:pPr>
+            <a:r>
+              <a:rPr lang="en-US" sz="1000" dirty="0" smtClean="0"/>
+              <a:t>SAM Site</a:t>
+            </a:r>
+          </a:p>
+          <a:p>
+            <a:pPr>
+              <a:buFont typeface="Arial" pitchFamily="34" charset="0"/>
+              <a:buChar char="•"/>
+            </a:pPr>
+            <a:r>
+              <a:rPr lang="en-US" sz="1000" dirty="0" smtClean="0"/>
+              <a:t>Sector Command Centre (Connection node)</a:t>
+            </a:r>
+          </a:p>
+          <a:p>
+            <a:pPr>
+              <a:buFont typeface="Arial" pitchFamily="34" charset="0"/>
+              <a:buChar char="•"/>
+            </a:pPr>
+            <a:r>
+              <a:rPr lang="en-US" sz="1000" dirty="0" smtClean="0"/>
+              <a:t>Power source</a:t>
+            </a:r>
+          </a:p>
+          <a:p>
+            <a:pPr>
+              <a:buFont typeface="Arial" pitchFamily="34" charset="0"/>
+              <a:buChar char="•"/>
+            </a:pPr>
+            <a:r>
+              <a:rPr lang="en-US" sz="1000" dirty="0" smtClean="0"/>
+              <a:t>AWACS</a:t>
+            </a:r>
+          </a:p>
+          <a:p>
+            <a:pPr>
+              <a:buFont typeface="Arial" pitchFamily="34" charset="0"/>
+              <a:buChar char="•"/>
+            </a:pPr>
+            <a:r>
+              <a:rPr lang="en-US" sz="1000" dirty="0" smtClean="0"/>
+              <a:t>Air Defense Fighters</a:t>
+            </a:r>
+          </a:p>
+          <a:p>
+            <a:pPr>
+              <a:buFont typeface="Arial" pitchFamily="34" charset="0"/>
+              <a:buChar char="•"/>
+            </a:pPr>
+            <a:endParaRPr lang="en-US" sz="1000" dirty="0" smtClean="0"/>
+          </a:p>
+          <a:p>
+            <a:r>
+              <a:rPr lang="en-US" sz="1000" b="1" dirty="0" smtClean="0"/>
+              <a:t>Example:</a:t>
+            </a:r>
+          </a:p>
+          <a:p>
+            <a:r>
+              <a:rPr lang="en-US" sz="1000" dirty="0" smtClean="0"/>
+              <a:t>The illustration to the right show a simple IADS. Each sector have a EWR that feeds information into a sector command centre.  SAMs are off, and only turn on to fire based on the information from the EWR that they are within range. In addition, as long as the sector is connected to the entire IADS, they can also be activate based on other EWRs in  IADS. AWACS is also supporting and contributing via the command center and functions as a extra EWR. Fighters on standby can also be launched to either sector based on radar information from EWR or AWACS.</a:t>
+            </a:r>
+            <a:endParaRPr lang="en-US" sz="1000" dirty="0" smtClean="0"/>
           </a:p>
           <a:p>
             <a:endParaRPr lang="en-US" sz="1200" dirty="0" smtClean="0"/>
-          </a:p>
-          <a:p>
-            <a:r>
-              <a:rPr lang="en-US" sz="1200" dirty="0" smtClean="0"/>
-              <a:t>There are several elements that are part of this network, and they are the following: See next slide</a:t>
-            </a:r>
           </a:p>
           <a:p>
             <a:endParaRPr lang="en-US" sz="1200" dirty="0" smtClean="0"/>
@@ -12665,6 +13559,1520 @@
           </a:p>
         </p:txBody>
       </p:sp>
+      <p:sp>
+        <p:nvSpPr>
+          <p:cNvPr id="23" name="Avrundet rektangel 22"/>
+          <p:cNvSpPr/>
+          <p:nvPr/>
+        </p:nvSpPr>
+        <p:spPr>
+          <a:xfrm>
+            <a:off x="4464367" y="1995686"/>
+            <a:ext cx="720080" cy="432048"/>
+          </a:xfrm>
+          <a:prstGeom prst="roundRect">
+            <a:avLst/>
+          </a:prstGeom>
+          <a:ln w="12700">
+            <a:solidFill>
+              <a:schemeClr val="tx1"/>
+            </a:solidFill>
+          </a:ln>
+        </p:spPr>
+        <p:style>
+          <a:lnRef idx="2">
+            <a:schemeClr val="accent1">
+              <a:shade val="50000"/>
+            </a:schemeClr>
+          </a:lnRef>
+          <a:fillRef idx="1">
+            <a:schemeClr val="accent1"/>
+          </a:fillRef>
+          <a:effectRef idx="0">
+            <a:schemeClr val="accent1"/>
+          </a:effectRef>
+          <a:fontRef idx="minor">
+            <a:schemeClr val="lt1"/>
+          </a:fontRef>
+        </p:style>
+        <p:txBody>
+          <a:bodyPr lIns="36000" tIns="36000" rIns="36000" bIns="36000" rtlCol="0" anchor="ctr"/>
+          <a:lstStyle/>
+          <a:p>
+            <a:pPr algn="ctr"/>
+            <a:r>
+              <a:rPr lang="en-US" sz="800" dirty="0" smtClean="0">
+                <a:solidFill>
+                  <a:schemeClr val="tx1"/>
+                </a:solidFill>
+                <a:latin typeface="Arial" pitchFamily="34" charset="0"/>
+                <a:cs typeface="Arial" pitchFamily="34" charset="0"/>
+              </a:rPr>
+              <a:t>Sector Command Centre</a:t>
+            </a:r>
+            <a:endParaRPr lang="en-US" sz="800" dirty="0">
+              <a:solidFill>
+                <a:schemeClr val="tx1"/>
+              </a:solidFill>
+              <a:latin typeface="Arial" pitchFamily="34" charset="0"/>
+              <a:cs typeface="Arial" pitchFamily="34" charset="0"/>
+            </a:endParaRPr>
+          </a:p>
+        </p:txBody>
+      </p:sp>
+      <p:cxnSp>
+        <p:nvCxnSpPr>
+          <p:cNvPr id="26" name="Rett linje 25"/>
+          <p:cNvCxnSpPr/>
+          <p:nvPr/>
+        </p:nvCxnSpPr>
+        <p:spPr>
+          <a:xfrm>
+            <a:off x="6300192" y="843558"/>
+            <a:ext cx="0" cy="4248472"/>
+          </a:xfrm>
+          <a:prstGeom prst="line">
+            <a:avLst/>
+          </a:prstGeom>
+          <a:ln w="12700">
+            <a:prstDash val="lgDash"/>
+          </a:ln>
+        </p:spPr>
+        <p:style>
+          <a:lnRef idx="1">
+            <a:schemeClr val="accent1"/>
+          </a:lnRef>
+          <a:fillRef idx="0">
+            <a:schemeClr val="accent1"/>
+          </a:fillRef>
+          <a:effectRef idx="0">
+            <a:schemeClr val="accent1"/>
+          </a:effectRef>
+          <a:fontRef idx="minor">
+            <a:schemeClr val="tx1"/>
+          </a:fontRef>
+        </p:style>
+      </p:cxnSp>
+      <p:sp>
+        <p:nvSpPr>
+          <p:cNvPr id="21" name="Avrundet rektangel 20"/>
+          <p:cNvSpPr/>
+          <p:nvPr/>
+        </p:nvSpPr>
+        <p:spPr>
+          <a:xfrm>
+            <a:off x="5940152" y="3435846"/>
+            <a:ext cx="720080" cy="432048"/>
+          </a:xfrm>
+          <a:prstGeom prst="roundRect">
+            <a:avLst/>
+          </a:prstGeom>
+          <a:ln w="12700">
+            <a:solidFill>
+              <a:schemeClr val="tx1"/>
+            </a:solidFill>
+          </a:ln>
+        </p:spPr>
+        <p:style>
+          <a:lnRef idx="2">
+            <a:schemeClr val="accent1">
+              <a:shade val="50000"/>
+            </a:schemeClr>
+          </a:lnRef>
+          <a:fillRef idx="1">
+            <a:schemeClr val="accent1"/>
+          </a:fillRef>
+          <a:effectRef idx="0">
+            <a:schemeClr val="accent1"/>
+          </a:effectRef>
+          <a:fontRef idx="minor">
+            <a:schemeClr val="lt1"/>
+          </a:fontRef>
+        </p:style>
+        <p:txBody>
+          <a:bodyPr lIns="36000" tIns="36000" rIns="36000" bIns="36000" rtlCol="0" anchor="ctr"/>
+          <a:lstStyle/>
+          <a:p>
+            <a:pPr algn="ctr"/>
+            <a:r>
+              <a:rPr lang="en-US" sz="800" dirty="0" smtClean="0">
+                <a:solidFill>
+                  <a:schemeClr val="tx1"/>
+                </a:solidFill>
+                <a:latin typeface="Arial" pitchFamily="34" charset="0"/>
+                <a:cs typeface="Arial" pitchFamily="34" charset="0"/>
+              </a:rPr>
+              <a:t>Command Centre</a:t>
+            </a:r>
+            <a:endParaRPr lang="en-US" sz="800" dirty="0">
+              <a:solidFill>
+                <a:schemeClr val="tx1"/>
+              </a:solidFill>
+              <a:latin typeface="Arial" pitchFamily="34" charset="0"/>
+              <a:cs typeface="Arial" pitchFamily="34" charset="0"/>
+            </a:endParaRPr>
+          </a:p>
+        </p:txBody>
+      </p:sp>
+      <p:sp>
+        <p:nvSpPr>
+          <p:cNvPr id="27" name="TekstSylinder 26"/>
+          <p:cNvSpPr txBox="1"/>
+          <p:nvPr/>
+        </p:nvSpPr>
+        <p:spPr>
+          <a:xfrm>
+            <a:off x="6300192" y="843558"/>
+            <a:ext cx="1296144" cy="338554"/>
+          </a:xfrm>
+          <a:prstGeom prst="rect">
+            <a:avLst/>
+          </a:prstGeom>
+          <a:noFill/>
+        </p:spPr>
+        <p:txBody>
+          <a:bodyPr wrap="square" rtlCol="0">
+            <a:spAutoFit/>
+          </a:bodyPr>
+          <a:lstStyle/>
+          <a:p>
+            <a:r>
+              <a:rPr lang="en-US" sz="1600" b="1" dirty="0" smtClean="0">
+                <a:latin typeface="Arial" pitchFamily="34" charset="0"/>
+                <a:cs typeface="Arial" pitchFamily="34" charset="0"/>
+              </a:rPr>
+              <a:t>SECTOR B</a:t>
+            </a:r>
+            <a:endParaRPr lang="en-US" sz="1600" b="1" dirty="0">
+              <a:latin typeface="Arial" pitchFamily="34" charset="0"/>
+              <a:cs typeface="Arial" pitchFamily="34" charset="0"/>
+            </a:endParaRPr>
+          </a:p>
+        </p:txBody>
+      </p:sp>
+      <p:sp>
+        <p:nvSpPr>
+          <p:cNvPr id="28" name="TekstSylinder 27"/>
+          <p:cNvSpPr txBox="1"/>
+          <p:nvPr/>
+        </p:nvSpPr>
+        <p:spPr>
+          <a:xfrm>
+            <a:off x="5004048" y="843558"/>
+            <a:ext cx="1296144" cy="338554"/>
+          </a:xfrm>
+          <a:prstGeom prst="rect">
+            <a:avLst/>
+          </a:prstGeom>
+          <a:noFill/>
+        </p:spPr>
+        <p:txBody>
+          <a:bodyPr wrap="square" rtlCol="0">
+            <a:spAutoFit/>
+          </a:bodyPr>
+          <a:lstStyle/>
+          <a:p>
+            <a:r>
+              <a:rPr lang="en-US" sz="1600" b="1" dirty="0" smtClean="0">
+                <a:latin typeface="Arial" pitchFamily="34" charset="0"/>
+                <a:cs typeface="Arial" pitchFamily="34" charset="0"/>
+              </a:rPr>
+              <a:t>SECTOR A</a:t>
+            </a:r>
+            <a:endParaRPr lang="en-US" sz="1600" b="1" dirty="0">
+              <a:latin typeface="Arial" pitchFamily="34" charset="0"/>
+              <a:cs typeface="Arial" pitchFamily="34" charset="0"/>
+            </a:endParaRPr>
+          </a:p>
+        </p:txBody>
+      </p:sp>
+      <p:sp>
+        <p:nvSpPr>
+          <p:cNvPr id="29" name="Ellipse 28"/>
+          <p:cNvSpPr/>
+          <p:nvPr/>
+        </p:nvSpPr>
+        <p:spPr>
+          <a:xfrm>
+            <a:off x="3600271" y="1959303"/>
+            <a:ext cx="648072" cy="504056"/>
+          </a:xfrm>
+          <a:prstGeom prst="ellipse">
+            <a:avLst/>
+          </a:prstGeom>
+          <a:solidFill>
+            <a:schemeClr val="tx2">
+              <a:lumMod val="20000"/>
+              <a:lumOff val="80000"/>
+            </a:schemeClr>
+          </a:solidFill>
+          <a:ln w="12700">
+            <a:solidFill>
+              <a:schemeClr val="tx1"/>
+            </a:solidFill>
+          </a:ln>
+        </p:spPr>
+        <p:style>
+          <a:lnRef idx="2">
+            <a:schemeClr val="accent1">
+              <a:shade val="50000"/>
+            </a:schemeClr>
+          </a:lnRef>
+          <a:fillRef idx="1">
+            <a:schemeClr val="accent1"/>
+          </a:fillRef>
+          <a:effectRef idx="0">
+            <a:schemeClr val="accent1"/>
+          </a:effectRef>
+          <a:fontRef idx="minor">
+            <a:schemeClr val="lt1"/>
+          </a:fontRef>
+        </p:style>
+        <p:txBody>
+          <a:bodyPr lIns="36000" tIns="36000" rIns="36000" bIns="36000" rtlCol="0" anchor="ctr"/>
+          <a:lstStyle/>
+          <a:p>
+            <a:pPr algn="ctr"/>
+            <a:r>
+              <a:rPr lang="en-US" sz="800" dirty="0" smtClean="0">
+                <a:solidFill>
+                  <a:schemeClr val="tx1"/>
+                </a:solidFill>
+                <a:latin typeface="Arial" pitchFamily="34" charset="0"/>
+                <a:cs typeface="Arial" pitchFamily="34" charset="0"/>
+              </a:rPr>
+              <a:t>SAM 1</a:t>
+            </a:r>
+            <a:endParaRPr lang="en-US" sz="800" dirty="0" smtClean="0">
+              <a:solidFill>
+                <a:schemeClr val="tx1"/>
+              </a:solidFill>
+              <a:latin typeface="Arial" pitchFamily="34" charset="0"/>
+              <a:cs typeface="Arial" pitchFamily="34" charset="0"/>
+            </a:endParaRPr>
+          </a:p>
+        </p:txBody>
+      </p:sp>
+      <p:sp>
+        <p:nvSpPr>
+          <p:cNvPr id="30" name="Ellipse 29"/>
+          <p:cNvSpPr/>
+          <p:nvPr/>
+        </p:nvSpPr>
+        <p:spPr>
+          <a:xfrm>
+            <a:off x="4499992" y="1347614"/>
+            <a:ext cx="648072" cy="504056"/>
+          </a:xfrm>
+          <a:prstGeom prst="ellipse">
+            <a:avLst/>
+          </a:prstGeom>
+          <a:solidFill>
+            <a:schemeClr val="tx2">
+              <a:lumMod val="20000"/>
+              <a:lumOff val="80000"/>
+            </a:schemeClr>
+          </a:solidFill>
+          <a:ln w="12700">
+            <a:solidFill>
+              <a:schemeClr val="tx1"/>
+            </a:solidFill>
+          </a:ln>
+        </p:spPr>
+        <p:style>
+          <a:lnRef idx="2">
+            <a:schemeClr val="accent1">
+              <a:shade val="50000"/>
+            </a:schemeClr>
+          </a:lnRef>
+          <a:fillRef idx="1">
+            <a:schemeClr val="accent1"/>
+          </a:fillRef>
+          <a:effectRef idx="0">
+            <a:schemeClr val="accent1"/>
+          </a:effectRef>
+          <a:fontRef idx="minor">
+            <a:schemeClr val="lt1"/>
+          </a:fontRef>
+        </p:style>
+        <p:txBody>
+          <a:bodyPr lIns="36000" tIns="36000" rIns="36000" bIns="36000" rtlCol="0" anchor="ctr"/>
+          <a:lstStyle/>
+          <a:p>
+            <a:pPr algn="ctr"/>
+            <a:r>
+              <a:rPr lang="en-US" sz="800" dirty="0" smtClean="0">
+                <a:solidFill>
+                  <a:schemeClr val="tx1"/>
+                </a:solidFill>
+                <a:latin typeface="Arial" pitchFamily="34" charset="0"/>
+                <a:cs typeface="Arial" pitchFamily="34" charset="0"/>
+              </a:rPr>
+              <a:t>SAM 2</a:t>
+            </a:r>
+            <a:endParaRPr lang="en-US" sz="800" dirty="0" smtClean="0">
+              <a:solidFill>
+                <a:schemeClr val="tx1"/>
+              </a:solidFill>
+              <a:latin typeface="Arial" pitchFamily="34" charset="0"/>
+              <a:cs typeface="Arial" pitchFamily="34" charset="0"/>
+            </a:endParaRPr>
+          </a:p>
+        </p:txBody>
+      </p:sp>
+      <p:sp>
+        <p:nvSpPr>
+          <p:cNvPr id="31" name="Ellipse 30"/>
+          <p:cNvSpPr/>
+          <p:nvPr/>
+        </p:nvSpPr>
+        <p:spPr>
+          <a:xfrm>
+            <a:off x="5400471" y="1959303"/>
+            <a:ext cx="648072" cy="504056"/>
+          </a:xfrm>
+          <a:prstGeom prst="ellipse">
+            <a:avLst/>
+          </a:prstGeom>
+          <a:solidFill>
+            <a:schemeClr val="tx2">
+              <a:lumMod val="20000"/>
+              <a:lumOff val="80000"/>
+            </a:schemeClr>
+          </a:solidFill>
+          <a:ln w="12700">
+            <a:solidFill>
+              <a:schemeClr val="tx1"/>
+            </a:solidFill>
+          </a:ln>
+        </p:spPr>
+        <p:style>
+          <a:lnRef idx="2">
+            <a:schemeClr val="accent1">
+              <a:shade val="50000"/>
+            </a:schemeClr>
+          </a:lnRef>
+          <a:fillRef idx="1">
+            <a:schemeClr val="accent1"/>
+          </a:fillRef>
+          <a:effectRef idx="0">
+            <a:schemeClr val="accent1"/>
+          </a:effectRef>
+          <a:fontRef idx="minor">
+            <a:schemeClr val="lt1"/>
+          </a:fontRef>
+        </p:style>
+        <p:txBody>
+          <a:bodyPr lIns="36000" tIns="36000" rIns="36000" bIns="36000" rtlCol="0" anchor="ctr"/>
+          <a:lstStyle/>
+          <a:p>
+            <a:pPr algn="ctr"/>
+            <a:r>
+              <a:rPr lang="en-US" sz="800" dirty="0" smtClean="0">
+                <a:solidFill>
+                  <a:schemeClr val="tx1"/>
+                </a:solidFill>
+                <a:latin typeface="Arial" pitchFamily="34" charset="0"/>
+                <a:cs typeface="Arial" pitchFamily="34" charset="0"/>
+              </a:rPr>
+              <a:t>SAM 3</a:t>
+            </a:r>
+            <a:endParaRPr lang="en-US" sz="800" dirty="0" smtClean="0">
+              <a:solidFill>
+                <a:schemeClr val="tx1"/>
+              </a:solidFill>
+              <a:latin typeface="Arial" pitchFamily="34" charset="0"/>
+              <a:cs typeface="Arial" pitchFamily="34" charset="0"/>
+            </a:endParaRPr>
+          </a:p>
+        </p:txBody>
+      </p:sp>
+      <p:cxnSp>
+        <p:nvCxnSpPr>
+          <p:cNvPr id="33" name="Rett linje 32"/>
+          <p:cNvCxnSpPr>
+            <a:stCxn id="30" idx="4"/>
+            <a:endCxn id="23" idx="0"/>
+          </p:cNvCxnSpPr>
+          <p:nvPr/>
+        </p:nvCxnSpPr>
+        <p:spPr>
+          <a:xfrm>
+            <a:off x="4824028" y="1851670"/>
+            <a:ext cx="379" cy="144016"/>
+          </a:xfrm>
+          <a:prstGeom prst="line">
+            <a:avLst/>
+          </a:prstGeom>
+          <a:ln w="15875">
+            <a:solidFill>
+              <a:schemeClr val="tx1"/>
+            </a:solidFill>
+          </a:ln>
+        </p:spPr>
+        <p:style>
+          <a:lnRef idx="1">
+            <a:schemeClr val="accent1"/>
+          </a:lnRef>
+          <a:fillRef idx="0">
+            <a:schemeClr val="accent1"/>
+          </a:fillRef>
+          <a:effectRef idx="0">
+            <a:schemeClr val="accent1"/>
+          </a:effectRef>
+          <a:fontRef idx="minor">
+            <a:schemeClr val="tx1"/>
+          </a:fontRef>
+        </p:style>
+      </p:cxnSp>
+      <p:cxnSp>
+        <p:nvCxnSpPr>
+          <p:cNvPr id="34" name="Rett linje 33"/>
+          <p:cNvCxnSpPr>
+            <a:stCxn id="31" idx="2"/>
+            <a:endCxn id="23" idx="3"/>
+          </p:cNvCxnSpPr>
+          <p:nvPr/>
+        </p:nvCxnSpPr>
+        <p:spPr>
+          <a:xfrm flipH="1">
+            <a:off x="5184447" y="2211331"/>
+            <a:ext cx="216024" cy="379"/>
+          </a:xfrm>
+          <a:prstGeom prst="line">
+            <a:avLst/>
+          </a:prstGeom>
+          <a:ln w="15875">
+            <a:solidFill>
+              <a:schemeClr val="tx1"/>
+            </a:solidFill>
+          </a:ln>
+        </p:spPr>
+        <p:style>
+          <a:lnRef idx="1">
+            <a:schemeClr val="accent1"/>
+          </a:lnRef>
+          <a:fillRef idx="0">
+            <a:schemeClr val="accent1"/>
+          </a:fillRef>
+          <a:effectRef idx="0">
+            <a:schemeClr val="accent1"/>
+          </a:effectRef>
+          <a:fontRef idx="minor">
+            <a:schemeClr val="tx1"/>
+          </a:fontRef>
+        </p:style>
+      </p:cxnSp>
+      <p:cxnSp>
+        <p:nvCxnSpPr>
+          <p:cNvPr id="37" name="Rett linje 36"/>
+          <p:cNvCxnSpPr>
+            <a:stCxn id="29" idx="6"/>
+            <a:endCxn id="23" idx="1"/>
+          </p:cNvCxnSpPr>
+          <p:nvPr/>
+        </p:nvCxnSpPr>
+        <p:spPr>
+          <a:xfrm>
+            <a:off x="4248343" y="2211331"/>
+            <a:ext cx="216024" cy="379"/>
+          </a:xfrm>
+          <a:prstGeom prst="line">
+            <a:avLst/>
+          </a:prstGeom>
+          <a:ln w="15875">
+            <a:solidFill>
+              <a:schemeClr val="tx1"/>
+            </a:solidFill>
+          </a:ln>
+        </p:spPr>
+        <p:style>
+          <a:lnRef idx="1">
+            <a:schemeClr val="accent1"/>
+          </a:lnRef>
+          <a:fillRef idx="0">
+            <a:schemeClr val="accent1"/>
+          </a:fillRef>
+          <a:effectRef idx="0">
+            <a:schemeClr val="accent1"/>
+          </a:effectRef>
+          <a:fontRef idx="minor">
+            <a:schemeClr val="tx1"/>
+          </a:fontRef>
+        </p:style>
+      </p:cxnSp>
+      <p:sp>
+        <p:nvSpPr>
+          <p:cNvPr id="40" name="Ellipse 39"/>
+          <p:cNvSpPr/>
+          <p:nvPr/>
+        </p:nvSpPr>
+        <p:spPr>
+          <a:xfrm>
+            <a:off x="4500750" y="2595500"/>
+            <a:ext cx="648072" cy="504056"/>
+          </a:xfrm>
+          <a:prstGeom prst="ellipse">
+            <a:avLst/>
+          </a:prstGeom>
+          <a:solidFill>
+            <a:schemeClr val="accent4">
+              <a:lumMod val="75000"/>
+            </a:schemeClr>
+          </a:solidFill>
+          <a:ln w="12700">
+            <a:solidFill>
+              <a:schemeClr val="tx1"/>
+            </a:solidFill>
+          </a:ln>
+        </p:spPr>
+        <p:style>
+          <a:lnRef idx="2">
+            <a:schemeClr val="accent1">
+              <a:shade val="50000"/>
+            </a:schemeClr>
+          </a:lnRef>
+          <a:fillRef idx="1">
+            <a:schemeClr val="accent1"/>
+          </a:fillRef>
+          <a:effectRef idx="0">
+            <a:schemeClr val="accent1"/>
+          </a:effectRef>
+          <a:fontRef idx="minor">
+            <a:schemeClr val="lt1"/>
+          </a:fontRef>
+        </p:style>
+        <p:txBody>
+          <a:bodyPr lIns="36000" tIns="36000" rIns="36000" bIns="36000" rtlCol="0" anchor="ctr"/>
+          <a:lstStyle/>
+          <a:p>
+            <a:pPr algn="ctr"/>
+            <a:r>
+              <a:rPr lang="en-US" sz="800" dirty="0" smtClean="0">
+                <a:solidFill>
+                  <a:schemeClr val="tx1"/>
+                </a:solidFill>
+                <a:latin typeface="Arial" pitchFamily="34" charset="0"/>
+                <a:cs typeface="Arial" pitchFamily="34" charset="0"/>
+              </a:rPr>
+              <a:t>EWR A</a:t>
+            </a:r>
+            <a:endParaRPr lang="en-US" sz="800" dirty="0" smtClean="0">
+              <a:solidFill>
+                <a:schemeClr val="tx1"/>
+              </a:solidFill>
+              <a:latin typeface="Arial" pitchFamily="34" charset="0"/>
+              <a:cs typeface="Arial" pitchFamily="34" charset="0"/>
+            </a:endParaRPr>
+          </a:p>
+        </p:txBody>
+      </p:sp>
+      <p:cxnSp>
+        <p:nvCxnSpPr>
+          <p:cNvPr id="41" name="Rett linje 40"/>
+          <p:cNvCxnSpPr>
+            <a:stCxn id="40" idx="0"/>
+            <a:endCxn id="23" idx="2"/>
+          </p:cNvCxnSpPr>
+          <p:nvPr/>
+        </p:nvCxnSpPr>
+        <p:spPr>
+          <a:xfrm flipH="1" flipV="1">
+            <a:off x="4824407" y="2427734"/>
+            <a:ext cx="379" cy="167766"/>
+          </a:xfrm>
+          <a:prstGeom prst="line">
+            <a:avLst/>
+          </a:prstGeom>
+          <a:ln w="15875">
+            <a:solidFill>
+              <a:schemeClr val="tx1"/>
+            </a:solidFill>
+          </a:ln>
+        </p:spPr>
+        <p:style>
+          <a:lnRef idx="1">
+            <a:schemeClr val="accent1"/>
+          </a:lnRef>
+          <a:fillRef idx="0">
+            <a:schemeClr val="accent1"/>
+          </a:fillRef>
+          <a:effectRef idx="0">
+            <a:schemeClr val="accent1"/>
+          </a:effectRef>
+          <a:fontRef idx="minor">
+            <a:schemeClr val="tx1"/>
+          </a:fontRef>
+        </p:style>
+      </p:cxnSp>
+      <p:cxnSp>
+        <p:nvCxnSpPr>
+          <p:cNvPr id="45" name="Rett linje 44"/>
+          <p:cNvCxnSpPr>
+            <a:stCxn id="21" idx="0"/>
+            <a:endCxn id="23" idx="3"/>
+          </p:cNvCxnSpPr>
+          <p:nvPr/>
+        </p:nvCxnSpPr>
+        <p:spPr>
+          <a:xfrm flipH="1" flipV="1">
+            <a:off x="5184447" y="2211710"/>
+            <a:ext cx="1115745" cy="1224136"/>
+          </a:xfrm>
+          <a:prstGeom prst="line">
+            <a:avLst/>
+          </a:prstGeom>
+          <a:ln w="12700">
+            <a:solidFill>
+              <a:schemeClr val="tx1"/>
+            </a:solidFill>
+          </a:ln>
+        </p:spPr>
+        <p:style>
+          <a:lnRef idx="1">
+            <a:schemeClr val="accent1"/>
+          </a:lnRef>
+          <a:fillRef idx="0">
+            <a:schemeClr val="accent1"/>
+          </a:fillRef>
+          <a:effectRef idx="0">
+            <a:schemeClr val="accent1"/>
+          </a:effectRef>
+          <a:fontRef idx="minor">
+            <a:schemeClr val="tx1"/>
+          </a:fontRef>
+        </p:style>
+      </p:cxnSp>
+      <p:sp>
+        <p:nvSpPr>
+          <p:cNvPr id="46" name="Avrundet rektangel 45"/>
+          <p:cNvSpPr/>
+          <p:nvPr/>
+        </p:nvSpPr>
+        <p:spPr>
+          <a:xfrm>
+            <a:off x="7415937" y="1971936"/>
+            <a:ext cx="720080" cy="432048"/>
+          </a:xfrm>
+          <a:prstGeom prst="roundRect">
+            <a:avLst/>
+          </a:prstGeom>
+          <a:ln w="12700">
+            <a:solidFill>
+              <a:schemeClr val="tx1"/>
+            </a:solidFill>
+          </a:ln>
+        </p:spPr>
+        <p:style>
+          <a:lnRef idx="2">
+            <a:schemeClr val="accent1">
+              <a:shade val="50000"/>
+            </a:schemeClr>
+          </a:lnRef>
+          <a:fillRef idx="1">
+            <a:schemeClr val="accent1"/>
+          </a:fillRef>
+          <a:effectRef idx="0">
+            <a:schemeClr val="accent1"/>
+          </a:effectRef>
+          <a:fontRef idx="minor">
+            <a:schemeClr val="lt1"/>
+          </a:fontRef>
+        </p:style>
+        <p:txBody>
+          <a:bodyPr lIns="36000" tIns="36000" rIns="36000" bIns="36000" rtlCol="0" anchor="ctr"/>
+          <a:lstStyle/>
+          <a:p>
+            <a:pPr algn="ctr"/>
+            <a:r>
+              <a:rPr lang="en-US" sz="800" dirty="0" smtClean="0">
+                <a:solidFill>
+                  <a:schemeClr val="tx1"/>
+                </a:solidFill>
+                <a:latin typeface="Arial" pitchFamily="34" charset="0"/>
+                <a:cs typeface="Arial" pitchFamily="34" charset="0"/>
+              </a:rPr>
+              <a:t>Sector Command Centre</a:t>
+            </a:r>
+            <a:endParaRPr lang="en-US" sz="800" dirty="0">
+              <a:solidFill>
+                <a:schemeClr val="tx1"/>
+              </a:solidFill>
+              <a:latin typeface="Arial" pitchFamily="34" charset="0"/>
+              <a:cs typeface="Arial" pitchFamily="34" charset="0"/>
+            </a:endParaRPr>
+          </a:p>
+        </p:txBody>
+      </p:sp>
+      <p:sp>
+        <p:nvSpPr>
+          <p:cNvPr id="47" name="Ellipse 46"/>
+          <p:cNvSpPr/>
+          <p:nvPr/>
+        </p:nvSpPr>
+        <p:spPr>
+          <a:xfrm>
+            <a:off x="6551841" y="1935553"/>
+            <a:ext cx="648072" cy="504056"/>
+          </a:xfrm>
+          <a:prstGeom prst="ellipse">
+            <a:avLst/>
+          </a:prstGeom>
+          <a:solidFill>
+            <a:schemeClr val="tx2">
+              <a:lumMod val="20000"/>
+              <a:lumOff val="80000"/>
+            </a:schemeClr>
+          </a:solidFill>
+          <a:ln w="12700">
+            <a:solidFill>
+              <a:schemeClr val="tx1"/>
+            </a:solidFill>
+          </a:ln>
+        </p:spPr>
+        <p:style>
+          <a:lnRef idx="2">
+            <a:schemeClr val="accent1">
+              <a:shade val="50000"/>
+            </a:schemeClr>
+          </a:lnRef>
+          <a:fillRef idx="1">
+            <a:schemeClr val="accent1"/>
+          </a:fillRef>
+          <a:effectRef idx="0">
+            <a:schemeClr val="accent1"/>
+          </a:effectRef>
+          <a:fontRef idx="minor">
+            <a:schemeClr val="lt1"/>
+          </a:fontRef>
+        </p:style>
+        <p:txBody>
+          <a:bodyPr lIns="36000" tIns="36000" rIns="36000" bIns="36000" rtlCol="0" anchor="ctr"/>
+          <a:lstStyle/>
+          <a:p>
+            <a:pPr algn="ctr"/>
+            <a:r>
+              <a:rPr lang="en-US" sz="800" dirty="0" smtClean="0">
+                <a:solidFill>
+                  <a:schemeClr val="tx1"/>
+                </a:solidFill>
+                <a:latin typeface="Arial" pitchFamily="34" charset="0"/>
+                <a:cs typeface="Arial" pitchFamily="34" charset="0"/>
+              </a:rPr>
+              <a:t>SAM 4</a:t>
+            </a:r>
+            <a:endParaRPr lang="en-US" sz="800" dirty="0" smtClean="0">
+              <a:solidFill>
+                <a:schemeClr val="tx1"/>
+              </a:solidFill>
+              <a:latin typeface="Arial" pitchFamily="34" charset="0"/>
+              <a:cs typeface="Arial" pitchFamily="34" charset="0"/>
+            </a:endParaRPr>
+          </a:p>
+        </p:txBody>
+      </p:sp>
+      <p:sp>
+        <p:nvSpPr>
+          <p:cNvPr id="48" name="Ellipse 47"/>
+          <p:cNvSpPr/>
+          <p:nvPr/>
+        </p:nvSpPr>
+        <p:spPr>
+          <a:xfrm>
+            <a:off x="7451562" y="1323864"/>
+            <a:ext cx="648072" cy="504056"/>
+          </a:xfrm>
+          <a:prstGeom prst="ellipse">
+            <a:avLst/>
+          </a:prstGeom>
+          <a:solidFill>
+            <a:schemeClr val="tx2">
+              <a:lumMod val="20000"/>
+              <a:lumOff val="80000"/>
+            </a:schemeClr>
+          </a:solidFill>
+          <a:ln w="12700">
+            <a:solidFill>
+              <a:schemeClr val="tx1"/>
+            </a:solidFill>
+          </a:ln>
+        </p:spPr>
+        <p:style>
+          <a:lnRef idx="2">
+            <a:schemeClr val="accent1">
+              <a:shade val="50000"/>
+            </a:schemeClr>
+          </a:lnRef>
+          <a:fillRef idx="1">
+            <a:schemeClr val="accent1"/>
+          </a:fillRef>
+          <a:effectRef idx="0">
+            <a:schemeClr val="accent1"/>
+          </a:effectRef>
+          <a:fontRef idx="minor">
+            <a:schemeClr val="lt1"/>
+          </a:fontRef>
+        </p:style>
+        <p:txBody>
+          <a:bodyPr lIns="36000" tIns="36000" rIns="36000" bIns="36000" rtlCol="0" anchor="ctr"/>
+          <a:lstStyle/>
+          <a:p>
+            <a:pPr algn="ctr"/>
+            <a:r>
+              <a:rPr lang="en-US" sz="800" dirty="0" smtClean="0">
+                <a:solidFill>
+                  <a:schemeClr val="tx1"/>
+                </a:solidFill>
+                <a:latin typeface="Arial" pitchFamily="34" charset="0"/>
+                <a:cs typeface="Arial" pitchFamily="34" charset="0"/>
+              </a:rPr>
+              <a:t>SAM 5</a:t>
+            </a:r>
+            <a:endParaRPr lang="en-US" sz="800" dirty="0" smtClean="0">
+              <a:solidFill>
+                <a:schemeClr val="tx1"/>
+              </a:solidFill>
+              <a:latin typeface="Arial" pitchFamily="34" charset="0"/>
+              <a:cs typeface="Arial" pitchFamily="34" charset="0"/>
+            </a:endParaRPr>
+          </a:p>
+        </p:txBody>
+      </p:sp>
+      <p:sp>
+        <p:nvSpPr>
+          <p:cNvPr id="49" name="Ellipse 48"/>
+          <p:cNvSpPr/>
+          <p:nvPr/>
+        </p:nvSpPr>
+        <p:spPr>
+          <a:xfrm>
+            <a:off x="8352041" y="1935553"/>
+            <a:ext cx="648072" cy="504056"/>
+          </a:xfrm>
+          <a:prstGeom prst="ellipse">
+            <a:avLst/>
+          </a:prstGeom>
+          <a:solidFill>
+            <a:schemeClr val="tx2">
+              <a:lumMod val="20000"/>
+              <a:lumOff val="80000"/>
+            </a:schemeClr>
+          </a:solidFill>
+          <a:ln w="12700">
+            <a:solidFill>
+              <a:schemeClr val="tx1"/>
+            </a:solidFill>
+          </a:ln>
+        </p:spPr>
+        <p:style>
+          <a:lnRef idx="2">
+            <a:schemeClr val="accent1">
+              <a:shade val="50000"/>
+            </a:schemeClr>
+          </a:lnRef>
+          <a:fillRef idx="1">
+            <a:schemeClr val="accent1"/>
+          </a:fillRef>
+          <a:effectRef idx="0">
+            <a:schemeClr val="accent1"/>
+          </a:effectRef>
+          <a:fontRef idx="minor">
+            <a:schemeClr val="lt1"/>
+          </a:fontRef>
+        </p:style>
+        <p:txBody>
+          <a:bodyPr lIns="36000" tIns="36000" rIns="36000" bIns="36000" rtlCol="0" anchor="ctr"/>
+          <a:lstStyle/>
+          <a:p>
+            <a:pPr algn="ctr"/>
+            <a:r>
+              <a:rPr lang="en-US" sz="800" dirty="0" smtClean="0">
+                <a:solidFill>
+                  <a:schemeClr val="tx1"/>
+                </a:solidFill>
+                <a:latin typeface="Arial" pitchFamily="34" charset="0"/>
+                <a:cs typeface="Arial" pitchFamily="34" charset="0"/>
+              </a:rPr>
+              <a:t>SAM 6</a:t>
+            </a:r>
+            <a:endParaRPr lang="en-US" sz="800" dirty="0" smtClean="0">
+              <a:solidFill>
+                <a:schemeClr val="tx1"/>
+              </a:solidFill>
+              <a:latin typeface="Arial" pitchFamily="34" charset="0"/>
+              <a:cs typeface="Arial" pitchFamily="34" charset="0"/>
+            </a:endParaRPr>
+          </a:p>
+        </p:txBody>
+      </p:sp>
+      <p:cxnSp>
+        <p:nvCxnSpPr>
+          <p:cNvPr id="50" name="Rett linje 49"/>
+          <p:cNvCxnSpPr>
+            <a:stCxn id="48" idx="4"/>
+            <a:endCxn id="46" idx="0"/>
+          </p:cNvCxnSpPr>
+          <p:nvPr/>
+        </p:nvCxnSpPr>
+        <p:spPr>
+          <a:xfrm>
+            <a:off x="7775598" y="1827920"/>
+            <a:ext cx="379" cy="144016"/>
+          </a:xfrm>
+          <a:prstGeom prst="line">
+            <a:avLst/>
+          </a:prstGeom>
+          <a:ln w="15875">
+            <a:solidFill>
+              <a:schemeClr val="tx1"/>
+            </a:solidFill>
+          </a:ln>
+        </p:spPr>
+        <p:style>
+          <a:lnRef idx="1">
+            <a:schemeClr val="accent1"/>
+          </a:lnRef>
+          <a:fillRef idx="0">
+            <a:schemeClr val="accent1"/>
+          </a:fillRef>
+          <a:effectRef idx="0">
+            <a:schemeClr val="accent1"/>
+          </a:effectRef>
+          <a:fontRef idx="minor">
+            <a:schemeClr val="tx1"/>
+          </a:fontRef>
+        </p:style>
+      </p:cxnSp>
+      <p:cxnSp>
+        <p:nvCxnSpPr>
+          <p:cNvPr id="51" name="Rett linje 50"/>
+          <p:cNvCxnSpPr>
+            <a:stCxn id="49" idx="2"/>
+            <a:endCxn id="46" idx="3"/>
+          </p:cNvCxnSpPr>
+          <p:nvPr/>
+        </p:nvCxnSpPr>
+        <p:spPr>
+          <a:xfrm flipH="1">
+            <a:off x="8136017" y="2187581"/>
+            <a:ext cx="216024" cy="379"/>
+          </a:xfrm>
+          <a:prstGeom prst="line">
+            <a:avLst/>
+          </a:prstGeom>
+          <a:ln w="15875">
+            <a:solidFill>
+              <a:schemeClr val="tx1"/>
+            </a:solidFill>
+          </a:ln>
+        </p:spPr>
+        <p:style>
+          <a:lnRef idx="1">
+            <a:schemeClr val="accent1"/>
+          </a:lnRef>
+          <a:fillRef idx="0">
+            <a:schemeClr val="accent1"/>
+          </a:fillRef>
+          <a:effectRef idx="0">
+            <a:schemeClr val="accent1"/>
+          </a:effectRef>
+          <a:fontRef idx="minor">
+            <a:schemeClr val="tx1"/>
+          </a:fontRef>
+        </p:style>
+      </p:cxnSp>
+      <p:cxnSp>
+        <p:nvCxnSpPr>
+          <p:cNvPr id="52" name="Rett linje 51"/>
+          <p:cNvCxnSpPr>
+            <a:stCxn id="47" idx="6"/>
+            <a:endCxn id="46" idx="1"/>
+          </p:cNvCxnSpPr>
+          <p:nvPr/>
+        </p:nvCxnSpPr>
+        <p:spPr>
+          <a:xfrm>
+            <a:off x="7199913" y="2187581"/>
+            <a:ext cx="216024" cy="379"/>
+          </a:xfrm>
+          <a:prstGeom prst="line">
+            <a:avLst/>
+          </a:prstGeom>
+          <a:ln w="15875">
+            <a:solidFill>
+              <a:schemeClr val="tx1"/>
+            </a:solidFill>
+          </a:ln>
+        </p:spPr>
+        <p:style>
+          <a:lnRef idx="1">
+            <a:schemeClr val="accent1"/>
+          </a:lnRef>
+          <a:fillRef idx="0">
+            <a:schemeClr val="accent1"/>
+          </a:fillRef>
+          <a:effectRef idx="0">
+            <a:schemeClr val="accent1"/>
+          </a:effectRef>
+          <a:fontRef idx="minor">
+            <a:schemeClr val="tx1"/>
+          </a:fontRef>
+        </p:style>
+      </p:cxnSp>
+      <p:sp>
+        <p:nvSpPr>
+          <p:cNvPr id="53" name="Ellipse 52"/>
+          <p:cNvSpPr/>
+          <p:nvPr/>
+        </p:nvSpPr>
+        <p:spPr>
+          <a:xfrm>
+            <a:off x="7452320" y="2571750"/>
+            <a:ext cx="648072" cy="504056"/>
+          </a:xfrm>
+          <a:prstGeom prst="ellipse">
+            <a:avLst/>
+          </a:prstGeom>
+          <a:solidFill>
+            <a:schemeClr val="accent4">
+              <a:lumMod val="75000"/>
+            </a:schemeClr>
+          </a:solidFill>
+          <a:ln w="12700">
+            <a:solidFill>
+              <a:schemeClr val="tx1"/>
+            </a:solidFill>
+          </a:ln>
+        </p:spPr>
+        <p:style>
+          <a:lnRef idx="2">
+            <a:schemeClr val="accent1">
+              <a:shade val="50000"/>
+            </a:schemeClr>
+          </a:lnRef>
+          <a:fillRef idx="1">
+            <a:schemeClr val="accent1"/>
+          </a:fillRef>
+          <a:effectRef idx="0">
+            <a:schemeClr val="accent1"/>
+          </a:effectRef>
+          <a:fontRef idx="minor">
+            <a:schemeClr val="lt1"/>
+          </a:fontRef>
+        </p:style>
+        <p:txBody>
+          <a:bodyPr lIns="36000" tIns="36000" rIns="36000" bIns="36000" rtlCol="0" anchor="ctr"/>
+          <a:lstStyle/>
+          <a:p>
+            <a:pPr algn="ctr"/>
+            <a:r>
+              <a:rPr lang="en-US" sz="800" dirty="0" smtClean="0">
+                <a:solidFill>
+                  <a:schemeClr val="tx1"/>
+                </a:solidFill>
+                <a:latin typeface="Arial" pitchFamily="34" charset="0"/>
+                <a:cs typeface="Arial" pitchFamily="34" charset="0"/>
+              </a:rPr>
+              <a:t>EWR B</a:t>
+            </a:r>
+            <a:endParaRPr lang="en-US" sz="800" dirty="0" smtClean="0">
+              <a:solidFill>
+                <a:schemeClr val="tx1"/>
+              </a:solidFill>
+              <a:latin typeface="Arial" pitchFamily="34" charset="0"/>
+              <a:cs typeface="Arial" pitchFamily="34" charset="0"/>
+            </a:endParaRPr>
+          </a:p>
+        </p:txBody>
+      </p:sp>
+      <p:cxnSp>
+        <p:nvCxnSpPr>
+          <p:cNvPr id="54" name="Rett linje 53"/>
+          <p:cNvCxnSpPr>
+            <a:stCxn id="53" idx="0"/>
+            <a:endCxn id="46" idx="2"/>
+          </p:cNvCxnSpPr>
+          <p:nvPr/>
+        </p:nvCxnSpPr>
+        <p:spPr>
+          <a:xfrm flipH="1" flipV="1">
+            <a:off x="7775977" y="2403984"/>
+            <a:ext cx="379" cy="167766"/>
+          </a:xfrm>
+          <a:prstGeom prst="line">
+            <a:avLst/>
+          </a:prstGeom>
+          <a:ln w="15875">
+            <a:solidFill>
+              <a:schemeClr val="tx1"/>
+            </a:solidFill>
+          </a:ln>
+        </p:spPr>
+        <p:style>
+          <a:lnRef idx="1">
+            <a:schemeClr val="accent1"/>
+          </a:lnRef>
+          <a:fillRef idx="0">
+            <a:schemeClr val="accent1"/>
+          </a:fillRef>
+          <a:effectRef idx="0">
+            <a:schemeClr val="accent1"/>
+          </a:effectRef>
+          <a:fontRef idx="minor">
+            <a:schemeClr val="tx1"/>
+          </a:fontRef>
+        </p:style>
+      </p:cxnSp>
+      <p:cxnSp>
+        <p:nvCxnSpPr>
+          <p:cNvPr id="57" name="Rett linje 56"/>
+          <p:cNvCxnSpPr>
+            <a:stCxn id="46" idx="1"/>
+            <a:endCxn id="21" idx="0"/>
+          </p:cNvCxnSpPr>
+          <p:nvPr/>
+        </p:nvCxnSpPr>
+        <p:spPr>
+          <a:xfrm flipH="1">
+            <a:off x="6300192" y="2187960"/>
+            <a:ext cx="1115745" cy="1247886"/>
+          </a:xfrm>
+          <a:prstGeom prst="line">
+            <a:avLst/>
+          </a:prstGeom>
+          <a:ln w="12700">
+            <a:solidFill>
+              <a:schemeClr val="tx1"/>
+            </a:solidFill>
+          </a:ln>
+        </p:spPr>
+        <p:style>
+          <a:lnRef idx="1">
+            <a:schemeClr val="accent1"/>
+          </a:lnRef>
+          <a:fillRef idx="0">
+            <a:schemeClr val="accent1"/>
+          </a:fillRef>
+          <a:effectRef idx="0">
+            <a:schemeClr val="accent1"/>
+          </a:effectRef>
+          <a:fontRef idx="minor">
+            <a:schemeClr val="tx1"/>
+          </a:fontRef>
+        </p:style>
+      </p:cxnSp>
+      <p:sp>
+        <p:nvSpPr>
+          <p:cNvPr id="61" name="Ellipse 60"/>
+          <p:cNvSpPr/>
+          <p:nvPr/>
+        </p:nvSpPr>
+        <p:spPr>
+          <a:xfrm>
+            <a:off x="5976535" y="4083918"/>
+            <a:ext cx="648072" cy="504056"/>
+          </a:xfrm>
+          <a:prstGeom prst="ellipse">
+            <a:avLst/>
+          </a:prstGeom>
+          <a:solidFill>
+            <a:schemeClr val="accent4">
+              <a:lumMod val="75000"/>
+            </a:schemeClr>
+          </a:solidFill>
+          <a:ln w="12700">
+            <a:solidFill>
+              <a:schemeClr val="tx1"/>
+            </a:solidFill>
+          </a:ln>
+        </p:spPr>
+        <p:style>
+          <a:lnRef idx="2">
+            <a:schemeClr val="accent1">
+              <a:shade val="50000"/>
+            </a:schemeClr>
+          </a:lnRef>
+          <a:fillRef idx="1">
+            <a:schemeClr val="accent1"/>
+          </a:fillRef>
+          <a:effectRef idx="0">
+            <a:schemeClr val="accent1"/>
+          </a:effectRef>
+          <a:fontRef idx="minor">
+            <a:schemeClr val="lt1"/>
+          </a:fontRef>
+        </p:style>
+        <p:txBody>
+          <a:bodyPr lIns="36000" tIns="36000" rIns="36000" bIns="36000" rtlCol="0" anchor="ctr"/>
+          <a:lstStyle/>
+          <a:p>
+            <a:pPr algn="ctr"/>
+            <a:r>
+              <a:rPr lang="en-US" sz="800" dirty="0" smtClean="0">
+                <a:solidFill>
+                  <a:schemeClr val="tx1"/>
+                </a:solidFill>
+                <a:latin typeface="Arial" pitchFamily="34" charset="0"/>
+                <a:cs typeface="Arial" pitchFamily="34" charset="0"/>
+              </a:rPr>
+              <a:t>EWR Center</a:t>
+            </a:r>
+            <a:endParaRPr lang="en-US" sz="800" dirty="0" smtClean="0">
+              <a:solidFill>
+                <a:schemeClr val="tx1"/>
+              </a:solidFill>
+              <a:latin typeface="Arial" pitchFamily="34" charset="0"/>
+              <a:cs typeface="Arial" pitchFamily="34" charset="0"/>
+            </a:endParaRPr>
+          </a:p>
+        </p:txBody>
+      </p:sp>
+      <p:cxnSp>
+        <p:nvCxnSpPr>
+          <p:cNvPr id="62" name="Rett linje 61"/>
+          <p:cNvCxnSpPr>
+            <a:stCxn id="21" idx="2"/>
+            <a:endCxn id="61" idx="0"/>
+          </p:cNvCxnSpPr>
+          <p:nvPr/>
+        </p:nvCxnSpPr>
+        <p:spPr>
+          <a:xfrm>
+            <a:off x="6300192" y="3867894"/>
+            <a:ext cx="379" cy="216024"/>
+          </a:xfrm>
+          <a:prstGeom prst="line">
+            <a:avLst/>
+          </a:prstGeom>
+          <a:ln w="12700">
+            <a:solidFill>
+              <a:schemeClr val="tx1"/>
+            </a:solidFill>
+          </a:ln>
+        </p:spPr>
+        <p:style>
+          <a:lnRef idx="1">
+            <a:schemeClr val="accent1"/>
+          </a:lnRef>
+          <a:fillRef idx="0">
+            <a:schemeClr val="accent1"/>
+          </a:fillRef>
+          <a:effectRef idx="0">
+            <a:schemeClr val="accent1"/>
+          </a:effectRef>
+          <a:fontRef idx="minor">
+            <a:schemeClr val="tx1"/>
+          </a:fontRef>
+        </p:style>
+      </p:cxnSp>
+      <p:sp>
+        <p:nvSpPr>
+          <p:cNvPr id="65" name="Ellipse 64"/>
+          <p:cNvSpPr/>
+          <p:nvPr/>
+        </p:nvSpPr>
+        <p:spPr>
+          <a:xfrm>
+            <a:off x="7668344" y="4443958"/>
+            <a:ext cx="648072" cy="504056"/>
+          </a:xfrm>
+          <a:prstGeom prst="ellipse">
+            <a:avLst/>
+          </a:prstGeom>
+          <a:solidFill>
+            <a:schemeClr val="accent6">
+              <a:lumMod val="75000"/>
+            </a:schemeClr>
+          </a:solidFill>
+          <a:ln w="12700">
+            <a:solidFill>
+              <a:schemeClr val="tx1"/>
+            </a:solidFill>
+          </a:ln>
+        </p:spPr>
+        <p:style>
+          <a:lnRef idx="2">
+            <a:schemeClr val="accent1">
+              <a:shade val="50000"/>
+            </a:schemeClr>
+          </a:lnRef>
+          <a:fillRef idx="1">
+            <a:schemeClr val="accent1"/>
+          </a:fillRef>
+          <a:effectRef idx="0">
+            <a:schemeClr val="accent1"/>
+          </a:effectRef>
+          <a:fontRef idx="minor">
+            <a:schemeClr val="lt1"/>
+          </a:fontRef>
+        </p:style>
+        <p:txBody>
+          <a:bodyPr lIns="36000" tIns="36000" rIns="36000" bIns="36000" rtlCol="0" anchor="ctr"/>
+          <a:lstStyle/>
+          <a:p>
+            <a:pPr algn="ctr"/>
+            <a:r>
+              <a:rPr lang="en-US" sz="800" dirty="0" smtClean="0">
+                <a:solidFill>
+                  <a:schemeClr val="tx1"/>
+                </a:solidFill>
+                <a:latin typeface="Arial" pitchFamily="34" charset="0"/>
+                <a:cs typeface="Arial" pitchFamily="34" charset="0"/>
+              </a:rPr>
+              <a:t>AWACS</a:t>
+            </a:r>
+            <a:endParaRPr lang="en-US" sz="800" dirty="0" smtClean="0">
+              <a:solidFill>
+                <a:schemeClr val="tx1"/>
+              </a:solidFill>
+              <a:latin typeface="Arial" pitchFamily="34" charset="0"/>
+              <a:cs typeface="Arial" pitchFamily="34" charset="0"/>
+            </a:endParaRPr>
+          </a:p>
+        </p:txBody>
+      </p:sp>
+      <p:cxnSp>
+        <p:nvCxnSpPr>
+          <p:cNvPr id="66" name="Rett linje 65"/>
+          <p:cNvCxnSpPr>
+            <a:stCxn id="21" idx="2"/>
+            <a:endCxn id="65" idx="2"/>
+          </p:cNvCxnSpPr>
+          <p:nvPr/>
+        </p:nvCxnSpPr>
+        <p:spPr>
+          <a:xfrm>
+            <a:off x="6300192" y="3867894"/>
+            <a:ext cx="1368152" cy="828092"/>
+          </a:xfrm>
+          <a:prstGeom prst="line">
+            <a:avLst/>
+          </a:prstGeom>
+          <a:ln w="12700">
+            <a:solidFill>
+              <a:schemeClr val="tx1"/>
+            </a:solidFill>
+          </a:ln>
+        </p:spPr>
+        <p:style>
+          <a:lnRef idx="1">
+            <a:schemeClr val="accent1"/>
+          </a:lnRef>
+          <a:fillRef idx="0">
+            <a:schemeClr val="accent1"/>
+          </a:fillRef>
+          <a:effectRef idx="0">
+            <a:schemeClr val="accent1"/>
+          </a:effectRef>
+          <a:fontRef idx="minor">
+            <a:schemeClr val="tx1"/>
+          </a:fontRef>
+        </p:style>
+      </p:cxnSp>
+      <p:sp>
+        <p:nvSpPr>
+          <p:cNvPr id="71" name="Ellipse 70"/>
+          <p:cNvSpPr/>
+          <p:nvPr/>
+        </p:nvSpPr>
+        <p:spPr>
+          <a:xfrm>
+            <a:off x="4644008" y="4227934"/>
+            <a:ext cx="648072" cy="504056"/>
+          </a:xfrm>
+          <a:prstGeom prst="ellipse">
+            <a:avLst/>
+          </a:prstGeom>
+          <a:solidFill>
+            <a:schemeClr val="accent2">
+              <a:lumMod val="75000"/>
+            </a:schemeClr>
+          </a:solidFill>
+          <a:ln w="12700">
+            <a:solidFill>
+              <a:schemeClr val="tx1"/>
+            </a:solidFill>
+          </a:ln>
+        </p:spPr>
+        <p:style>
+          <a:lnRef idx="2">
+            <a:schemeClr val="accent1">
+              <a:shade val="50000"/>
+            </a:schemeClr>
+          </a:lnRef>
+          <a:fillRef idx="1">
+            <a:schemeClr val="accent1"/>
+          </a:fillRef>
+          <a:effectRef idx="0">
+            <a:schemeClr val="accent1"/>
+          </a:effectRef>
+          <a:fontRef idx="minor">
+            <a:schemeClr val="lt1"/>
+          </a:fontRef>
+        </p:style>
+        <p:txBody>
+          <a:bodyPr lIns="36000" tIns="36000" rIns="36000" bIns="36000" rtlCol="0" anchor="ctr"/>
+          <a:lstStyle/>
+          <a:p>
+            <a:pPr algn="ctr"/>
+            <a:r>
+              <a:rPr lang="en-US" sz="800" dirty="0" smtClean="0">
+                <a:solidFill>
+                  <a:schemeClr val="tx1"/>
+                </a:solidFill>
+                <a:latin typeface="Arial" pitchFamily="34" charset="0"/>
+                <a:cs typeface="Arial" pitchFamily="34" charset="0"/>
+              </a:rPr>
+              <a:t>Fighters</a:t>
+            </a:r>
+            <a:endParaRPr lang="en-US" sz="800" dirty="0" smtClean="0">
+              <a:solidFill>
+                <a:schemeClr val="tx1"/>
+              </a:solidFill>
+              <a:latin typeface="Arial" pitchFamily="34" charset="0"/>
+              <a:cs typeface="Arial" pitchFamily="34" charset="0"/>
+            </a:endParaRPr>
+          </a:p>
+        </p:txBody>
+      </p:sp>
+      <p:cxnSp>
+        <p:nvCxnSpPr>
+          <p:cNvPr id="72" name="Rett linje 71"/>
+          <p:cNvCxnSpPr>
+            <a:stCxn id="71" idx="7"/>
+            <a:endCxn id="21" idx="2"/>
+          </p:cNvCxnSpPr>
+          <p:nvPr/>
+        </p:nvCxnSpPr>
+        <p:spPr>
+          <a:xfrm flipV="1">
+            <a:off x="5197172" y="3867894"/>
+            <a:ext cx="1103020" cy="433857"/>
+          </a:xfrm>
+          <a:prstGeom prst="line">
+            <a:avLst/>
+          </a:prstGeom>
+          <a:ln w="12700">
+            <a:solidFill>
+              <a:schemeClr val="tx1"/>
+            </a:solidFill>
+          </a:ln>
+        </p:spPr>
+        <p:style>
+          <a:lnRef idx="1">
+            <a:schemeClr val="accent1"/>
+          </a:lnRef>
+          <a:fillRef idx="0">
+            <a:schemeClr val="accent1"/>
+          </a:fillRef>
+          <a:effectRef idx="0">
+            <a:schemeClr val="accent1"/>
+          </a:effectRef>
+          <a:fontRef idx="minor">
+            <a:schemeClr val="tx1"/>
+          </a:fontRef>
+        </p:style>
+      </p:cxnSp>
     </p:spTree>
   </p:cSld>
   <p:clrMapOvr>
@@ -13372,20 +15780,122 @@
         </p:spPr>
         <p:txBody>
           <a:bodyPr wrap="square" rtlCol="0">
-            <a:normAutofit/>
+            <a:normAutofit lnSpcReduction="10000"/>
           </a:bodyPr>
           <a:lstStyle/>
           <a:p>
             <a:r>
               <a:rPr lang="en-US" sz="1200" dirty="0" smtClean="0"/>
-              <a:t>Command Centre This is the head of the entire system. The commanders and their staff that direct, and coordinate the forces on the ground. Needless to say, this is the most valuable section of the network, its position is usually concealed and possibly well protected.</a:t>
-            </a:r>
-          </a:p>
-          <a:p>
+              <a:t>This </a:t>
+            </a:r>
             <a:r>
               <a:rPr lang="en-US" sz="1200" dirty="0" smtClean="0"/>
-              <a:t>Even if it's possible to move around a command centre, it comes with its own limitations: it needs to reroute and build again all the communications between the elements, and it's very much limited in function during the transfer.</a:t>
-            </a:r>
+              <a:t>is the </a:t>
+            </a:r>
+            <a:r>
+              <a:rPr lang="en-US" sz="1200" dirty="0" smtClean="0"/>
+              <a:t>central node of the entire </a:t>
+            </a:r>
+            <a:r>
+              <a:rPr lang="en-US" sz="1200" dirty="0" smtClean="0"/>
+              <a:t>IADS.</a:t>
+            </a:r>
+          </a:p>
+          <a:p>
+            <a:r>
+              <a:rPr lang="en-US" sz="1200" dirty="0" smtClean="0"/>
+              <a:t>The command centre coordinates all parts of the IADS and make sure to give orders and information to the relevant parts.</a:t>
+            </a:r>
+          </a:p>
+          <a:p>
+            <a:endParaRPr lang="en-US" sz="1200" dirty="0" smtClean="0"/>
+          </a:p>
+          <a:p>
+            <a:r>
+              <a:rPr lang="en-US" sz="1200" dirty="0" smtClean="0"/>
+              <a:t>The command centre is powered by a </a:t>
+            </a:r>
+            <a:r>
+              <a:rPr lang="en-US" sz="1200" dirty="0" err="1" smtClean="0"/>
+              <a:t>a</a:t>
+            </a:r>
+            <a:r>
+              <a:rPr lang="en-US" sz="1200" dirty="0" smtClean="0"/>
+              <a:t> primary </a:t>
+            </a:r>
+            <a:r>
+              <a:rPr lang="en-US" sz="1200" dirty="0" err="1" smtClean="0"/>
+              <a:t>powersource</a:t>
+            </a:r>
+            <a:r>
+              <a:rPr lang="en-US" sz="1200" dirty="0" smtClean="0"/>
+              <a:t> and a backup </a:t>
+            </a:r>
+            <a:r>
+              <a:rPr lang="en-US" sz="1200" dirty="0" err="1" smtClean="0"/>
+              <a:t>powersource</a:t>
+            </a:r>
+            <a:r>
+              <a:rPr lang="en-US" sz="1200" dirty="0" smtClean="0"/>
+              <a:t>, and by attacking and destroying the </a:t>
+            </a:r>
+            <a:r>
+              <a:rPr lang="en-US" sz="1200" dirty="0" err="1" smtClean="0"/>
+              <a:t>powersources</a:t>
+            </a:r>
+            <a:r>
+              <a:rPr lang="en-US" sz="1200" dirty="0" smtClean="0"/>
+              <a:t> </a:t>
+            </a:r>
+            <a:r>
+              <a:rPr lang="en-US" sz="1200" dirty="0" smtClean="0"/>
+              <a:t>t</a:t>
+            </a:r>
+            <a:r>
+              <a:rPr lang="en-US" sz="1200" dirty="0" smtClean="0"/>
+              <a:t>he command centre is unable to function.</a:t>
+            </a:r>
+          </a:p>
+          <a:p>
+            <a:endParaRPr lang="en-US" sz="1200" dirty="0" smtClean="0"/>
+          </a:p>
+          <a:p>
+            <a:r>
+              <a:rPr lang="en-US" sz="1200" dirty="0" smtClean="0"/>
+              <a:t>Often the command centre </a:t>
+            </a:r>
+            <a:r>
+              <a:rPr lang="en-US" sz="1200" dirty="0" smtClean="0"/>
+              <a:t>also will have a backup command centre that takes its function if the primary command center is destroyed. The backup command center will have its own </a:t>
+            </a:r>
+            <a:r>
+              <a:rPr lang="en-US" sz="1200" dirty="0" err="1" smtClean="0"/>
+              <a:t>powersources</a:t>
+            </a:r>
+            <a:r>
+              <a:rPr lang="en-US" sz="1200" dirty="0" smtClean="0"/>
+              <a:t> to function</a:t>
+            </a:r>
+            <a:endParaRPr lang="en-US" sz="1200" dirty="0" smtClean="0"/>
+          </a:p>
+          <a:p>
+            <a:endParaRPr lang="en-US" sz="1200" dirty="0" smtClean="0"/>
+          </a:p>
+          <a:p>
+            <a:r>
+              <a:rPr lang="en-US" sz="1200" dirty="0" smtClean="0"/>
+              <a:t>The command center and backup command center are fixed installations that are not moved around.</a:t>
+            </a:r>
+          </a:p>
+          <a:p>
+            <a:endParaRPr lang="en-US" sz="1200" dirty="0" smtClean="0"/>
+          </a:p>
+          <a:p>
+            <a:r>
+              <a:rPr lang="en-US" sz="1200" dirty="0" smtClean="0"/>
+              <a:t>Example of a command center can be seen to the right.</a:t>
+            </a:r>
+            <a:endParaRPr lang="en-US" sz="1200" dirty="0" smtClean="0"/>
           </a:p>
           <a:p>
             <a:endParaRPr lang="en-US" sz="1200" dirty="0" smtClean="0"/>
@@ -13454,19 +15964,28 @@
         </p:blipFill>
         <p:spPr bwMode="auto">
           <a:xfrm>
-            <a:off x="5182106" y="771550"/>
-            <a:ext cx="1952305" cy="1656184"/>
+            <a:off x="4716016" y="915566"/>
+            <a:ext cx="2122071" cy="1800200"/>
           </a:xfrm>
           <a:prstGeom prst="rect">
             <a:avLst/>
           </a:prstGeom>
           <a:noFill/>
-          <a:ln w="9525">
-            <a:noFill/>
+          <a:ln w="12700">
+            <a:solidFill>
+              <a:schemeClr val="tx1"/>
+            </a:solidFill>
             <a:miter lim="800000"/>
             <a:headEnd/>
             <a:tailEnd/>
           </a:ln>
+          <a:effectLst>
+            <a:outerShdw blurRad="50800" dist="38100" dir="2700000" algn="tl" rotWithShape="0">
+              <a:prstClr val="black">
+                <a:alpha val="40000"/>
+              </a:prstClr>
+            </a:outerShdw>
+          </a:effectLst>
         </p:spPr>
       </p:pic>
       <p:pic>
@@ -13486,19 +16005,28 @@
         </p:blipFill>
         <p:spPr bwMode="auto">
           <a:xfrm>
-            <a:off x="7092280" y="1995686"/>
-            <a:ext cx="1858193" cy="2387923"/>
+            <a:off x="5724128" y="2787775"/>
+            <a:ext cx="1665647" cy="2156274"/>
           </a:xfrm>
           <a:prstGeom prst="rect">
             <a:avLst/>
           </a:prstGeom>
           <a:noFill/>
-          <a:ln w="9525">
-            <a:noFill/>
+          <a:ln w="12700">
+            <a:solidFill>
+              <a:schemeClr val="tx1"/>
+            </a:solidFill>
             <a:miter lim="800000"/>
             <a:headEnd/>
             <a:tailEnd/>
           </a:ln>
+          <a:effectLst>
+            <a:outerShdw blurRad="50800" dist="38100" dir="2700000" algn="tl" rotWithShape="0">
+              <a:prstClr val="black">
+                <a:alpha val="40000"/>
+              </a:prstClr>
+            </a:outerShdw>
+          </a:effectLst>
         </p:spPr>
       </p:pic>
       <p:pic>
@@ -13518,19 +16046,28 @@
         </p:blipFill>
         <p:spPr bwMode="auto">
           <a:xfrm>
-            <a:off x="3563888" y="1923678"/>
+            <a:off x="4067944" y="2787774"/>
             <a:ext cx="1598231" cy="2156272"/>
           </a:xfrm>
           <a:prstGeom prst="rect">
             <a:avLst/>
           </a:prstGeom>
           <a:noFill/>
-          <a:ln w="9525">
-            <a:noFill/>
+          <a:ln w="12700">
+            <a:solidFill>
+              <a:schemeClr val="tx1"/>
+            </a:solidFill>
             <a:miter lim="800000"/>
             <a:headEnd/>
             <a:tailEnd/>
           </a:ln>
+          <a:effectLst>
+            <a:outerShdw blurRad="50800" dist="38100" dir="2700000" algn="tl" rotWithShape="0">
+              <a:prstClr val="black">
+                <a:alpha val="40000"/>
+              </a:prstClr>
+            </a:outerShdw>
+          </a:effectLst>
         </p:spPr>
       </p:pic>
     </p:spTree>
@@ -14408,7 +16945,7 @@
           <a:p>
             <a:r>
               <a:rPr lang="en-US" dirty="0" smtClean="0"/>
-              <a:t>EARLY WARNING RADAR (EWR)</a:t>
+              <a:t>POINT DEFENSE</a:t>
             </a:r>
             <a:endParaRPr lang="en-US" dirty="0"/>
           </a:p>
@@ -15066,27 +17603,41 @@
         </p:spPr>
         <p:txBody>
           <a:bodyPr wrap="square" rtlCol="0">
-            <a:normAutofit lnSpcReduction="10000"/>
+            <a:normAutofit fontScale="92500" lnSpcReduction="10000"/>
           </a:bodyPr>
           <a:lstStyle/>
           <a:p>
             <a:r>
               <a:rPr lang="en-US" sz="1200" dirty="0" smtClean="0"/>
-              <a:t>EW Radar Early Warning Radars are the sentinels of this network. They scan the skies constantly, and feed </a:t>
+              <a:t>SAM Site This element is the actual threat, it can be a big and scary SA10 or a smaller SA8 that falls into the network. They can be a single section, or an entire cluster that is trying to defend an high value target.</a:t>
+            </a:r>
+          </a:p>
+          <a:p>
+            <a:r>
+              <a:rPr lang="en-US" sz="1200" dirty="0" smtClean="0"/>
+              <a:t>Example for this, are SA10 battalion protected by </a:t>
             </a:r>
             <a:r>
               <a:rPr lang="en-US" sz="1200" dirty="0" err="1" smtClean="0"/>
-              <a:t>informations</a:t>
+              <a:t>Shilkas</a:t>
             </a:r>
             <a:r>
               <a:rPr lang="en-US" sz="1200" dirty="0" smtClean="0"/>
-              <a:t> to the command centre and the SAM sites.</a:t>
-            </a:r>
-          </a:p>
-          <a:p>
+              <a:t>, and </a:t>
+            </a:r>
+            <a:r>
+              <a:rPr lang="en-US" sz="1200" dirty="0" err="1" smtClean="0"/>
+              <a:t>Tonguskas</a:t>
+            </a:r>
             <a:r>
               <a:rPr lang="en-US" sz="1200" dirty="0" smtClean="0"/>
-              <a:t>They can be within a big cluster of air </a:t>
+              <a:t> to help against low level threats, like cruise missiles, low level strikes or helicopters.</a:t>
+            </a:r>
+          </a:p>
+          <a:p>
+            <a:r>
+              <a:rPr lang="en-US" sz="1200" dirty="0" smtClean="0"/>
+              <a:t>SAM are usually static, but for concealment and </a:t>
             </a:r>
             <a:r>
               <a:rPr lang="en-US" sz="1200" dirty="0" err="1" smtClean="0"/>
@@ -15094,33 +17645,25 @@
             </a:r>
             <a:r>
               <a:rPr lang="en-US" sz="1200" dirty="0" smtClean="0"/>
-              <a:t>, or they can be placed around the territory, for example on the higher hills, to have better range.</a:t>
+              <a:t>, they can be moved around. Older systems takes days to disassemble, move and assemble, while more modern Russian variants can take just hours.</a:t>
             </a:r>
           </a:p>
           <a:p>
             <a:r>
               <a:rPr lang="en-US" sz="1200" dirty="0" smtClean="0"/>
-              <a:t>Their purpose is to pick up the contacts as far and as quick as possible, to relay info up the chain, so the command and SAM sites can prepare to face the threat, and </a:t>
-            </a:r>
-            <a:r>
-              <a:rPr lang="en-US" sz="1200" dirty="0" err="1" smtClean="0"/>
-              <a:t>organise</a:t>
-            </a:r>
+              <a:t>To avoid detection as long as possible, usually SAMs are kept silent until a target comes into range, and depending on the SAM, it can take some time to launch their missiles.</a:t>
+            </a:r>
+          </a:p>
+          <a:p>
             <a:r>
               <a:rPr lang="en-US" sz="1200" dirty="0" smtClean="0"/>
-              <a:t> together with other element to ensure success.</a:t>
+              <a:t>Better trained SAM crews will shorten this time for the acquisition of enemy aircraft, and usually will wait for it to get closer to a NEZ range [ No Escape Zone ] before launching.</a:t>
             </a:r>
           </a:p>
           <a:p>
             <a:r>
               <a:rPr lang="en-US" sz="1200" dirty="0" smtClean="0"/>
-              <a:t>Big SAM sites like SA10 can have more powerful radar than an usual EW radars. The S-300PS 64H6E radar can cover 160km and a EWR 55G6 instead reach 120km. In such cases, the 64H6E can be used as an EW tool, if the network would benefit from his coverage.</a:t>
-            </a:r>
-          </a:p>
-          <a:p>
-            <a:r>
-              <a:rPr lang="en-US" sz="1200" dirty="0" smtClean="0"/>
-              <a:t>They can also be moved quite relatively quickly, but they are often placed in strategic position to cover a better area. They are also smaller in size, and harder to spot.</a:t>
+              <a:t>SAM sites can be present in the theatre, but not connected to the IADS, and this would be the case for smaller section that are integrated with ground forces, and work with them to support them directly.</a:t>
             </a:r>
           </a:p>
           <a:p>
@@ -15179,134 +17722,6 @@
           </a:p>
         </p:txBody>
       </p:sp>
-      <p:pic>
-        <p:nvPicPr>
-          <p:cNvPr id="4098" name="Picture 2"/>
-          <p:cNvPicPr>
-            <a:picLocks noChangeAspect="1" noChangeArrowheads="1"/>
-          </p:cNvPicPr>
-          <p:nvPr/>
-        </p:nvPicPr>
-        <p:blipFill>
-          <a:blip r:embed="rId3" cstate="print"/>
-          <a:srcRect/>
-          <a:stretch>
-            <a:fillRect/>
-          </a:stretch>
-        </p:blipFill>
-        <p:spPr bwMode="auto">
-          <a:xfrm>
-            <a:off x="3563888" y="1131590"/>
-            <a:ext cx="1880667" cy="1429519"/>
-          </a:xfrm>
-          <a:prstGeom prst="rect">
-            <a:avLst/>
-          </a:prstGeom>
-          <a:noFill/>
-          <a:ln w="9525">
-            <a:noFill/>
-            <a:miter lim="800000"/>
-            <a:headEnd/>
-            <a:tailEnd/>
-          </a:ln>
-        </p:spPr>
-      </p:pic>
-      <p:pic>
-        <p:nvPicPr>
-          <p:cNvPr id="4099" name="Picture 3"/>
-          <p:cNvPicPr>
-            <a:picLocks noChangeAspect="1" noChangeArrowheads="1"/>
-          </p:cNvPicPr>
-          <p:nvPr/>
-        </p:nvPicPr>
-        <p:blipFill>
-          <a:blip r:embed="rId4" cstate="print"/>
-          <a:srcRect/>
-          <a:stretch>
-            <a:fillRect/>
-          </a:stretch>
-        </p:blipFill>
-        <p:spPr bwMode="auto">
-          <a:xfrm>
-            <a:off x="3779912" y="3219822"/>
-            <a:ext cx="2011909" cy="1291496"/>
-          </a:xfrm>
-          <a:prstGeom prst="rect">
-            <a:avLst/>
-          </a:prstGeom>
-          <a:noFill/>
-          <a:ln w="9525">
-            <a:noFill/>
-            <a:miter lim="800000"/>
-            <a:headEnd/>
-            <a:tailEnd/>
-          </a:ln>
-        </p:spPr>
-      </p:pic>
-      <p:pic>
-        <p:nvPicPr>
-          <p:cNvPr id="4100" name="Picture 4"/>
-          <p:cNvPicPr>
-            <a:picLocks noChangeAspect="1" noChangeArrowheads="1"/>
-          </p:cNvPicPr>
-          <p:nvPr/>
-        </p:nvPicPr>
-        <p:blipFill>
-          <a:blip r:embed="rId5" cstate="print"/>
-          <a:srcRect/>
-          <a:stretch>
-            <a:fillRect/>
-          </a:stretch>
-        </p:blipFill>
-        <p:spPr bwMode="auto">
-          <a:xfrm>
-            <a:off x="6588224" y="1131590"/>
-            <a:ext cx="2038946" cy="1541453"/>
-          </a:xfrm>
-          <a:prstGeom prst="rect">
-            <a:avLst/>
-          </a:prstGeom>
-          <a:noFill/>
-          <a:ln w="9525">
-            <a:noFill/>
-            <a:miter lim="800000"/>
-            <a:headEnd/>
-            <a:tailEnd/>
-          </a:ln>
-        </p:spPr>
-      </p:pic>
-      <p:pic>
-        <p:nvPicPr>
-          <p:cNvPr id="4101" name="Picture 5"/>
-          <p:cNvPicPr>
-            <a:picLocks noChangeAspect="1" noChangeArrowheads="1"/>
-          </p:cNvPicPr>
-          <p:nvPr/>
-        </p:nvPicPr>
-        <p:blipFill>
-          <a:blip r:embed="rId6" cstate="print"/>
-          <a:srcRect/>
-          <a:stretch>
-            <a:fillRect/>
-          </a:stretch>
-        </p:blipFill>
-        <p:spPr bwMode="auto">
-          <a:xfrm>
-            <a:off x="6516216" y="3075806"/>
-            <a:ext cx="1870369" cy="1331421"/>
-          </a:xfrm>
-          <a:prstGeom prst="rect">
-            <a:avLst/>
-          </a:prstGeom>
-          <a:noFill/>
-          <a:ln w="9525">
-            <a:noFill/>
-            <a:miter lim="800000"/>
-            <a:headEnd/>
-            <a:tailEnd/>
-          </a:ln>
-        </p:spPr>
-      </p:pic>
     </p:spTree>
   </p:cSld>
   <p:clrMapOvr>
@@ -15356,7 +17771,7 @@
           <a:p>
             <a:r>
               <a:rPr lang="en-US" dirty="0" smtClean="0"/>
-              <a:t>CONNECTION NODE (SECTOR COMMAND CENTER)</a:t>
+              <a:t>EARLY WARNING RADAR (EWR)</a:t>
             </a:r>
             <a:endParaRPr lang="en-US" dirty="0"/>
           </a:p>
@@ -16014,19 +18429,13 @@
         </p:spPr>
         <p:txBody>
           <a:bodyPr wrap="square" rtlCol="0">
-            <a:normAutofit/>
+            <a:normAutofit lnSpcReduction="10000"/>
           </a:bodyPr>
           <a:lstStyle/>
           <a:p>
             <a:r>
               <a:rPr lang="en-US" sz="1200" dirty="0" smtClean="0"/>
-              <a:t>Connection Nodes Depending on the geographical size of the area, the current available infrastructure, and the technology available, IADS may have connection nodes.</a:t>
-            </a:r>
-          </a:p>
-          <a:p>
-            <a:r>
-              <a:rPr lang="en-US" sz="1200" dirty="0" smtClean="0"/>
-              <a:t>These are systems that can pass messages, data and other kind of </a:t>
+              <a:t>EW Radar Early Warning Radars are the sentinels of this network. They scan the skies constantly, and feed </a:t>
             </a:r>
             <a:r>
               <a:rPr lang="en-US" sz="1200" dirty="0" err="1" smtClean="0"/>
@@ -16034,21 +18443,53 @@
             </a:r>
             <a:r>
               <a:rPr lang="en-US" sz="1200" dirty="0" smtClean="0"/>
-              <a:t>. They are basically </a:t>
+              <a:t> to the command centre and the SAM sites.</a:t>
+            </a:r>
+          </a:p>
+          <a:p>
+            <a:r>
+              <a:rPr lang="en-US" sz="1200" dirty="0" smtClean="0"/>
+              <a:t>They can be within a big cluster of air </a:t>
             </a:r>
             <a:r>
               <a:rPr lang="en-US" sz="1200" dirty="0" err="1" smtClean="0"/>
-              <a:t>informations</a:t>
+              <a:t>defence</a:t>
             </a:r>
             <a:r>
               <a:rPr lang="en-US" sz="1200" dirty="0" smtClean="0"/>
-              <a:t> highways, and let all the pieces of the network working together</a:t>
+              <a:t>, or they can be placed around the territory, for example on the higher hills, to have better range.</a:t>
             </a:r>
           </a:p>
           <a:p>
             <a:r>
               <a:rPr lang="en-US" sz="1200" dirty="0" smtClean="0"/>
-              <a:t>They are usually Antennas that are placed in key position to catch messages from other elements in the network, and relay them, overcoming geographical limitations like mountains.</a:t>
+              <a:t>Their purpose is to pick up the contacts as far and as quick as possible, to relay info up the chain, so the command and SAM sites can prepare to face the threat, and </a:t>
+            </a:r>
+            <a:r>
+              <a:rPr lang="en-US" sz="1200" dirty="0" err="1" smtClean="0"/>
+              <a:t>organise</a:t>
+            </a:r>
+            <a:r>
+              <a:rPr lang="en-US" sz="1200" dirty="0" smtClean="0"/>
+              <a:t> together with other element to ensure success.</a:t>
+            </a:r>
+          </a:p>
+          <a:p>
+            <a:r>
+              <a:rPr lang="en-US" sz="1200" dirty="0" smtClean="0"/>
+              <a:t>Big SAM sites like SA10 can have more powerful radar than an usual EW radars. The S-300PS 64H6E radar can cover 160km and a EWR 55G6 instead reach 120km. In such cases, the 64H6E can be used as an EW tool, if the network would benefit from his coverage.</a:t>
+            </a:r>
+          </a:p>
+          <a:p>
+            <a:r>
+              <a:rPr lang="en-US" sz="1200" dirty="0" smtClean="0"/>
+              <a:t>They can also be moved quite relatively quickly, but they are often placed in strategic position to cover a better area. They are also smaller in size, and harder to spot.</a:t>
+            </a:r>
+          </a:p>
+          <a:p>
+            <a:r>
+              <a:rPr lang="en-US" sz="1200" dirty="0" smtClean="0"/>
+              <a:t>.</a:t>
             </a:r>
           </a:p>
           <a:p>
@@ -16103,7 +18544,7 @@
       </p:sp>
       <p:pic>
         <p:nvPicPr>
-          <p:cNvPr id="3074" name="Picture 2"/>
+          <p:cNvPr id="4098" name="Picture 2"/>
           <p:cNvPicPr>
             <a:picLocks noChangeAspect="1" noChangeArrowheads="1"/>
           </p:cNvPicPr>
@@ -16118,8 +18559,8 @@
         </p:blipFill>
         <p:spPr bwMode="auto">
           <a:xfrm>
-            <a:off x="6228184" y="843558"/>
-            <a:ext cx="2262632" cy="2376314"/>
+            <a:off x="3563888" y="1131590"/>
+            <a:ext cx="1880667" cy="1429519"/>
           </a:xfrm>
           <a:prstGeom prst="rect">
             <a:avLst/>
@@ -16135,7 +18576,7 @@
       </p:pic>
       <p:pic>
         <p:nvPicPr>
-          <p:cNvPr id="3075" name="Picture 3"/>
+          <p:cNvPr id="4099" name="Picture 3"/>
           <p:cNvPicPr>
             <a:picLocks noChangeAspect="1" noChangeArrowheads="1"/>
           </p:cNvPicPr>
@@ -16150,8 +18591,72 @@
         </p:blipFill>
         <p:spPr bwMode="auto">
           <a:xfrm>
-            <a:off x="3707904" y="915566"/>
-            <a:ext cx="2232671" cy="2402780"/>
+            <a:off x="3779912" y="3219822"/>
+            <a:ext cx="2011909" cy="1291496"/>
+          </a:xfrm>
+          <a:prstGeom prst="rect">
+            <a:avLst/>
+          </a:prstGeom>
+          <a:noFill/>
+          <a:ln w="9525">
+            <a:noFill/>
+            <a:miter lim="800000"/>
+            <a:headEnd/>
+            <a:tailEnd/>
+          </a:ln>
+        </p:spPr>
+      </p:pic>
+      <p:pic>
+        <p:nvPicPr>
+          <p:cNvPr id="4100" name="Picture 4"/>
+          <p:cNvPicPr>
+            <a:picLocks noChangeAspect="1" noChangeArrowheads="1"/>
+          </p:cNvPicPr>
+          <p:nvPr/>
+        </p:nvPicPr>
+        <p:blipFill>
+          <a:blip r:embed="rId5" cstate="print"/>
+          <a:srcRect/>
+          <a:stretch>
+            <a:fillRect/>
+          </a:stretch>
+        </p:blipFill>
+        <p:spPr bwMode="auto">
+          <a:xfrm>
+            <a:off x="6588224" y="1131590"/>
+            <a:ext cx="2038946" cy="1541453"/>
+          </a:xfrm>
+          <a:prstGeom prst="rect">
+            <a:avLst/>
+          </a:prstGeom>
+          <a:noFill/>
+          <a:ln w="9525">
+            <a:noFill/>
+            <a:miter lim="800000"/>
+            <a:headEnd/>
+            <a:tailEnd/>
+          </a:ln>
+        </p:spPr>
+      </p:pic>
+      <p:pic>
+        <p:nvPicPr>
+          <p:cNvPr id="4101" name="Picture 5"/>
+          <p:cNvPicPr>
+            <a:picLocks noChangeAspect="1" noChangeArrowheads="1"/>
+          </p:cNvPicPr>
+          <p:nvPr/>
+        </p:nvPicPr>
+        <p:blipFill>
+          <a:blip r:embed="rId6" cstate="print"/>
+          <a:srcRect/>
+          <a:stretch>
+            <a:fillRect/>
+          </a:stretch>
+        </p:blipFill>
+        <p:spPr bwMode="auto">
+          <a:xfrm>
+            <a:off x="6516216" y="3075806"/>
+            <a:ext cx="1870369" cy="1331421"/>
           </a:xfrm>
           <a:prstGeom prst="rect">
             <a:avLst/>
@@ -16214,7 +18719,7 @@
           <a:p>
             <a:r>
               <a:rPr lang="en-US" dirty="0" smtClean="0"/>
-              <a:t>POWER SOURCE</a:t>
+              <a:t>CONNECTION NODE (SECTOR COMMAND CENTER)</a:t>
             </a:r>
             <a:endParaRPr lang="en-US" dirty="0"/>
           </a:p>
@@ -16878,19 +19383,35 @@
           <a:p>
             <a:r>
               <a:rPr lang="en-US" sz="1200" dirty="0" smtClean="0"/>
-              <a:t>Power Sources This is a general label to indicate what is feeding power to the system, and usually are power plants that give power to entire grids.</a:t>
+              <a:t>Connection Nodes Depending on the geographical size of the area, the current available infrastructure, and the technology available, IADS may have connection nodes.</a:t>
             </a:r>
           </a:p>
           <a:p>
             <a:r>
               <a:rPr lang="en-US" sz="1200" dirty="0" smtClean="0"/>
-              <a:t>Many elements can have autonomous power, like SAM systems don't need to be latched to an external power source to function fully.</a:t>
-            </a:r>
-          </a:p>
-          <a:p>
+              <a:t>These are systems that can pass messages, data and other kind of </a:t>
+            </a:r>
+            <a:r>
+              <a:rPr lang="en-US" sz="1200" dirty="0" err="1" smtClean="0"/>
+              <a:t>informations</a:t>
+            </a:r>
             <a:r>
               <a:rPr lang="en-US" sz="1200" dirty="0" smtClean="0"/>
-              <a:t>But to work as a network, an IADS requires a Power source to operate.</a:t>
+              <a:t>. They are basically </a:t>
+            </a:r>
+            <a:r>
+              <a:rPr lang="en-US" sz="1200" dirty="0" err="1" smtClean="0"/>
+              <a:t>informations</a:t>
+            </a:r>
+            <a:r>
+              <a:rPr lang="en-US" sz="1200" dirty="0" smtClean="0"/>
+              <a:t> highways, and let all the pieces of the network working together</a:t>
+            </a:r>
+          </a:p>
+          <a:p>
+            <a:r>
+              <a:rPr lang="en-US" sz="1200" dirty="0" smtClean="0"/>
+              <a:t>They are usually Antennas that are placed in key position to catch messages from other elements in the network, and relay them, overcoming geographical limitations like mountains.</a:t>
             </a:r>
           </a:p>
           <a:p>
@@ -16945,7 +19466,7 @@
       </p:sp>
       <p:pic>
         <p:nvPicPr>
-          <p:cNvPr id="2050" name="Picture 2"/>
+          <p:cNvPr id="3074" name="Picture 2"/>
           <p:cNvPicPr>
             <a:picLocks noChangeAspect="1" noChangeArrowheads="1"/>
           </p:cNvPicPr>
@@ -16960,8 +19481,8 @@
         </p:blipFill>
         <p:spPr bwMode="auto">
           <a:xfrm>
-            <a:off x="6372200" y="699543"/>
-            <a:ext cx="2413273" cy="1854026"/>
+            <a:off x="6228184" y="843558"/>
+            <a:ext cx="2262632" cy="2376314"/>
           </a:xfrm>
           <a:prstGeom prst="rect">
             <a:avLst/>
@@ -16977,7 +19498,7 @@
       </p:pic>
       <p:pic>
         <p:nvPicPr>
-          <p:cNvPr id="2051" name="Picture 3"/>
+          <p:cNvPr id="3075" name="Picture 3"/>
           <p:cNvPicPr>
             <a:picLocks noChangeAspect="1" noChangeArrowheads="1"/>
           </p:cNvPicPr>
@@ -16992,40 +19513,8 @@
         </p:blipFill>
         <p:spPr bwMode="auto">
           <a:xfrm>
-            <a:off x="6372200" y="2931790"/>
-            <a:ext cx="1956424" cy="1484958"/>
-          </a:xfrm>
-          <a:prstGeom prst="rect">
-            <a:avLst/>
-          </a:prstGeom>
-          <a:noFill/>
-          <a:ln w="9525">
-            <a:noFill/>
-            <a:miter lim="800000"/>
-            <a:headEnd/>
-            <a:tailEnd/>
-          </a:ln>
-        </p:spPr>
-      </p:pic>
-      <p:pic>
-        <p:nvPicPr>
-          <p:cNvPr id="2052" name="Picture 4"/>
-          <p:cNvPicPr>
-            <a:picLocks noChangeAspect="1" noChangeArrowheads="1"/>
-          </p:cNvPicPr>
-          <p:nvPr/>
-        </p:nvPicPr>
-        <p:blipFill>
-          <a:blip r:embed="rId5" cstate="print"/>
-          <a:srcRect/>
-          <a:stretch>
-            <a:fillRect/>
-          </a:stretch>
-        </p:blipFill>
-        <p:spPr bwMode="auto">
-          <a:xfrm>
-            <a:off x="3779912" y="1131590"/>
-            <a:ext cx="1960437" cy="2024633"/>
+            <a:off x="3707904" y="915566"/>
+            <a:ext cx="2232671" cy="2402780"/>
           </a:xfrm>
           <a:prstGeom prst="rect">
             <a:avLst/>
@@ -17088,7 +19577,7 @@
           <a:p>
             <a:r>
               <a:rPr lang="en-US" dirty="0" smtClean="0"/>
-              <a:t>AWACS</a:t>
+              <a:t>POWER SOURCE</a:t>
             </a:r>
             <a:endParaRPr lang="en-US" dirty="0"/>
           </a:p>
@@ -17752,23 +20241,19 @@
           <a:p>
             <a:r>
               <a:rPr lang="en-US" sz="1200" dirty="0" smtClean="0"/>
-              <a:t>AWACS and Ships If they are integrated in the command structure and\or </a:t>
-            </a:r>
-            <a:r>
-              <a:rPr lang="en-US" sz="1200" dirty="0" err="1" smtClean="0"/>
-              <a:t>organisation</a:t>
-            </a:r>
+              <a:t>Power Sources This is a general label to indicate what is feeding power to the system, and usually are power plants that give power to entire grids.</a:t>
+            </a:r>
+          </a:p>
+          <a:p>
             <a:r>
               <a:rPr lang="en-US" sz="1200" dirty="0" smtClean="0"/>
-              <a:t>, these entities can feed </a:t>
-            </a:r>
-            <a:r>
-              <a:rPr lang="en-US" sz="1200" dirty="0" err="1" smtClean="0"/>
-              <a:t>informations</a:t>
-            </a:r>
+              <a:t>Many elements can have autonomous power, like SAM systems don't need to be latched to an external power source to function fully.</a:t>
+            </a:r>
+          </a:p>
+          <a:p>
             <a:r>
               <a:rPr lang="en-US" sz="1200" dirty="0" smtClean="0"/>
-              <a:t> to the IADS through connection nodes..</a:t>
+              <a:t>But to work as a network, an IADS requires a Power source to operate.</a:t>
             </a:r>
           </a:p>
           <a:p>
@@ -17821,6 +20306,102 @@
           </a:p>
         </p:txBody>
       </p:sp>
+      <p:pic>
+        <p:nvPicPr>
+          <p:cNvPr id="2050" name="Picture 2"/>
+          <p:cNvPicPr>
+            <a:picLocks noChangeAspect="1" noChangeArrowheads="1"/>
+          </p:cNvPicPr>
+          <p:nvPr/>
+        </p:nvPicPr>
+        <p:blipFill>
+          <a:blip r:embed="rId3" cstate="print"/>
+          <a:srcRect/>
+          <a:stretch>
+            <a:fillRect/>
+          </a:stretch>
+        </p:blipFill>
+        <p:spPr bwMode="auto">
+          <a:xfrm>
+            <a:off x="6372200" y="699543"/>
+            <a:ext cx="2413273" cy="1854026"/>
+          </a:xfrm>
+          <a:prstGeom prst="rect">
+            <a:avLst/>
+          </a:prstGeom>
+          <a:noFill/>
+          <a:ln w="9525">
+            <a:noFill/>
+            <a:miter lim="800000"/>
+            <a:headEnd/>
+            <a:tailEnd/>
+          </a:ln>
+        </p:spPr>
+      </p:pic>
+      <p:pic>
+        <p:nvPicPr>
+          <p:cNvPr id="2051" name="Picture 3"/>
+          <p:cNvPicPr>
+            <a:picLocks noChangeAspect="1" noChangeArrowheads="1"/>
+          </p:cNvPicPr>
+          <p:nvPr/>
+        </p:nvPicPr>
+        <p:blipFill>
+          <a:blip r:embed="rId4" cstate="print"/>
+          <a:srcRect/>
+          <a:stretch>
+            <a:fillRect/>
+          </a:stretch>
+        </p:blipFill>
+        <p:spPr bwMode="auto">
+          <a:xfrm>
+            <a:off x="6372200" y="2931790"/>
+            <a:ext cx="1956424" cy="1484958"/>
+          </a:xfrm>
+          <a:prstGeom prst="rect">
+            <a:avLst/>
+          </a:prstGeom>
+          <a:noFill/>
+          <a:ln w="9525">
+            <a:noFill/>
+            <a:miter lim="800000"/>
+            <a:headEnd/>
+            <a:tailEnd/>
+          </a:ln>
+        </p:spPr>
+      </p:pic>
+      <p:pic>
+        <p:nvPicPr>
+          <p:cNvPr id="2052" name="Picture 4"/>
+          <p:cNvPicPr>
+            <a:picLocks noChangeAspect="1" noChangeArrowheads="1"/>
+          </p:cNvPicPr>
+          <p:nvPr/>
+        </p:nvPicPr>
+        <p:blipFill>
+          <a:blip r:embed="rId5" cstate="print"/>
+          <a:srcRect/>
+          <a:stretch>
+            <a:fillRect/>
+          </a:stretch>
+        </p:blipFill>
+        <p:spPr bwMode="auto">
+          <a:xfrm>
+            <a:off x="3779912" y="1131590"/>
+            <a:ext cx="1960437" cy="2024633"/>
+          </a:xfrm>
+          <a:prstGeom prst="rect">
+            <a:avLst/>
+          </a:prstGeom>
+          <a:noFill/>
+          <a:ln w="9525">
+            <a:noFill/>
+            <a:miter lim="800000"/>
+            <a:headEnd/>
+            <a:tailEnd/>
+          </a:ln>
+        </p:spPr>
+      </p:pic>
     </p:spTree>
   </p:cSld>
   <p:clrMapOvr>

</xml_diff>

<commit_message>
chg: Update to INTREP OPAR-002
</commit_message>
<xml_diff>
--- a/OPAR/INTREP VIS OPAR-002 - Syrian IADS.pptx
+++ b/OPAR/INTREP VIS OPAR-002 - Syrian IADS.pptx
@@ -12,11 +12,11 @@
     <p:sldId id="358" r:id="rId3"/>
     <p:sldId id="362" r:id="rId4"/>
     <p:sldId id="366" r:id="rId5"/>
-    <p:sldId id="367" r:id="rId6"/>
-    <p:sldId id="379" r:id="rId7"/>
-    <p:sldId id="368" r:id="rId8"/>
-    <p:sldId id="369" r:id="rId9"/>
-    <p:sldId id="370" r:id="rId10"/>
+    <p:sldId id="369" r:id="rId6"/>
+    <p:sldId id="368" r:id="rId7"/>
+    <p:sldId id="370" r:id="rId8"/>
+    <p:sldId id="367" r:id="rId9"/>
+    <p:sldId id="379" r:id="rId10"/>
     <p:sldId id="371" r:id="rId11"/>
     <p:sldId id="374" r:id="rId12"/>
     <p:sldId id="373" r:id="rId13"/>
@@ -4915,24 +4915,33 @@
           <a:p>
             <a:r>
               <a:rPr lang="en-US" sz="1200" dirty="0" smtClean="0"/>
-              <a:t>AWACS and Ships If they are integrated in the command structure and\or </a:t>
-            </a:r>
-            <a:r>
-              <a:rPr lang="en-US" sz="1200" dirty="0" err="1" smtClean="0"/>
-              <a:t>organisation</a:t>
-            </a:r>
+              <a:t>AWACS can be a huge contributor to the IADS by providing coverage down into valleys and into areas where the EWRs are not able to detect aircrafts.</a:t>
+            </a:r>
+          </a:p>
+          <a:p>
+            <a:endParaRPr lang="en-US" sz="1200" dirty="0" smtClean="0"/>
+          </a:p>
+          <a:p>
             <a:r>
               <a:rPr lang="en-US" sz="1200" dirty="0" smtClean="0"/>
-              <a:t>, these entities can feed </a:t>
-            </a:r>
-            <a:r>
-              <a:rPr lang="en-US" sz="1200" dirty="0" err="1" smtClean="0"/>
-              <a:t>informations</a:t>
-            </a:r>
+              <a:t>AWACS function in the IADS in a similar was as EWRs.</a:t>
+            </a:r>
+          </a:p>
+          <a:p>
+            <a:endParaRPr lang="en-US" sz="1200" dirty="0" smtClean="0"/>
+          </a:p>
+          <a:p>
             <a:r>
               <a:rPr lang="en-US" sz="1200" dirty="0" smtClean="0"/>
-              <a:t> to the IADS through connection nodes..</a:t>
-            </a:r>
+              <a:t>AWACS is limited in numbers and a very high value target if in the air.</a:t>
+            </a:r>
+          </a:p>
+          <a:p>
+            <a:r>
+              <a:rPr lang="en-US" sz="1200" dirty="0" smtClean="0"/>
+              <a:t>AWACS is transmits its information into the IADS and the command center via a connection node, as shown on the picture to the right.</a:t>
+            </a:r>
+            <a:endParaRPr lang="en-US" sz="1200" dirty="0" smtClean="0"/>
           </a:p>
           <a:p>
             <a:endParaRPr lang="en-US" sz="1200" dirty="0" smtClean="0"/>
@@ -4984,6 +4993,88 @@
           </a:p>
         </p:txBody>
       </p:sp>
+      <p:pic>
+        <p:nvPicPr>
+          <p:cNvPr id="2050" name="Picture 2"/>
+          <p:cNvPicPr>
+            <a:picLocks noChangeAspect="1" noChangeArrowheads="1"/>
+          </p:cNvPicPr>
+          <p:nvPr/>
+        </p:nvPicPr>
+        <p:blipFill>
+          <a:blip r:embed="rId3" cstate="print"/>
+          <a:srcRect/>
+          <a:stretch>
+            <a:fillRect/>
+          </a:stretch>
+        </p:blipFill>
+        <p:spPr bwMode="auto">
+          <a:xfrm>
+            <a:off x="3707904" y="987574"/>
+            <a:ext cx="3168352" cy="1645182"/>
+          </a:xfrm>
+          <a:prstGeom prst="rect">
+            <a:avLst/>
+          </a:prstGeom>
+          <a:noFill/>
+          <a:ln w="12700">
+            <a:solidFill>
+              <a:schemeClr val="tx1"/>
+            </a:solidFill>
+            <a:miter lim="800000"/>
+            <a:headEnd/>
+            <a:tailEnd/>
+          </a:ln>
+          <a:effectLst>
+            <a:outerShdw blurRad="50800" dist="38100" dir="2700000" algn="tl" rotWithShape="0">
+              <a:prstClr val="black">
+                <a:alpha val="40000"/>
+              </a:prstClr>
+            </a:outerShdw>
+          </a:effectLst>
+        </p:spPr>
+      </p:pic>
+      <p:pic>
+        <p:nvPicPr>
+          <p:cNvPr id="2051" name="Picture 3"/>
+          <p:cNvPicPr>
+            <a:picLocks noChangeAspect="1" noChangeArrowheads="1"/>
+          </p:cNvPicPr>
+          <p:nvPr/>
+        </p:nvPicPr>
+        <p:blipFill>
+          <a:blip r:embed="rId4" cstate="print"/>
+          <a:srcRect/>
+          <a:stretch>
+            <a:fillRect/>
+          </a:stretch>
+        </p:blipFill>
+        <p:spPr bwMode="auto">
+          <a:xfrm>
+            <a:off x="5724128" y="2859782"/>
+            <a:ext cx="2723111" cy="2091665"/>
+          </a:xfrm>
+          <a:prstGeom prst="rect">
+            <a:avLst/>
+          </a:prstGeom>
+          <a:noFill/>
+          <a:ln w="12700">
+            <a:solidFill>
+              <a:schemeClr val="tx1"/>
+            </a:solidFill>
+            <a:miter lim="800000"/>
+            <a:headEnd/>
+            <a:tailEnd/>
+          </a:ln>
+          <a:effectLst>
+            <a:outerShdw blurRad="50800" dist="38100" dir="2700000" algn="tl" rotWithShape="0">
+              <a:prstClr val="black">
+                <a:alpha val="40000"/>
+              </a:prstClr>
+            </a:outerShdw>
+          </a:effectLst>
+        </p:spPr>
+      </p:pic>
     </p:spTree>
   </p:cSld>
   <p:clrMapOvr>
@@ -13372,11 +13463,7 @@
           <a:p>
             <a:r>
               <a:rPr lang="en-US" sz="1000" dirty="0" smtClean="0"/>
-              <a:t>An </a:t>
-            </a:r>
-            <a:r>
-              <a:rPr lang="en-US" sz="1000" dirty="0" smtClean="0"/>
-              <a:t>Integrated Air </a:t>
+              <a:t>An Integrated Air </a:t>
             </a:r>
             <a:r>
               <a:rPr lang="en-US" sz="1000" dirty="0" err="1" smtClean="0"/>
@@ -13384,36 +13471,16 @@
             </a:r>
             <a:r>
               <a:rPr lang="en-US" sz="1000" dirty="0" smtClean="0"/>
-              <a:t> System </a:t>
-            </a:r>
+              <a:t> System  (IADS) is a wide network of surface-to-air forces that work together to defend the skies of a specific area. The system is also connected to the fighter aircraft in the A-A role either in a airborne CAP or intercept aircraft on ground alert that can be scrambled toward incoming threats.  </a:t>
+            </a:r>
+          </a:p>
+          <a:p>
+            <a:endParaRPr lang="en-US" sz="1000" dirty="0" smtClean="0"/>
+          </a:p>
+          <a:p>
             <a:r>
               <a:rPr lang="en-US" sz="1000" dirty="0" smtClean="0"/>
-              <a:t> (IADS) is </a:t>
-            </a:r>
-            <a:r>
-              <a:rPr lang="en-US" sz="1000" dirty="0" smtClean="0"/>
-              <a:t>a wide network of surface-to-air forces that work together to defend the skies of a specific area. The system is also connected to the </a:t>
-            </a:r>
-            <a:r>
-              <a:rPr lang="en-US" sz="1000" dirty="0" smtClean="0"/>
-              <a:t>fighter aircraft in the A-A role either in a airborne CAP or intercept aircraft on ground alert </a:t>
-            </a:r>
-            <a:r>
-              <a:rPr lang="en-US" sz="1000" dirty="0" smtClean="0"/>
-              <a:t>that can be scrambled toward incoming threats.  </a:t>
-            </a:r>
-          </a:p>
-          <a:p>
-            <a:endParaRPr lang="en-US" sz="1000" dirty="0" smtClean="0"/>
-          </a:p>
-          <a:p>
-            <a:r>
-              <a:rPr lang="en-US" sz="1000" dirty="0" smtClean="0"/>
-              <a:t>There are several elements that are part of this network, </a:t>
-            </a:r>
-            <a:r>
-              <a:rPr lang="en-US" sz="1000" dirty="0" smtClean="0"/>
-              <a:t>which all will be explained more in detail in the next slides:</a:t>
+              <a:t>There are several elements that are part of this network, which all will be explained more in detail in the next slides:</a:t>
             </a:r>
           </a:p>
           <a:p>
@@ -13504,7 +13571,6 @@
               <a:rPr lang="en-US" sz="1000" dirty="0" smtClean="0"/>
               <a:t>The illustration to the right show a simple IADS. Each sector have a EWR that feeds information into a sector command centre.  SAMs are off, and only turn on to fire based on the information from the EWR that they are within range. In addition, as long as the sector is connected to the entire IADS, they can also be activate based on other EWRs in  IADS. AWACS is also supporting and contributing via the command center and functions as a extra EWR. Fighters on standby can also be launched to either sector based on radar information from EWR or AWACS.</a:t>
             </a:r>
-            <a:endParaRPr lang="en-US" sz="1000" dirty="0" smtClean="0"/>
           </a:p>
           <a:p>
             <a:endParaRPr lang="en-US" sz="1200" dirty="0" smtClean="0"/>
@@ -13843,13 +13909,6 @@
               </a:rPr>
               <a:t>SAM 1</a:t>
             </a:r>
-            <a:endParaRPr lang="en-US" sz="800" dirty="0" smtClean="0">
-              <a:solidFill>
-                <a:schemeClr val="tx1"/>
-              </a:solidFill>
-              <a:latin typeface="Arial" pitchFamily="34" charset="0"/>
-              <a:cs typeface="Arial" pitchFamily="34" charset="0"/>
-            </a:endParaRPr>
           </a:p>
         </p:txBody>
       </p:sp>
@@ -13910,13 +13969,6 @@
               </a:rPr>
               <a:t>SAM 2</a:t>
             </a:r>
-            <a:endParaRPr lang="en-US" sz="800" dirty="0" smtClean="0">
-              <a:solidFill>
-                <a:schemeClr val="tx1"/>
-              </a:solidFill>
-              <a:latin typeface="Arial" pitchFamily="34" charset="0"/>
-              <a:cs typeface="Arial" pitchFamily="34" charset="0"/>
-            </a:endParaRPr>
           </a:p>
         </p:txBody>
       </p:sp>
@@ -13977,13 +14029,6 @@
               </a:rPr>
               <a:t>SAM 3</a:t>
             </a:r>
-            <a:endParaRPr lang="en-US" sz="800" dirty="0" smtClean="0">
-              <a:solidFill>
-                <a:schemeClr val="tx1"/>
-              </a:solidFill>
-              <a:latin typeface="Arial" pitchFamily="34" charset="0"/>
-              <a:cs typeface="Arial" pitchFamily="34" charset="0"/>
-            </a:endParaRPr>
           </a:p>
         </p:txBody>
       </p:sp>
@@ -14157,13 +14202,6 @@
               </a:rPr>
               <a:t>EWR A</a:t>
             </a:r>
-            <a:endParaRPr lang="en-US" sz="800" dirty="0" smtClean="0">
-              <a:solidFill>
-                <a:schemeClr val="tx1"/>
-              </a:solidFill>
-              <a:latin typeface="Arial" pitchFamily="34" charset="0"/>
-              <a:cs typeface="Arial" pitchFamily="34" charset="0"/>
-            </a:endParaRPr>
           </a:p>
         </p:txBody>
       </p:sp>
@@ -14361,13 +14399,6 @@
               </a:rPr>
               <a:t>SAM 4</a:t>
             </a:r>
-            <a:endParaRPr lang="en-US" sz="800" dirty="0" smtClean="0">
-              <a:solidFill>
-                <a:schemeClr val="tx1"/>
-              </a:solidFill>
-              <a:latin typeface="Arial" pitchFamily="34" charset="0"/>
-              <a:cs typeface="Arial" pitchFamily="34" charset="0"/>
-            </a:endParaRPr>
           </a:p>
         </p:txBody>
       </p:sp>
@@ -14428,13 +14459,6 @@
               </a:rPr>
               <a:t>SAM 5</a:t>
             </a:r>
-            <a:endParaRPr lang="en-US" sz="800" dirty="0" smtClean="0">
-              <a:solidFill>
-                <a:schemeClr val="tx1"/>
-              </a:solidFill>
-              <a:latin typeface="Arial" pitchFamily="34" charset="0"/>
-              <a:cs typeface="Arial" pitchFamily="34" charset="0"/>
-            </a:endParaRPr>
           </a:p>
         </p:txBody>
       </p:sp>
@@ -14495,13 +14519,6 @@
               </a:rPr>
               <a:t>SAM 6</a:t>
             </a:r>
-            <a:endParaRPr lang="en-US" sz="800" dirty="0" smtClean="0">
-              <a:solidFill>
-                <a:schemeClr val="tx1"/>
-              </a:solidFill>
-              <a:latin typeface="Arial" pitchFamily="34" charset="0"/>
-              <a:cs typeface="Arial" pitchFamily="34" charset="0"/>
-            </a:endParaRPr>
           </a:p>
         </p:txBody>
       </p:sp>
@@ -14675,13 +14692,6 @@
               </a:rPr>
               <a:t>EWR B</a:t>
             </a:r>
-            <a:endParaRPr lang="en-US" sz="800" dirty="0" smtClean="0">
-              <a:solidFill>
-                <a:schemeClr val="tx1"/>
-              </a:solidFill>
-              <a:latin typeface="Arial" pitchFamily="34" charset="0"/>
-              <a:cs typeface="Arial" pitchFamily="34" charset="0"/>
-            </a:endParaRPr>
           </a:p>
         </p:txBody>
       </p:sp>
@@ -14817,13 +14827,6 @@
               </a:rPr>
               <a:t>EWR Center</a:t>
             </a:r>
-            <a:endParaRPr lang="en-US" sz="800" dirty="0" smtClean="0">
-              <a:solidFill>
-                <a:schemeClr val="tx1"/>
-              </a:solidFill>
-              <a:latin typeface="Arial" pitchFamily="34" charset="0"/>
-              <a:cs typeface="Arial" pitchFamily="34" charset="0"/>
-            </a:endParaRPr>
           </a:p>
         </p:txBody>
       </p:sp>
@@ -14873,7 +14876,7 @@
         </p:nvSpPr>
         <p:spPr>
           <a:xfrm>
-            <a:off x="7668344" y="4443958"/>
+            <a:off x="7668344" y="3939902"/>
             <a:ext cx="648072" cy="504056"/>
           </a:xfrm>
           <a:prstGeom prst="ellipse">
@@ -14921,13 +14924,6 @@
               </a:rPr>
               <a:t>AWACS</a:t>
             </a:r>
-            <a:endParaRPr lang="en-US" sz="800" dirty="0" smtClean="0">
-              <a:solidFill>
-                <a:schemeClr val="tx1"/>
-              </a:solidFill>
-              <a:latin typeface="Arial" pitchFamily="34" charset="0"/>
-              <a:cs typeface="Arial" pitchFamily="34" charset="0"/>
-            </a:endParaRPr>
           </a:p>
         </p:txBody>
       </p:sp>
@@ -14943,7 +14939,7 @@
         <p:spPr>
           <a:xfrm>
             <a:off x="6300192" y="3867894"/>
-            <a:ext cx="1368152" cy="828092"/>
+            <a:ext cx="1368152" cy="324036"/>
           </a:xfrm>
           <a:prstGeom prst="line">
             <a:avLst/>
@@ -14977,7 +14973,7 @@
         </p:nvSpPr>
         <p:spPr>
           <a:xfrm>
-            <a:off x="4644008" y="4227934"/>
+            <a:off x="5148064" y="4371950"/>
             <a:ext cx="648072" cy="504056"/>
           </a:xfrm>
           <a:prstGeom prst="ellipse">
@@ -15025,13 +15021,6 @@
               </a:rPr>
               <a:t>Fighters</a:t>
             </a:r>
-            <a:endParaRPr lang="en-US" sz="800" dirty="0" smtClean="0">
-              <a:solidFill>
-                <a:schemeClr val="tx1"/>
-              </a:solidFill>
-              <a:latin typeface="Arial" pitchFamily="34" charset="0"/>
-              <a:cs typeface="Arial" pitchFamily="34" charset="0"/>
-            </a:endParaRPr>
           </a:p>
         </p:txBody>
       </p:sp>
@@ -15046,8 +15035,8 @@
         </p:nvCxnSpPr>
         <p:spPr>
           <a:xfrm flipV="1">
-            <a:off x="5197172" y="3867894"/>
-            <a:ext cx="1103020" cy="433857"/>
+            <a:off x="5701228" y="3867894"/>
+            <a:ext cx="598964" cy="577873"/>
           </a:xfrm>
           <a:prstGeom prst="line">
             <a:avLst/>
@@ -15786,19 +15775,7 @@
           <a:p>
             <a:r>
               <a:rPr lang="en-US" sz="1200" dirty="0" smtClean="0"/>
-              <a:t>This </a:t>
-            </a:r>
-            <a:r>
-              <a:rPr lang="en-US" sz="1200" dirty="0" smtClean="0"/>
-              <a:t>is the </a:t>
-            </a:r>
-            <a:r>
-              <a:rPr lang="en-US" sz="1200" dirty="0" smtClean="0"/>
-              <a:t>central node of the entire </a:t>
-            </a:r>
-            <a:r>
-              <a:rPr lang="en-US" sz="1200" dirty="0" smtClean="0"/>
-              <a:t>IADS.</a:t>
+              <a:t>This is the central node of the entire IADS.</a:t>
             </a:r>
           </a:p>
           <a:p>
@@ -15813,15 +15790,15 @@
           <a:p>
             <a:r>
               <a:rPr lang="en-US" sz="1200" dirty="0" smtClean="0"/>
-              <a:t>The command centre is powered by a </a:t>
-            </a:r>
-            <a:r>
-              <a:rPr lang="en-US" sz="1200" dirty="0" err="1" smtClean="0"/>
-              <a:t>a</a:t>
+              <a:t>The command centre is powered by </a:t>
             </a:r>
             <a:r>
               <a:rPr lang="en-US" sz="1200" dirty="0" smtClean="0"/>
-              <a:t> primary </a:t>
+              <a:t>a </a:t>
+            </a:r>
+            <a:r>
+              <a:rPr lang="en-US" sz="1200" dirty="0" smtClean="0"/>
+              <a:t>primary </a:t>
             </a:r>
             <a:r>
               <a:rPr lang="en-US" sz="1200" dirty="0" err="1" smtClean="0"/>
@@ -15845,28 +15822,16 @@
             </a:r>
             <a:r>
               <a:rPr lang="en-US" sz="1200" dirty="0" smtClean="0"/>
-              <a:t> </a:t>
-            </a:r>
+              <a:t> the command centre is unable to function.</a:t>
+            </a:r>
+          </a:p>
+          <a:p>
+            <a:endParaRPr lang="en-US" sz="1200" dirty="0" smtClean="0"/>
+          </a:p>
+          <a:p>
             <a:r>
               <a:rPr lang="en-US" sz="1200" dirty="0" smtClean="0"/>
-              <a:t>t</a:t>
-            </a:r>
-            <a:r>
-              <a:rPr lang="en-US" sz="1200" dirty="0" smtClean="0"/>
-              <a:t>he command centre is unable to function.</a:t>
-            </a:r>
-          </a:p>
-          <a:p>
-            <a:endParaRPr lang="en-US" sz="1200" dirty="0" smtClean="0"/>
-          </a:p>
-          <a:p>
-            <a:r>
-              <a:rPr lang="en-US" sz="1200" dirty="0" smtClean="0"/>
-              <a:t>Often the command centre </a:t>
-            </a:r>
-            <a:r>
-              <a:rPr lang="en-US" sz="1200" dirty="0" smtClean="0"/>
-              <a:t>also will have a backup command centre that takes its function if the primary command center is destroyed. The backup command center will have its own </a:t>
+              <a:t>Often the command centre also will have a backup command centre that takes its function if the primary command center is destroyed. The backup command center will have its own </a:t>
             </a:r>
             <a:r>
               <a:rPr lang="en-US" sz="1200" dirty="0" err="1" smtClean="0"/>
@@ -15876,7 +15841,6 @@
               <a:rPr lang="en-US" sz="1200" dirty="0" smtClean="0"/>
               <a:t> to function</a:t>
             </a:r>
-            <a:endParaRPr lang="en-US" sz="1200" dirty="0" smtClean="0"/>
           </a:p>
           <a:p>
             <a:endParaRPr lang="en-US" sz="1200" dirty="0" smtClean="0"/>
@@ -15895,7 +15859,6 @@
               <a:rPr lang="en-US" sz="1200" dirty="0" smtClean="0"/>
               <a:t>Example of a command center can be seen to the right.</a:t>
             </a:r>
-            <a:endParaRPr lang="en-US" sz="1200" dirty="0" smtClean="0"/>
           </a:p>
           <a:p>
             <a:endParaRPr lang="en-US" sz="1200" dirty="0" smtClean="0"/>
@@ -16119,7 +16082,15 @@
           <a:p>
             <a:r>
               <a:rPr lang="en-US" dirty="0" smtClean="0"/>
-              <a:t>SAM SITE</a:t>
+              <a:t>SECTOR </a:t>
+            </a:r>
+            <a:r>
+              <a:rPr lang="en-US" dirty="0" smtClean="0"/>
+              <a:t>COMMAND </a:t>
+            </a:r>
+            <a:r>
+              <a:rPr lang="en-US" dirty="0" smtClean="0"/>
+              <a:t>CENTER (CONNECTION  NODE)</a:t>
             </a:r>
             <a:endParaRPr lang="en-US" dirty="0"/>
           </a:p>
@@ -16777,74 +16748,44 @@
         </p:spPr>
         <p:txBody>
           <a:bodyPr wrap="square" rtlCol="0">
-            <a:normAutofit fontScale="92500" lnSpcReduction="10000"/>
+            <a:normAutofit/>
           </a:bodyPr>
           <a:lstStyle/>
           <a:p>
             <a:r>
               <a:rPr lang="en-US" sz="1200" dirty="0" smtClean="0"/>
-              <a:t>SAM Site This element is the actual threat, it can be a big and scary SA10 or a smaller SA8 that falls into the network. They can be a single section, or an entire cluster that is trying to defend an high value target.</a:t>
-            </a:r>
+              <a:t>The sector command center is the centralized area where a air defense sector is controlled. All SAMs and EWRs in a region will be connected to the sector command center.</a:t>
+            </a:r>
+          </a:p>
+          <a:p>
+            <a:endParaRPr lang="en-US" sz="1200" dirty="0" smtClean="0"/>
           </a:p>
           <a:p>
             <a:r>
               <a:rPr lang="en-US" sz="1200" dirty="0" smtClean="0"/>
-              <a:t>Example for this, are SA10 battalion protected by </a:t>
-            </a:r>
-            <a:r>
-              <a:rPr lang="en-US" sz="1200" dirty="0" err="1" smtClean="0"/>
-              <a:t>Shilkas</a:t>
-            </a:r>
+              <a:t>The air defense sector will also be supported by the overall IADS resources such as other EWRs, AWACS, air defense fighters flying CAP or interceptors on ground alert.</a:t>
+            </a:r>
+          </a:p>
+          <a:p>
+            <a:endParaRPr lang="en-US" sz="1200" dirty="0" smtClean="0"/>
+          </a:p>
+          <a:p>
             <a:r>
               <a:rPr lang="en-US" sz="1200" dirty="0" smtClean="0"/>
-              <a:t>, and </a:t>
-            </a:r>
-            <a:r>
-              <a:rPr lang="en-US" sz="1200" dirty="0" err="1" smtClean="0"/>
-              <a:t>Tonguskas</a:t>
-            </a:r>
+              <a:t>If the sector command center is destroyed, the sector will be cut off from other IADS resources, some SAMs may then be off permanently (they are not aware that the sector command center is destroyed), or they can be active all the time, making it easier to locate them SAMs in the sector for engagement with standoff  precision munitions.</a:t>
+            </a:r>
+          </a:p>
+          <a:p>
+            <a:endParaRPr lang="en-US" sz="1200" dirty="0" smtClean="0"/>
+          </a:p>
+          <a:p>
             <a:r>
               <a:rPr lang="en-US" sz="1200" dirty="0" smtClean="0"/>
-              <a:t> to help against low level threats, like cruise missiles, low level strikes or helicopters.</a:t>
-            </a:r>
-          </a:p>
-          <a:p>
-            <a:r>
-              <a:rPr lang="en-US" sz="1200" dirty="0" smtClean="0"/>
-              <a:t>SAM are usually static, but for concealment and </a:t>
-            </a:r>
-            <a:r>
-              <a:rPr lang="en-US" sz="1200" dirty="0" err="1" smtClean="0"/>
-              <a:t>defence</a:t>
-            </a:r>
-            <a:r>
-              <a:rPr lang="en-US" sz="1200" dirty="0" smtClean="0"/>
-              <a:t>, they can be moved around. Older systems takes days to disassemble, move and assemble, while more modern Russian variants can take just hours.</a:t>
-            </a:r>
-          </a:p>
-          <a:p>
-            <a:r>
-              <a:rPr lang="en-US" sz="1200" dirty="0" smtClean="0"/>
-              <a:t>To avoid detection as long as possible, usually SAMs are kept silent until a target comes into range, and depending on the SAM, it can take some time to launch their missiles.</a:t>
-            </a:r>
-          </a:p>
-          <a:p>
-            <a:r>
-              <a:rPr lang="en-US" sz="1200" dirty="0" smtClean="0"/>
-              <a:t>Better trained SAM crews will shorten this time for the acquisition of enemy aircraft, and usually will wait for it to get closer to a NEZ range [ No Escape Zone ] before launching.</a:t>
-            </a:r>
-          </a:p>
-          <a:p>
-            <a:r>
-              <a:rPr lang="en-US" sz="1200" dirty="0" smtClean="0"/>
-              <a:t>SAM sites can be present in the theatre, but not connected to the IADS, and this would be the case for smaller section that are integrated with ground forces, and work with them to support them directly.</a:t>
-            </a:r>
-          </a:p>
-          <a:p>
-            <a:r>
-              <a:rPr lang="en-US" sz="1200" dirty="0" smtClean="0"/>
-              <a:t>.</a:t>
-            </a:r>
+              <a:t>Example of a sector command center seen on the right.</a:t>
+            </a:r>
+          </a:p>
+          <a:p>
+            <a:endParaRPr lang="en-US" sz="1200" dirty="0" smtClean="0"/>
           </a:p>
           <a:p>
             <a:endParaRPr lang="en-US" sz="1200" dirty="0" smtClean="0"/>
@@ -16896,6 +16837,88 @@
           </a:p>
         </p:txBody>
       </p:sp>
+      <p:pic>
+        <p:nvPicPr>
+          <p:cNvPr id="3074" name="Picture 2"/>
+          <p:cNvPicPr>
+            <a:picLocks noChangeAspect="1" noChangeArrowheads="1"/>
+          </p:cNvPicPr>
+          <p:nvPr/>
+        </p:nvPicPr>
+        <p:blipFill>
+          <a:blip r:embed="rId3" cstate="print"/>
+          <a:srcRect/>
+          <a:stretch>
+            <a:fillRect/>
+          </a:stretch>
+        </p:blipFill>
+        <p:spPr bwMode="auto">
+          <a:xfrm>
+            <a:off x="6228184" y="843558"/>
+            <a:ext cx="2262632" cy="2376314"/>
+          </a:xfrm>
+          <a:prstGeom prst="rect">
+            <a:avLst/>
+          </a:prstGeom>
+          <a:noFill/>
+          <a:ln w="12700">
+            <a:solidFill>
+              <a:schemeClr val="tx1"/>
+            </a:solidFill>
+            <a:miter lim="800000"/>
+            <a:headEnd/>
+            <a:tailEnd/>
+          </a:ln>
+          <a:effectLst>
+            <a:outerShdw blurRad="50800" dist="38100" dir="2700000" algn="tl" rotWithShape="0">
+              <a:prstClr val="black">
+                <a:alpha val="40000"/>
+              </a:prstClr>
+            </a:outerShdw>
+          </a:effectLst>
+        </p:spPr>
+      </p:pic>
+      <p:pic>
+        <p:nvPicPr>
+          <p:cNvPr id="3075" name="Picture 3"/>
+          <p:cNvPicPr>
+            <a:picLocks noChangeAspect="1" noChangeArrowheads="1"/>
+          </p:cNvPicPr>
+          <p:nvPr/>
+        </p:nvPicPr>
+        <p:blipFill>
+          <a:blip r:embed="rId4" cstate="print"/>
+          <a:srcRect/>
+          <a:stretch>
+            <a:fillRect/>
+          </a:stretch>
+        </p:blipFill>
+        <p:spPr bwMode="auto">
+          <a:xfrm>
+            <a:off x="3707904" y="915566"/>
+            <a:ext cx="2232671" cy="2402780"/>
+          </a:xfrm>
+          <a:prstGeom prst="rect">
+            <a:avLst/>
+          </a:prstGeom>
+          <a:noFill/>
+          <a:ln w="12700">
+            <a:solidFill>
+              <a:schemeClr val="tx1"/>
+            </a:solidFill>
+            <a:miter lim="800000"/>
+            <a:headEnd/>
+            <a:tailEnd/>
+          </a:ln>
+          <a:effectLst>
+            <a:outerShdw blurRad="50800" dist="38100" dir="2700000" algn="tl" rotWithShape="0">
+              <a:prstClr val="black">
+                <a:alpha val="40000"/>
+              </a:prstClr>
+            </a:outerShdw>
+          </a:effectLst>
+        </p:spPr>
+      </p:pic>
     </p:spTree>
   </p:cSld>
   <p:clrMapOvr>
@@ -16945,7 +16968,7 @@
           <a:p>
             <a:r>
               <a:rPr lang="en-US" dirty="0" smtClean="0"/>
-              <a:t>POINT DEFENSE</a:t>
+              <a:t>EARLY WARNING RADAR (EWR)</a:t>
             </a:r>
             <a:endParaRPr lang="en-US" dirty="0"/>
           </a:p>
@@ -17609,70 +17632,64 @@
           <a:p>
             <a:r>
               <a:rPr lang="en-US" sz="1200" dirty="0" smtClean="0"/>
-              <a:t>SAM Site This element is the actual threat, it can be a big and scary SA10 or a smaller SA8 that falls into the network. They can be a single section, or an entire cluster that is trying to defend an high value target.</a:t>
-            </a:r>
+              <a:t>EWRs are critical parts of the IADS network. EWR scan the skies regularly and feed information to the sector command center or the IADS command center. This makes it possible for SAM sites to be dark (radar off), and only activating to fire a missile once they know a target is within range. This create a lethal combination as the first time a pilot may get a warning from the SAM is when it starts firing at the pilot.</a:t>
+            </a:r>
+          </a:p>
+          <a:p>
+            <a:endParaRPr lang="en-US" sz="1200" dirty="0" smtClean="0"/>
           </a:p>
           <a:p>
             <a:r>
               <a:rPr lang="en-US" sz="1200" dirty="0" smtClean="0"/>
-              <a:t>Example for this, are SA10 battalion protected by </a:t>
+              <a:t>EWRs may be on all the time, or be on at regular intervals to ensure good coverage.</a:t>
+            </a:r>
+          </a:p>
+          <a:p>
+            <a:r>
+              <a:rPr lang="en-US" sz="1200" dirty="0" smtClean="0"/>
+              <a:t>EWRs is high value targets that is likely protected by point defense system and are placed within the umbrella of the IADS network.</a:t>
+            </a:r>
+          </a:p>
+          <a:p>
+            <a:endParaRPr lang="en-US" sz="1200" dirty="0" smtClean="0"/>
+          </a:p>
+          <a:p>
+            <a:r>
+              <a:rPr lang="en-US" sz="1200" dirty="0" smtClean="0"/>
+              <a:t>EWRs are normally placed at locations which gives best possible coverage of the airspace in the sector.</a:t>
+            </a:r>
+          </a:p>
+          <a:p>
+            <a:r>
+              <a:rPr lang="en-US" sz="1200" dirty="0" smtClean="0"/>
+              <a:t>By avoiding detection by EWRs it is possible to sneak in to a sector and conduct the mission without </a:t>
             </a:r>
             <a:r>
               <a:rPr lang="en-US" sz="1200" dirty="0" err="1" smtClean="0"/>
-              <a:t>Shilkas</a:t>
+              <a:t>beeing</a:t>
             </a:r>
             <a:r>
               <a:rPr lang="en-US" sz="1200" dirty="0" smtClean="0"/>
-              <a:t>, and </a:t>
-            </a:r>
-            <a:r>
-              <a:rPr lang="en-US" sz="1200" dirty="0" err="1" smtClean="0"/>
-              <a:t>Tonguskas</a:t>
-            </a:r>
+              <a:t> shot at.</a:t>
+            </a:r>
+          </a:p>
+          <a:p>
+            <a:endParaRPr lang="en-US" sz="1200" dirty="0" smtClean="0"/>
+          </a:p>
+          <a:p>
             <a:r>
               <a:rPr lang="en-US" sz="1200" dirty="0" smtClean="0"/>
-              <a:t> to help against low level threats, like cruise missiles, low level strikes or helicopters.</a:t>
-            </a:r>
+              <a:t>Large SAM sites such as the SA-10 have powerful radars that also can be used as EWR.</a:t>
+            </a:r>
+          </a:p>
+          <a:p>
+            <a:endParaRPr lang="en-US" sz="1200" dirty="0" smtClean="0"/>
           </a:p>
           <a:p>
             <a:r>
               <a:rPr lang="en-US" sz="1200" dirty="0" smtClean="0"/>
-              <a:t>SAM are usually static, but for concealment and </a:t>
-            </a:r>
-            <a:r>
-              <a:rPr lang="en-US" sz="1200" dirty="0" err="1" smtClean="0"/>
-              <a:t>defence</a:t>
-            </a:r>
-            <a:r>
-              <a:rPr lang="en-US" sz="1200" dirty="0" smtClean="0"/>
-              <a:t>, they can be moved around. Older systems takes days to disassemble, move and assemble, while more modern Russian variants can take just hours.</a:t>
-            </a:r>
-          </a:p>
-          <a:p>
-            <a:r>
-              <a:rPr lang="en-US" sz="1200" dirty="0" smtClean="0"/>
-              <a:t>To avoid detection as long as possible, usually SAMs are kept silent until a target comes into range, and depending on the SAM, it can take some time to launch their missiles.</a:t>
-            </a:r>
-          </a:p>
-          <a:p>
-            <a:r>
-              <a:rPr lang="en-US" sz="1200" dirty="0" smtClean="0"/>
-              <a:t>Better trained SAM crews will shorten this time for the acquisition of enemy aircraft, and usually will wait for it to get closer to a NEZ range [ No Escape Zone ] before launching.</a:t>
-            </a:r>
-          </a:p>
-          <a:p>
-            <a:r>
-              <a:rPr lang="en-US" sz="1200" dirty="0" smtClean="0"/>
-              <a:t>SAM sites can be present in the theatre, but not connected to the IADS, and this would be the case for smaller section that are integrated with ground forces, and work with them to support them directly.</a:t>
-            </a:r>
-          </a:p>
-          <a:p>
-            <a:r>
-              <a:rPr lang="en-US" sz="1200" dirty="0" smtClean="0"/>
-              <a:t>.</a:t>
-            </a:r>
-          </a:p>
-          <a:p>
+              <a:t>Examples of EWRs seen to the right.</a:t>
+            </a:r>
             <a:endParaRPr lang="en-US" sz="1200" dirty="0" smtClean="0"/>
           </a:p>
           <a:p>
@@ -17722,6 +17739,170 @@
           </a:p>
         </p:txBody>
       </p:sp>
+      <p:pic>
+        <p:nvPicPr>
+          <p:cNvPr id="4098" name="Picture 2"/>
+          <p:cNvPicPr>
+            <a:picLocks noChangeAspect="1" noChangeArrowheads="1"/>
+          </p:cNvPicPr>
+          <p:nvPr/>
+        </p:nvPicPr>
+        <p:blipFill>
+          <a:blip r:embed="rId3" cstate="print"/>
+          <a:srcRect/>
+          <a:stretch>
+            <a:fillRect/>
+          </a:stretch>
+        </p:blipFill>
+        <p:spPr bwMode="auto">
+          <a:xfrm>
+            <a:off x="3689278" y="1131590"/>
+            <a:ext cx="2178866" cy="1656184"/>
+          </a:xfrm>
+          <a:prstGeom prst="rect">
+            <a:avLst/>
+          </a:prstGeom>
+          <a:noFill/>
+          <a:ln w="12700">
+            <a:solidFill>
+              <a:schemeClr val="tx1"/>
+            </a:solidFill>
+            <a:miter lim="800000"/>
+            <a:headEnd/>
+            <a:tailEnd/>
+          </a:ln>
+          <a:effectLst>
+            <a:outerShdw blurRad="50800" dist="38100" dir="2700000" algn="tl" rotWithShape="0">
+              <a:prstClr val="black">
+                <a:alpha val="40000"/>
+              </a:prstClr>
+            </a:outerShdw>
+          </a:effectLst>
+        </p:spPr>
+      </p:pic>
+      <p:pic>
+        <p:nvPicPr>
+          <p:cNvPr id="4099" name="Picture 3"/>
+          <p:cNvPicPr>
+            <a:picLocks noChangeAspect="1" noChangeArrowheads="1"/>
+          </p:cNvPicPr>
+          <p:nvPr/>
+        </p:nvPicPr>
+        <p:blipFill>
+          <a:blip r:embed="rId4" cstate="print"/>
+          <a:srcRect r="10689"/>
+          <a:stretch>
+            <a:fillRect/>
+          </a:stretch>
+        </p:blipFill>
+        <p:spPr bwMode="auto">
+          <a:xfrm>
+            <a:off x="6516216" y="3075806"/>
+            <a:ext cx="2340108" cy="1656184"/>
+          </a:xfrm>
+          <a:prstGeom prst="rect">
+            <a:avLst/>
+          </a:prstGeom>
+          <a:noFill/>
+          <a:ln w="12700">
+            <a:solidFill>
+              <a:schemeClr val="tx1"/>
+            </a:solidFill>
+            <a:miter lim="800000"/>
+            <a:headEnd/>
+            <a:tailEnd/>
+          </a:ln>
+          <a:effectLst>
+            <a:outerShdw blurRad="50800" dist="38100" dir="2700000" algn="tl" rotWithShape="0">
+              <a:prstClr val="black">
+                <a:alpha val="40000"/>
+              </a:prstClr>
+            </a:outerShdw>
+          </a:effectLst>
+        </p:spPr>
+      </p:pic>
+      <p:pic>
+        <p:nvPicPr>
+          <p:cNvPr id="4100" name="Picture 4"/>
+          <p:cNvPicPr>
+            <a:picLocks noChangeAspect="1" noChangeArrowheads="1"/>
+          </p:cNvPicPr>
+          <p:nvPr/>
+        </p:nvPicPr>
+        <p:blipFill>
+          <a:blip r:embed="rId5" cstate="print"/>
+          <a:srcRect/>
+          <a:stretch>
+            <a:fillRect/>
+          </a:stretch>
+        </p:blipFill>
+        <p:spPr bwMode="auto">
+          <a:xfrm>
+            <a:off x="3685182" y="3075806"/>
+            <a:ext cx="2182962" cy="1650330"/>
+          </a:xfrm>
+          <a:prstGeom prst="rect">
+            <a:avLst/>
+          </a:prstGeom>
+          <a:noFill/>
+          <a:ln w="12700">
+            <a:solidFill>
+              <a:schemeClr val="tx1"/>
+            </a:solidFill>
+            <a:miter lim="800000"/>
+            <a:headEnd/>
+            <a:tailEnd/>
+          </a:ln>
+          <a:effectLst>
+            <a:outerShdw blurRad="50800" dist="38100" dir="2700000" algn="tl" rotWithShape="0">
+              <a:prstClr val="black">
+                <a:alpha val="40000"/>
+              </a:prstClr>
+            </a:outerShdw>
+          </a:effectLst>
+        </p:spPr>
+      </p:pic>
+      <p:pic>
+        <p:nvPicPr>
+          <p:cNvPr id="4101" name="Picture 5"/>
+          <p:cNvPicPr>
+            <a:picLocks noChangeAspect="1" noChangeArrowheads="1"/>
+          </p:cNvPicPr>
+          <p:nvPr/>
+        </p:nvPicPr>
+        <p:blipFill>
+          <a:blip r:embed="rId6" cstate="print"/>
+          <a:srcRect/>
+          <a:stretch>
+            <a:fillRect/>
+          </a:stretch>
+        </p:blipFill>
+        <p:spPr bwMode="auto">
+          <a:xfrm>
+            <a:off x="6516216" y="1131590"/>
+            <a:ext cx="2326593" cy="1656184"/>
+          </a:xfrm>
+          <a:prstGeom prst="rect">
+            <a:avLst/>
+          </a:prstGeom>
+          <a:noFill/>
+          <a:ln w="12700">
+            <a:solidFill>
+              <a:schemeClr val="tx1"/>
+            </a:solidFill>
+            <a:miter lim="800000"/>
+            <a:headEnd/>
+            <a:tailEnd/>
+          </a:ln>
+          <a:effectLst>
+            <a:outerShdw blurRad="50800" dist="38100" dir="2700000" algn="tl" rotWithShape="0">
+              <a:prstClr val="black">
+                <a:alpha val="40000"/>
+              </a:prstClr>
+            </a:outerShdw>
+          </a:effectLst>
+        </p:spPr>
+      </p:pic>
     </p:spTree>
   </p:cSld>
   <p:clrMapOvr>
@@ -17771,7 +17952,7 @@
           <a:p>
             <a:r>
               <a:rPr lang="en-US" dirty="0" smtClean="0"/>
-              <a:t>EARLY WARNING RADAR (EWR)</a:t>
+              <a:t>POWER SOURCE</a:t>
             </a:r>
             <a:endParaRPr lang="en-US" dirty="0"/>
           </a:p>
@@ -18429,71 +18610,58 @@
         </p:spPr>
         <p:txBody>
           <a:bodyPr wrap="square" rtlCol="0">
-            <a:normAutofit lnSpcReduction="10000"/>
+            <a:normAutofit/>
           </a:bodyPr>
           <a:lstStyle/>
           <a:p>
             <a:r>
               <a:rPr lang="en-US" sz="1200" dirty="0" smtClean="0"/>
-              <a:t>EW Radar Early Warning Radars are the sentinels of this network. They scan the skies constantly, and feed </a:t>
+              <a:t>Certain parts of the IADS network may require a external power source to function. </a:t>
+            </a:r>
+          </a:p>
+          <a:p>
+            <a:r>
+              <a:rPr lang="en-US" sz="1200" dirty="0" smtClean="0"/>
+              <a:t>Many elements of the IADS, such as the smaller SAM systems have autonomous power and will not be affected by the destruction of power sources. </a:t>
+            </a:r>
+            <a:r>
+              <a:rPr lang="en-US" sz="1200" dirty="0" smtClean="0"/>
+              <a:t>But EWRs and IADS command center require </a:t>
             </a:r>
             <a:r>
               <a:rPr lang="en-US" sz="1200" dirty="0" err="1" smtClean="0"/>
-              <a:t>informations</a:t>
+              <a:t>minmum</a:t>
             </a:r>
             <a:r>
               <a:rPr lang="en-US" sz="1200" dirty="0" smtClean="0"/>
-              <a:t> to the command centre and the SAM sites.</a:t>
-            </a:r>
-          </a:p>
-          <a:p>
+              <a:t> one power source to operate. Some elements may also have a backup </a:t>
+            </a:r>
+            <a:r>
+              <a:rPr lang="en-US" sz="1200" dirty="0" err="1" smtClean="0"/>
+              <a:t>powersource</a:t>
+            </a:r>
             <a:r>
               <a:rPr lang="en-US" sz="1200" dirty="0" smtClean="0"/>
-              <a:t>They can be within a big cluster of air </a:t>
-            </a:r>
-            <a:r>
-              <a:rPr lang="en-US" sz="1200" dirty="0" err="1" smtClean="0"/>
-              <a:t>defence</a:t>
-            </a:r>
+              <a:t> to be able to function in case the primary power source is destroyed.</a:t>
+            </a:r>
+            <a:endParaRPr lang="en-US" sz="1200" dirty="0" smtClean="0"/>
+          </a:p>
+          <a:p>
+            <a:endParaRPr lang="en-US" sz="1200" dirty="0" smtClean="0"/>
+          </a:p>
+          <a:p>
             <a:r>
               <a:rPr lang="en-US" sz="1200" dirty="0" smtClean="0"/>
-              <a:t>, or they can be placed around the territory, for example on the higher hills, to have better range.</a:t>
-            </a:r>
-          </a:p>
-          <a:p>
+              <a:t>Examples of </a:t>
+            </a:r>
             <a:r>
               <a:rPr lang="en-US" sz="1200" dirty="0" smtClean="0"/>
-              <a:t>Their purpose is to pick up the contacts as far and as quick as possible, to relay info up the chain, so the command and SAM sites can prepare to face the threat, and </a:t>
-            </a:r>
-            <a:r>
-              <a:rPr lang="en-US" sz="1200" dirty="0" err="1" smtClean="0"/>
-              <a:t>organise</a:t>
+              <a:t>primary power source </a:t>
             </a:r>
             <a:r>
               <a:rPr lang="en-US" sz="1200" dirty="0" smtClean="0"/>
-              <a:t> together with other element to ensure success.</a:t>
-            </a:r>
-          </a:p>
-          <a:p>
-            <a:r>
-              <a:rPr lang="en-US" sz="1200" dirty="0" smtClean="0"/>
-              <a:t>Big SAM sites like SA10 can have more powerful radar than an usual EW radars. The S-300PS 64H6E radar can cover 160km and a EWR 55G6 instead reach 120km. In such cases, the 64H6E can be used as an EW tool, if the network would benefit from his coverage.</a:t>
-            </a:r>
-          </a:p>
-          <a:p>
-            <a:r>
-              <a:rPr lang="en-US" sz="1200" dirty="0" smtClean="0"/>
-              <a:t>They can also be moved quite relatively quickly, but they are often placed in strategic position to cover a better area. They are also smaller in size, and harder to spot.</a:t>
-            </a:r>
-          </a:p>
-          <a:p>
-            <a:r>
-              <a:rPr lang="en-US" sz="1200" dirty="0" smtClean="0"/>
-              <a:t>.</a:t>
-            </a:r>
-          </a:p>
-          <a:p>
-            <a:endParaRPr lang="en-US" sz="1200" dirty="0" smtClean="0"/>
+              <a:t>seen to the right.</a:t>
+            </a:r>
           </a:p>
           <a:p>
             <a:endParaRPr lang="en-US" sz="1200" dirty="0" smtClean="0"/>
@@ -18544,7 +18712,7 @@
       </p:sp>
       <p:pic>
         <p:nvPicPr>
-          <p:cNvPr id="4098" name="Picture 2"/>
+          <p:cNvPr id="2050" name="Picture 2"/>
           <p:cNvPicPr>
             <a:picLocks noChangeAspect="1" noChangeArrowheads="1"/>
           </p:cNvPicPr>
@@ -18559,24 +18727,33 @@
         </p:blipFill>
         <p:spPr bwMode="auto">
           <a:xfrm>
-            <a:off x="3563888" y="1131590"/>
-            <a:ext cx="1880667" cy="1429519"/>
+            <a:off x="6372200" y="699543"/>
+            <a:ext cx="2413273" cy="1854026"/>
           </a:xfrm>
           <a:prstGeom prst="rect">
             <a:avLst/>
           </a:prstGeom>
           <a:noFill/>
-          <a:ln w="9525">
-            <a:noFill/>
+          <a:ln w="12700">
+            <a:solidFill>
+              <a:schemeClr val="tx1"/>
+            </a:solidFill>
             <a:miter lim="800000"/>
             <a:headEnd/>
             <a:tailEnd/>
           </a:ln>
+          <a:effectLst>
+            <a:outerShdw blurRad="50800" dist="38100" dir="2700000" algn="tl" rotWithShape="0">
+              <a:prstClr val="black">
+                <a:alpha val="40000"/>
+              </a:prstClr>
+            </a:outerShdw>
+          </a:effectLst>
         </p:spPr>
       </p:pic>
       <p:pic>
         <p:nvPicPr>
-          <p:cNvPr id="4099" name="Picture 3"/>
+          <p:cNvPr id="2051" name="Picture 3"/>
           <p:cNvPicPr>
             <a:picLocks noChangeAspect="1" noChangeArrowheads="1"/>
           </p:cNvPicPr>
@@ -18591,24 +18768,33 @@
         </p:blipFill>
         <p:spPr bwMode="auto">
           <a:xfrm>
-            <a:off x="3779912" y="3219822"/>
-            <a:ext cx="2011909" cy="1291496"/>
+            <a:off x="6372200" y="2931790"/>
+            <a:ext cx="1956424" cy="1484958"/>
           </a:xfrm>
           <a:prstGeom prst="rect">
             <a:avLst/>
           </a:prstGeom>
           <a:noFill/>
-          <a:ln w="9525">
-            <a:noFill/>
+          <a:ln w="12700">
+            <a:solidFill>
+              <a:schemeClr val="tx1"/>
+            </a:solidFill>
             <a:miter lim="800000"/>
             <a:headEnd/>
             <a:tailEnd/>
           </a:ln>
+          <a:effectLst>
+            <a:outerShdw blurRad="50800" dist="38100" dir="2700000" algn="tl" rotWithShape="0">
+              <a:prstClr val="black">
+                <a:alpha val="40000"/>
+              </a:prstClr>
+            </a:outerShdw>
+          </a:effectLst>
         </p:spPr>
       </p:pic>
       <p:pic>
         <p:nvPicPr>
-          <p:cNvPr id="4100" name="Picture 4"/>
+          <p:cNvPr id="2052" name="Picture 4"/>
           <p:cNvPicPr>
             <a:picLocks noChangeAspect="1" noChangeArrowheads="1"/>
           </p:cNvPicPr>
@@ -18623,51 +18809,28 @@
         </p:blipFill>
         <p:spPr bwMode="auto">
           <a:xfrm>
-            <a:off x="6588224" y="1131590"/>
-            <a:ext cx="2038946" cy="1541453"/>
+            <a:off x="3779912" y="1131590"/>
+            <a:ext cx="1960437" cy="2024633"/>
           </a:xfrm>
           <a:prstGeom prst="rect">
             <a:avLst/>
           </a:prstGeom>
           <a:noFill/>
-          <a:ln w="9525">
-            <a:noFill/>
+          <a:ln w="12700">
+            <a:solidFill>
+              <a:schemeClr val="tx1"/>
+            </a:solidFill>
             <a:miter lim="800000"/>
             <a:headEnd/>
             <a:tailEnd/>
           </a:ln>
-        </p:spPr>
-      </p:pic>
-      <p:pic>
-        <p:nvPicPr>
-          <p:cNvPr id="4101" name="Picture 5"/>
-          <p:cNvPicPr>
-            <a:picLocks noChangeAspect="1" noChangeArrowheads="1"/>
-          </p:cNvPicPr>
-          <p:nvPr/>
-        </p:nvPicPr>
-        <p:blipFill>
-          <a:blip r:embed="rId6" cstate="print"/>
-          <a:srcRect/>
-          <a:stretch>
-            <a:fillRect/>
-          </a:stretch>
-        </p:blipFill>
-        <p:spPr bwMode="auto">
-          <a:xfrm>
-            <a:off x="6516216" y="3075806"/>
-            <a:ext cx="1870369" cy="1331421"/>
-          </a:xfrm>
-          <a:prstGeom prst="rect">
-            <a:avLst/>
-          </a:prstGeom>
-          <a:noFill/>
-          <a:ln w="9525">
-            <a:noFill/>
-            <a:miter lim="800000"/>
-            <a:headEnd/>
-            <a:tailEnd/>
-          </a:ln>
+          <a:effectLst>
+            <a:outerShdw blurRad="50800" dist="38100" dir="2700000" algn="tl" rotWithShape="0">
+              <a:prstClr val="black">
+                <a:alpha val="40000"/>
+              </a:prstClr>
+            </a:outerShdw>
+          </a:effectLst>
         </p:spPr>
       </p:pic>
     </p:spTree>
@@ -18719,7 +18882,7 @@
           <a:p>
             <a:r>
               <a:rPr lang="en-US" dirty="0" smtClean="0"/>
-              <a:t>CONNECTION NODE (SECTOR COMMAND CENTER)</a:t>
+              <a:t>SAM SITE</a:t>
             </a:r>
             <a:endParaRPr lang="en-US" dirty="0"/>
           </a:p>
@@ -19377,41 +19540,73 @@
         </p:spPr>
         <p:txBody>
           <a:bodyPr wrap="square" rtlCol="0">
-            <a:normAutofit/>
+            <a:normAutofit fontScale="92500" lnSpcReduction="10000"/>
           </a:bodyPr>
           <a:lstStyle/>
           <a:p>
             <a:r>
               <a:rPr lang="en-US" sz="1200" dirty="0" smtClean="0"/>
-              <a:t>Connection Nodes Depending on the geographical size of the area, the current available infrastructure, and the technology available, IADS may have connection nodes.</a:t>
+              <a:t>SAM Site This element is the actual threat, it can be a big and scary SA10 or a smaller SA8 that falls into the network. They can be a single section, or an entire cluster that is trying to defend an high value target.</a:t>
             </a:r>
           </a:p>
           <a:p>
             <a:r>
               <a:rPr lang="en-US" sz="1200" dirty="0" smtClean="0"/>
-              <a:t>These are systems that can pass messages, data and other kind of </a:t>
+              <a:t>Example for this, are SA10 battalion protected by </a:t>
             </a:r>
             <a:r>
               <a:rPr lang="en-US" sz="1200" dirty="0" err="1" smtClean="0"/>
-              <a:t>informations</a:t>
+              <a:t>Shilkas</a:t>
             </a:r>
             <a:r>
               <a:rPr lang="en-US" sz="1200" dirty="0" smtClean="0"/>
-              <a:t>. They are basically </a:t>
+              <a:t>, and </a:t>
             </a:r>
             <a:r>
               <a:rPr lang="en-US" sz="1200" dirty="0" err="1" smtClean="0"/>
-              <a:t>informations</a:t>
+              <a:t>Tonguskas</a:t>
             </a:r>
             <a:r>
               <a:rPr lang="en-US" sz="1200" dirty="0" smtClean="0"/>
-              <a:t> highways, and let all the pieces of the network working together</a:t>
+              <a:t> to help against low level threats, like cruise missiles, low level strikes or helicopters.</a:t>
             </a:r>
           </a:p>
           <a:p>
             <a:r>
               <a:rPr lang="en-US" sz="1200" dirty="0" smtClean="0"/>
-              <a:t>They are usually Antennas that are placed in key position to catch messages from other elements in the network, and relay them, overcoming geographical limitations like mountains.</a:t>
+              <a:t>SAM are usually static, but for concealment and </a:t>
+            </a:r>
+            <a:r>
+              <a:rPr lang="en-US" sz="1200" dirty="0" err="1" smtClean="0"/>
+              <a:t>defence</a:t>
+            </a:r>
+            <a:r>
+              <a:rPr lang="en-US" sz="1200" dirty="0" smtClean="0"/>
+              <a:t>, they can be moved around. Older systems takes days to disassemble, move and assemble, while more modern Russian variants can take just hours.</a:t>
+            </a:r>
+          </a:p>
+          <a:p>
+            <a:r>
+              <a:rPr lang="en-US" sz="1200" dirty="0" smtClean="0"/>
+              <a:t>To avoid detection as long as possible, usually SAMs are kept silent until a target comes into range, and depending on the SAM, it can take some time to launch their missiles.</a:t>
+            </a:r>
+          </a:p>
+          <a:p>
+            <a:r>
+              <a:rPr lang="en-US" sz="1200" dirty="0" smtClean="0"/>
+              <a:t>Better trained SAM crews will shorten this time for the acquisition of enemy aircraft, and usually will wait for it to get closer to a NEZ range [ No Escape Zone ] before launching.</a:t>
+            </a:r>
+          </a:p>
+          <a:p>
+            <a:r>
+              <a:rPr lang="en-US" sz="1200" dirty="0" smtClean="0"/>
+              <a:t>SAM sites can be present in the theatre, but not connected to the IADS, and this would be the case for smaller section that are integrated with ground forces, and work with them to support them directly.</a:t>
+            </a:r>
+          </a:p>
+          <a:p>
+            <a:r>
+              <a:rPr lang="en-US" sz="1200" dirty="0" smtClean="0"/>
+              <a:t>.</a:t>
             </a:r>
           </a:p>
           <a:p>
@@ -19464,70 +19659,6 @@
           </a:p>
         </p:txBody>
       </p:sp>
-      <p:pic>
-        <p:nvPicPr>
-          <p:cNvPr id="3074" name="Picture 2"/>
-          <p:cNvPicPr>
-            <a:picLocks noChangeAspect="1" noChangeArrowheads="1"/>
-          </p:cNvPicPr>
-          <p:nvPr/>
-        </p:nvPicPr>
-        <p:blipFill>
-          <a:blip r:embed="rId3" cstate="print"/>
-          <a:srcRect/>
-          <a:stretch>
-            <a:fillRect/>
-          </a:stretch>
-        </p:blipFill>
-        <p:spPr bwMode="auto">
-          <a:xfrm>
-            <a:off x="6228184" y="843558"/>
-            <a:ext cx="2262632" cy="2376314"/>
-          </a:xfrm>
-          <a:prstGeom prst="rect">
-            <a:avLst/>
-          </a:prstGeom>
-          <a:noFill/>
-          <a:ln w="9525">
-            <a:noFill/>
-            <a:miter lim="800000"/>
-            <a:headEnd/>
-            <a:tailEnd/>
-          </a:ln>
-        </p:spPr>
-      </p:pic>
-      <p:pic>
-        <p:nvPicPr>
-          <p:cNvPr id="3075" name="Picture 3"/>
-          <p:cNvPicPr>
-            <a:picLocks noChangeAspect="1" noChangeArrowheads="1"/>
-          </p:cNvPicPr>
-          <p:nvPr/>
-        </p:nvPicPr>
-        <p:blipFill>
-          <a:blip r:embed="rId4" cstate="print"/>
-          <a:srcRect/>
-          <a:stretch>
-            <a:fillRect/>
-          </a:stretch>
-        </p:blipFill>
-        <p:spPr bwMode="auto">
-          <a:xfrm>
-            <a:off x="3707904" y="915566"/>
-            <a:ext cx="2232671" cy="2402780"/>
-          </a:xfrm>
-          <a:prstGeom prst="rect">
-            <a:avLst/>
-          </a:prstGeom>
-          <a:noFill/>
-          <a:ln w="9525">
-            <a:noFill/>
-            <a:miter lim="800000"/>
-            <a:headEnd/>
-            <a:tailEnd/>
-          </a:ln>
-        </p:spPr>
-      </p:pic>
     </p:spTree>
   </p:cSld>
   <p:clrMapOvr>
@@ -19577,7 +19708,7 @@
           <a:p>
             <a:r>
               <a:rPr lang="en-US" dirty="0" smtClean="0"/>
-              <a:t>POWER SOURCE</a:t>
+              <a:t>POINT DEFENSE</a:t>
             </a:r>
             <a:endParaRPr lang="en-US" dirty="0"/>
           </a:p>
@@ -20241,20 +20372,43 @@
           <a:p>
             <a:r>
               <a:rPr lang="en-US" sz="1200" dirty="0" smtClean="0"/>
-              <a:t>Power Sources This is a general label to indicate what is feeding power to the system, and usually are power plants that give power to entire grids.</a:t>
-            </a:r>
-          </a:p>
-          <a:p>
+              <a:t>High Value Targets  (HVT) such as EWRs, command centers or important SAMs will have a local point defense. The intention for the point defense is to be able to shoot down Anti Radiation Missiles (ARM) that are </a:t>
+            </a:r>
+            <a:r>
+              <a:rPr lang="en-US" sz="1200" dirty="0" err="1" smtClean="0"/>
+              <a:t>beeing</a:t>
+            </a:r>
             <a:r>
               <a:rPr lang="en-US" sz="1200" dirty="0" smtClean="0"/>
-              <a:t>Many elements can have autonomous power, like SAM systems don't need to be latched to an external power source to function fully.</a:t>
-            </a:r>
-          </a:p>
-          <a:p>
+              <a:t> </a:t>
+            </a:r>
+            <a:r>
+              <a:rPr lang="en-US" sz="1200" dirty="0" err="1" smtClean="0"/>
+              <a:t>launced</a:t>
+            </a:r>
             <a:r>
               <a:rPr lang="en-US" sz="1200" dirty="0" smtClean="0"/>
-              <a:t>But to work as a network, an IADS requires a Power source to operate.</a:t>
-            </a:r>
+              <a:t> at the HVT.</a:t>
+            </a:r>
+          </a:p>
+          <a:p>
+            <a:endParaRPr lang="en-US" sz="1200" dirty="0" smtClean="0"/>
+          </a:p>
+          <a:p>
+            <a:r>
+              <a:rPr lang="en-US" sz="1200" dirty="0" smtClean="0"/>
+              <a:t>The only known point defense system is the SA-15. </a:t>
+            </a:r>
+          </a:p>
+          <a:p>
+            <a:endParaRPr lang="en-US" sz="1200" dirty="0" smtClean="0"/>
+          </a:p>
+          <a:p>
+            <a:r>
+              <a:rPr lang="en-US" sz="1200" dirty="0" smtClean="0"/>
+              <a:t>It is assessed that if a point defense system is protecting a enemy radar, such as a EWR or SAM, the EWR or SAM may still operate even though a ARM is fired toward it. It will require multiple ARMs to flood the point defense in order to be able to shut enemy radars down if they are protected by point defense systems.</a:t>
+            </a:r>
+            <a:endParaRPr lang="en-US" sz="1200" dirty="0" smtClean="0"/>
           </a:p>
           <a:p>
             <a:endParaRPr lang="en-US" sz="1200" dirty="0" smtClean="0"/>
@@ -20308,7 +20462,7 @@
       </p:sp>
       <p:pic>
         <p:nvPicPr>
-          <p:cNvPr id="2050" name="Picture 2"/>
+          <p:cNvPr id="1026" name="Picture 2"/>
           <p:cNvPicPr>
             <a:picLocks noChangeAspect="1" noChangeArrowheads="1"/>
           </p:cNvPicPr>
@@ -20323,24 +20477,33 @@
         </p:blipFill>
         <p:spPr bwMode="auto">
           <a:xfrm>
-            <a:off x="6372200" y="699543"/>
-            <a:ext cx="2413273" cy="1854026"/>
+            <a:off x="3491880" y="1995686"/>
+            <a:ext cx="2562250" cy="1955254"/>
           </a:xfrm>
           <a:prstGeom prst="rect">
             <a:avLst/>
           </a:prstGeom>
           <a:noFill/>
-          <a:ln w="9525">
-            <a:noFill/>
+          <a:ln w="12700">
+            <a:solidFill>
+              <a:schemeClr val="tx1"/>
+            </a:solidFill>
             <a:miter lim="800000"/>
             <a:headEnd/>
             <a:tailEnd/>
           </a:ln>
+          <a:effectLst>
+            <a:outerShdw blurRad="50800" dist="38100" dir="2700000" algn="tl" rotWithShape="0">
+              <a:prstClr val="black">
+                <a:alpha val="40000"/>
+              </a:prstClr>
+            </a:outerShdw>
+          </a:effectLst>
         </p:spPr>
       </p:pic>
       <p:pic>
         <p:nvPicPr>
-          <p:cNvPr id="2051" name="Picture 3"/>
+          <p:cNvPr id="1027" name="Picture 3"/>
           <p:cNvPicPr>
             <a:picLocks noChangeAspect="1" noChangeArrowheads="1"/>
           </p:cNvPicPr>
@@ -20355,51 +20518,28 @@
         </p:blipFill>
         <p:spPr bwMode="auto">
           <a:xfrm>
-            <a:off x="6372200" y="2931790"/>
-            <a:ext cx="1956424" cy="1484958"/>
+            <a:off x="6156176" y="1995686"/>
+            <a:ext cx="2839449" cy="2648521"/>
           </a:xfrm>
           <a:prstGeom prst="rect">
             <a:avLst/>
           </a:prstGeom>
           <a:noFill/>
-          <a:ln w="9525">
-            <a:noFill/>
+          <a:ln w="12700">
+            <a:solidFill>
+              <a:schemeClr val="tx1"/>
+            </a:solidFill>
             <a:miter lim="800000"/>
             <a:headEnd/>
             <a:tailEnd/>
           </a:ln>
-        </p:spPr>
-      </p:pic>
-      <p:pic>
-        <p:nvPicPr>
-          <p:cNvPr id="2052" name="Picture 4"/>
-          <p:cNvPicPr>
-            <a:picLocks noChangeAspect="1" noChangeArrowheads="1"/>
-          </p:cNvPicPr>
-          <p:nvPr/>
-        </p:nvPicPr>
-        <p:blipFill>
-          <a:blip r:embed="rId5" cstate="print"/>
-          <a:srcRect/>
-          <a:stretch>
-            <a:fillRect/>
-          </a:stretch>
-        </p:blipFill>
-        <p:spPr bwMode="auto">
-          <a:xfrm>
-            <a:off x="3779912" y="1131590"/>
-            <a:ext cx="1960437" cy="2024633"/>
-          </a:xfrm>
-          <a:prstGeom prst="rect">
-            <a:avLst/>
-          </a:prstGeom>
-          <a:noFill/>
-          <a:ln w="9525">
-            <a:noFill/>
-            <a:miter lim="800000"/>
-            <a:headEnd/>
-            <a:tailEnd/>
-          </a:ln>
+          <a:effectLst>
+            <a:outerShdw blurRad="50800" dist="38100" dir="2700000" algn="tl" rotWithShape="0">
+              <a:prstClr val="black">
+                <a:alpha val="40000"/>
+              </a:prstClr>
+            </a:outerShdw>
+          </a:effectLst>
         </p:spPr>
       </p:pic>
     </p:spTree>

</xml_diff>